<commit_message>
Slightly modified picture of the universal node.
</commit_message>
<xml_diff>
--- a/images/Pictures.pptx
+++ b/images/Pictures.pptx
@@ -111,7 +111,7 @@
   </p:defaultTextStyle>
   <p:extLst>
     <p:ext uri="{EFAFB233-063F-42B5-8137-9DF3F51BA10A}">
-      <p15:sldGuideLst xmlns="" xmlns:p15="http://schemas.microsoft.com/office/powerpoint/2012/main">
+      <p15:sldGuideLst xmlns:p15="http://schemas.microsoft.com/office/powerpoint/2012/main" xmlns="">
         <p15:guide id="1" orient="horz" pos="2160">
           <p15:clr>
             <a:srgbClr val="A4A3A4"/>
@@ -380,7 +380,7 @@
     </p:spTree>
     <p:extLst>
       <p:ext uri="{BB962C8B-B14F-4D97-AF65-F5344CB8AC3E}">
-        <p14:creationId xmlns="" xmlns:p14="http://schemas.microsoft.com/office/powerpoint/2010/main" val="1725926972"/>
+        <p14:creationId xmlns:p14="http://schemas.microsoft.com/office/powerpoint/2010/main" xmlns="" val="1725926972"/>
       </p:ext>
     </p:extLst>
   </p:cSld>
@@ -750,7 +750,7 @@
     </p:spTree>
     <p:extLst>
       <p:ext uri="{BB962C8B-B14F-4D97-AF65-F5344CB8AC3E}">
-        <p14:creationId xmlns="" xmlns:p14="http://schemas.microsoft.com/office/powerpoint/2010/main" val="528191723"/>
+        <p14:creationId xmlns:p14="http://schemas.microsoft.com/office/powerpoint/2010/main" xmlns="" val="528191723"/>
       </p:ext>
     </p:extLst>
   </p:cSld>
@@ -922,7 +922,7 @@
     </p:spTree>
     <p:extLst>
       <p:ext uri="{BB962C8B-B14F-4D97-AF65-F5344CB8AC3E}">
-        <p14:creationId xmlns="" xmlns:p14="http://schemas.microsoft.com/office/powerpoint/2010/main" val="3985316557"/>
+        <p14:creationId xmlns:p14="http://schemas.microsoft.com/office/powerpoint/2010/main" xmlns="" val="3985316557"/>
       </p:ext>
     </p:extLst>
   </p:cSld>
@@ -1104,7 +1104,7 @@
     </p:spTree>
     <p:extLst>
       <p:ext uri="{BB962C8B-B14F-4D97-AF65-F5344CB8AC3E}">
-        <p14:creationId xmlns="" xmlns:p14="http://schemas.microsoft.com/office/powerpoint/2010/main" val="2433128099"/>
+        <p14:creationId xmlns:p14="http://schemas.microsoft.com/office/powerpoint/2010/main" xmlns="" val="2433128099"/>
       </p:ext>
     </p:extLst>
   </p:cSld>
@@ -1276,7 +1276,7 @@
     </p:spTree>
     <p:extLst>
       <p:ext uri="{BB962C8B-B14F-4D97-AF65-F5344CB8AC3E}">
-        <p14:creationId xmlns="" xmlns:p14="http://schemas.microsoft.com/office/powerpoint/2010/main" val="1291509717"/>
+        <p14:creationId xmlns:p14="http://schemas.microsoft.com/office/powerpoint/2010/main" xmlns="" val="1291509717"/>
       </p:ext>
     </p:extLst>
   </p:cSld>
@@ -1522,7 +1522,7 @@
     </p:spTree>
     <p:extLst>
       <p:ext uri="{BB962C8B-B14F-4D97-AF65-F5344CB8AC3E}">
-        <p14:creationId xmlns="" xmlns:p14="http://schemas.microsoft.com/office/powerpoint/2010/main" val="3757756728"/>
+        <p14:creationId xmlns:p14="http://schemas.microsoft.com/office/powerpoint/2010/main" xmlns="" val="3757756728"/>
       </p:ext>
     </p:extLst>
   </p:cSld>
@@ -1756,7 +1756,7 @@
     </p:spTree>
     <p:extLst>
       <p:ext uri="{BB962C8B-B14F-4D97-AF65-F5344CB8AC3E}">
-        <p14:creationId xmlns="" xmlns:p14="http://schemas.microsoft.com/office/powerpoint/2010/main" val="700055631"/>
+        <p14:creationId xmlns:p14="http://schemas.microsoft.com/office/powerpoint/2010/main" xmlns="" val="700055631"/>
       </p:ext>
     </p:extLst>
   </p:cSld>
@@ -2125,7 +2125,7 @@
     </p:spTree>
     <p:extLst>
       <p:ext uri="{BB962C8B-B14F-4D97-AF65-F5344CB8AC3E}">
-        <p14:creationId xmlns="" xmlns:p14="http://schemas.microsoft.com/office/powerpoint/2010/main" val="2359288918"/>
+        <p14:creationId xmlns:p14="http://schemas.microsoft.com/office/powerpoint/2010/main" xmlns="" val="2359288918"/>
       </p:ext>
     </p:extLst>
   </p:cSld>
@@ -2245,7 +2245,7 @@
     </p:spTree>
     <p:extLst>
       <p:ext uri="{BB962C8B-B14F-4D97-AF65-F5344CB8AC3E}">
-        <p14:creationId xmlns="" xmlns:p14="http://schemas.microsoft.com/office/powerpoint/2010/main" val="1245979004"/>
+        <p14:creationId xmlns:p14="http://schemas.microsoft.com/office/powerpoint/2010/main" xmlns="" val="1245979004"/>
       </p:ext>
     </p:extLst>
   </p:cSld>
@@ -2342,7 +2342,7 @@
     </p:spTree>
     <p:extLst>
       <p:ext uri="{BB962C8B-B14F-4D97-AF65-F5344CB8AC3E}">
-        <p14:creationId xmlns="" xmlns:p14="http://schemas.microsoft.com/office/powerpoint/2010/main" val="2472079974"/>
+        <p14:creationId xmlns:p14="http://schemas.microsoft.com/office/powerpoint/2010/main" xmlns="" val="2472079974"/>
       </p:ext>
     </p:extLst>
   </p:cSld>
@@ -2621,7 +2621,7 @@
     </p:spTree>
     <p:extLst>
       <p:ext uri="{BB962C8B-B14F-4D97-AF65-F5344CB8AC3E}">
-        <p14:creationId xmlns="" xmlns:p14="http://schemas.microsoft.com/office/powerpoint/2010/main" val="4244452049"/>
+        <p14:creationId xmlns:p14="http://schemas.microsoft.com/office/powerpoint/2010/main" xmlns="" val="4244452049"/>
       </p:ext>
     </p:extLst>
   </p:cSld>
@@ -2880,7 +2880,7 @@
     </p:spTree>
     <p:extLst>
       <p:ext uri="{BB962C8B-B14F-4D97-AF65-F5344CB8AC3E}">
-        <p14:creationId xmlns="" xmlns:p14="http://schemas.microsoft.com/office/powerpoint/2010/main" val="182241103"/>
+        <p14:creationId xmlns:p14="http://schemas.microsoft.com/office/powerpoint/2010/main" xmlns="" val="182241103"/>
       </p:ext>
     </p:extLst>
   </p:cSld>
@@ -3131,7 +3131,7 @@
     </p:spTree>
     <p:extLst>
       <p:ext uri="{BB962C8B-B14F-4D97-AF65-F5344CB8AC3E}">
-        <p14:creationId xmlns="" xmlns:p14="http://schemas.microsoft.com/office/powerpoint/2010/main" val="636156023"/>
+        <p14:creationId xmlns:p14="http://schemas.microsoft.com/office/powerpoint/2010/main" xmlns="" val="636156023"/>
       </p:ext>
     </p:extLst>
   </p:cSld>
@@ -4681,13 +4681,7 @@
               <a:rPr lang="it-IT" sz="1400" dirty="0" smtClean="0">
                 <a:cs typeface="Times New Roman" pitchFamily="18" charset="0"/>
               </a:rPr>
-              <a:t>[</a:t>
-            </a:r>
-            <a:r>
-              <a:rPr lang="it-IT" sz="1400" dirty="0" smtClean="0">
-                <a:cs typeface="Times New Roman" pitchFamily="18" charset="0"/>
-              </a:rPr>
-              <a:t>NF-FG</a:t>
+              <a:t>[NF-FG</a:t>
             </a:r>
             <a:r>
               <a:rPr lang="it-IT" sz="1400" dirty="0">
@@ -6985,7 +6979,7 @@
           <a:blip r:embed="rId3" cstate="print">
             <a:extLst>
               <a:ext uri="{28A0092B-C50C-407E-A947-70E740481C1C}">
-                <a14:useLocalDpi xmlns:a14="http://schemas.microsoft.com/office/drawing/2010/main" xmlns="" val="0"/>
+                <a14:useLocalDpi xmlns="" xmlns:a14="http://schemas.microsoft.com/office/drawing/2010/main" val="0"/>
               </a:ext>
             </a:extLst>
           </a:blip>
@@ -8718,131 +8712,6 @@
           </a:ln>
         </p:spPr>
       </p:cxnSp>
-      <p:sp>
-        <p:nvSpPr>
-          <p:cNvPr id="70" name="Rettangolo arrotondato 69"/>
-          <p:cNvSpPr/>
-          <p:nvPr/>
-        </p:nvSpPr>
-        <p:spPr>
-          <a:xfrm>
-            <a:off x="5000628" y="1357298"/>
-            <a:ext cx="1928794" cy="285752"/>
-          </a:xfrm>
-          <a:prstGeom prst="roundRect">
-            <a:avLst/>
-          </a:prstGeom>
-          <a:solidFill>
-            <a:schemeClr val="accent1">
-              <a:lumMod val="40000"/>
-              <a:lumOff val="60000"/>
-            </a:schemeClr>
-          </a:solidFill>
-          <a:ln w="9525">
-            <a:solidFill>
-              <a:schemeClr val="tx1"/>
-            </a:solidFill>
-          </a:ln>
-        </p:spPr>
-        <p:style>
-          <a:lnRef idx="2">
-            <a:schemeClr val="accent1">
-              <a:shade val="50000"/>
-            </a:schemeClr>
-          </a:lnRef>
-          <a:fillRef idx="1">
-            <a:schemeClr val="accent1"/>
-          </a:fillRef>
-          <a:effectRef idx="0">
-            <a:schemeClr val="accent1"/>
-          </a:effectRef>
-          <a:fontRef idx="minor">
-            <a:schemeClr val="lt1"/>
-          </a:fontRef>
-        </p:style>
-        <p:txBody>
-          <a:bodyPr rtlCol="0" anchor="ctr"/>
-          <a:lstStyle/>
-          <a:p>
-            <a:pPr algn="ctr"/>
-            <a:r>
-              <a:rPr lang="it-IT" sz="1400" dirty="0" err="1" smtClean="0">
-                <a:solidFill>
-                  <a:schemeClr val="tx1"/>
-                </a:solidFill>
-              </a:rPr>
-              <a:t>VNF-optimizer</a:t>
-            </a:r>
-            <a:endParaRPr lang="it-IT" sz="1400" dirty="0">
-              <a:solidFill>
-                <a:schemeClr val="tx1"/>
-              </a:solidFill>
-            </a:endParaRPr>
-          </a:p>
-        </p:txBody>
-      </p:sp>
-      <p:sp>
-        <p:nvSpPr>
-          <p:cNvPr id="71" name="Rettangolo arrotondato 70"/>
-          <p:cNvSpPr/>
-          <p:nvPr/>
-        </p:nvSpPr>
-        <p:spPr>
-          <a:xfrm>
-            <a:off x="571504" y="1357298"/>
-            <a:ext cx="1928794" cy="285752"/>
-          </a:xfrm>
-          <a:prstGeom prst="roundRect">
-            <a:avLst/>
-          </a:prstGeom>
-          <a:solidFill>
-            <a:schemeClr val="bg1">
-              <a:lumMod val="75000"/>
-            </a:schemeClr>
-          </a:solidFill>
-          <a:ln w="9525">
-            <a:solidFill>
-              <a:schemeClr val="tx1"/>
-            </a:solidFill>
-          </a:ln>
-        </p:spPr>
-        <p:style>
-          <a:lnRef idx="2">
-            <a:schemeClr val="accent1">
-              <a:shade val="50000"/>
-            </a:schemeClr>
-          </a:lnRef>
-          <a:fillRef idx="1">
-            <a:schemeClr val="accent1"/>
-          </a:fillRef>
-          <a:effectRef idx="0">
-            <a:schemeClr val="accent1"/>
-          </a:effectRef>
-          <a:fontRef idx="minor">
-            <a:schemeClr val="lt1"/>
-          </a:fontRef>
-        </p:style>
-        <p:txBody>
-          <a:bodyPr rtlCol="0" anchor="ctr"/>
-          <a:lstStyle/>
-          <a:p>
-            <a:pPr algn="ctr"/>
-            <a:r>
-              <a:rPr lang="it-IT" sz="1400" dirty="0" err="1" smtClean="0">
-                <a:solidFill>
-                  <a:schemeClr val="tx1"/>
-                </a:solidFill>
-              </a:rPr>
-              <a:t>Placement-optimizer</a:t>
-            </a:r>
-            <a:endParaRPr lang="it-IT" sz="1400" dirty="0">
-              <a:solidFill>
-                <a:schemeClr val="tx1"/>
-              </a:solidFill>
-            </a:endParaRPr>
-          </a:p>
-        </p:txBody>
-      </p:sp>
     </p:spTree>
   </p:cSld>
   <p:clrMapOvr>
@@ -11034,7 +10903,7 @@
   <a:extraClrSchemeLst/>
   <a:extLst>
     <a:ext uri="{05A4C25C-085E-4340-85A3-A5531E510DB2}">
-      <thm15:themeFamily xmlns="" xmlns:thm15="http://schemas.microsoft.com/office/thememl/2012/main" name="Office Theme" id="{62F939B6-93AF-4DB8-9C6B-D6C7DFDC589F}" vid="{4A3C46E8-61CC-4603-A589-7422A47A8E4A}"/>
+      <thm15:themeFamily xmlns:thm15="http://schemas.microsoft.com/office/thememl/2012/main" xmlns="" name="Office Theme" id="{62F939B6-93AF-4DB8-9C6B-D6C7DFDC589F}" vid="{4A3C46E8-61CC-4603-A589-7422A47A8E4A}"/>
     </a:ext>
   </a:extLst>
 </a:theme>
@@ -11295,7 +11164,7 @@
   <a:extraClrSchemeLst/>
   <a:extLst>
     <a:ext uri="{05A4C25C-085E-4340-85A3-A5531E510DB2}">
-      <thm15:themeFamily xmlns="" xmlns:thm15="http://schemas.microsoft.com/office/thememl/2012/main" name="Office Theme" id="{62F939B6-93AF-4DB8-9C6B-D6C7DFDC589F}" vid="{4A3C46E8-61CC-4603-A589-7422A47A8E4A}"/>
+      <thm15:themeFamily xmlns:thm15="http://schemas.microsoft.com/office/thememl/2012/main" xmlns="" name="Office Theme" id="{62F939B6-93AF-4DB8-9C6B-D6C7DFDC589F}" vid="{4A3C46E8-61CC-4603-A589-7422A47A8E4A}"/>
     </a:ext>
   </a:extLst>
 </a:theme>

</xml_diff>

<commit_message>
Update pictures source file
</commit_message>
<xml_diff>
--- a/images/Pictures.pptx
+++ b/images/Pictures.pptx
@@ -5,12 +5,13 @@
     <p:sldMasterId id="2147483660" r:id="rId1"/>
   </p:sldMasterIdLst>
   <p:notesMasterIdLst>
-    <p:notesMasterId r:id="rId5"/>
+    <p:notesMasterId r:id="rId6"/>
   </p:notesMasterIdLst>
   <p:sldIdLst>
     <p:sldId id="303" r:id="rId2"/>
     <p:sldId id="301" r:id="rId3"/>
     <p:sldId id="302" r:id="rId4"/>
+    <p:sldId id="304" r:id="rId5"/>
   </p:sldIdLst>
   <p:sldSz cx="9144000" cy="6858000" type="screen4x3"/>
   <p:notesSz cx="6858000" cy="9144000"/>
@@ -111,7 +112,7 @@
   </p:defaultTextStyle>
   <p:extLst>
     <p:ext uri="{EFAFB233-063F-42B5-8137-9DF3F51BA10A}">
-      <p15:sldGuideLst xmlns:p15="http://schemas.microsoft.com/office/powerpoint/2012/main" xmlns="">
+      <p15:sldGuideLst xmlns:p15="http://schemas.microsoft.com/office/powerpoint/2012/main">
         <p15:guide id="1" orient="horz" pos="2160">
           <p15:clr>
             <a:srgbClr val="A4A3A4"/>
@@ -211,7 +212,7 @@
             <a:fld id="{581B34DE-D9D5-401C-8A45-6D5600A3470E}" type="datetimeFigureOut">
               <a:rPr lang="en-US" smtClean="0"/>
               <a:pPr/>
-              <a:t>3/1/2016</a:t>
+              <a:t>3/2/2016</a:t>
             </a:fld>
             <a:endParaRPr lang="en-US"/>
           </a:p>
@@ -380,7 +381,7 @@
     </p:spTree>
     <p:extLst>
       <p:ext uri="{BB962C8B-B14F-4D97-AF65-F5344CB8AC3E}">
-        <p14:creationId xmlns:p14="http://schemas.microsoft.com/office/powerpoint/2010/main" xmlns="" val="1725926972"/>
+        <p14:creationId xmlns:p14="http://schemas.microsoft.com/office/powerpoint/2010/main" val="1725926972"/>
       </p:ext>
     </p:extLst>
   </p:cSld>
@@ -698,7 +699,7 @@
             <a:fld id="{3D599013-5C43-42B3-986A-3CF64AAE02B4}" type="datetimeFigureOut">
               <a:rPr lang="en-US" smtClean="0"/>
               <a:pPr/>
-              <a:t>3/1/2016</a:t>
+              <a:t>3/2/2016</a:t>
             </a:fld>
             <a:endParaRPr lang="en-US"/>
           </a:p>
@@ -750,7 +751,7 @@
     </p:spTree>
     <p:extLst>
       <p:ext uri="{BB962C8B-B14F-4D97-AF65-F5344CB8AC3E}">
-        <p14:creationId xmlns:p14="http://schemas.microsoft.com/office/powerpoint/2010/main" xmlns="" val="528191723"/>
+        <p14:creationId xmlns:p14="http://schemas.microsoft.com/office/powerpoint/2010/main" val="528191723"/>
       </p:ext>
     </p:extLst>
   </p:cSld>
@@ -870,7 +871,7 @@
             <a:fld id="{3D599013-5C43-42B3-986A-3CF64AAE02B4}" type="datetimeFigureOut">
               <a:rPr lang="en-US" smtClean="0"/>
               <a:pPr/>
-              <a:t>3/1/2016</a:t>
+              <a:t>3/2/2016</a:t>
             </a:fld>
             <a:endParaRPr lang="en-US"/>
           </a:p>
@@ -922,7 +923,7 @@
     </p:spTree>
     <p:extLst>
       <p:ext uri="{BB962C8B-B14F-4D97-AF65-F5344CB8AC3E}">
-        <p14:creationId xmlns:p14="http://schemas.microsoft.com/office/powerpoint/2010/main" xmlns="" val="3985316557"/>
+        <p14:creationId xmlns:p14="http://schemas.microsoft.com/office/powerpoint/2010/main" val="3985316557"/>
       </p:ext>
     </p:extLst>
   </p:cSld>
@@ -1052,7 +1053,7 @@
             <a:fld id="{3D599013-5C43-42B3-986A-3CF64AAE02B4}" type="datetimeFigureOut">
               <a:rPr lang="en-US" smtClean="0"/>
               <a:pPr/>
-              <a:t>3/1/2016</a:t>
+              <a:t>3/2/2016</a:t>
             </a:fld>
             <a:endParaRPr lang="en-US"/>
           </a:p>
@@ -1104,7 +1105,7 @@
     </p:spTree>
     <p:extLst>
       <p:ext uri="{BB962C8B-B14F-4D97-AF65-F5344CB8AC3E}">
-        <p14:creationId xmlns:p14="http://schemas.microsoft.com/office/powerpoint/2010/main" xmlns="" val="2433128099"/>
+        <p14:creationId xmlns:p14="http://schemas.microsoft.com/office/powerpoint/2010/main" val="2433128099"/>
       </p:ext>
     </p:extLst>
   </p:cSld>
@@ -1224,7 +1225,7 @@
             <a:fld id="{3D599013-5C43-42B3-986A-3CF64AAE02B4}" type="datetimeFigureOut">
               <a:rPr lang="en-US" smtClean="0"/>
               <a:pPr/>
-              <a:t>3/1/2016</a:t>
+              <a:t>3/2/2016</a:t>
             </a:fld>
             <a:endParaRPr lang="en-US"/>
           </a:p>
@@ -1276,7 +1277,7 @@
     </p:spTree>
     <p:extLst>
       <p:ext uri="{BB962C8B-B14F-4D97-AF65-F5344CB8AC3E}">
-        <p14:creationId xmlns:p14="http://schemas.microsoft.com/office/powerpoint/2010/main" xmlns="" val="1291509717"/>
+        <p14:creationId xmlns:p14="http://schemas.microsoft.com/office/powerpoint/2010/main" val="1291509717"/>
       </p:ext>
     </p:extLst>
   </p:cSld>
@@ -1470,7 +1471,7 @@
             <a:fld id="{3D599013-5C43-42B3-986A-3CF64AAE02B4}" type="datetimeFigureOut">
               <a:rPr lang="en-US" smtClean="0"/>
               <a:pPr/>
-              <a:t>3/1/2016</a:t>
+              <a:t>3/2/2016</a:t>
             </a:fld>
             <a:endParaRPr lang="en-US"/>
           </a:p>
@@ -1522,7 +1523,7 @@
     </p:spTree>
     <p:extLst>
       <p:ext uri="{BB962C8B-B14F-4D97-AF65-F5344CB8AC3E}">
-        <p14:creationId xmlns:p14="http://schemas.microsoft.com/office/powerpoint/2010/main" xmlns="" val="3757756728"/>
+        <p14:creationId xmlns:p14="http://schemas.microsoft.com/office/powerpoint/2010/main" val="3757756728"/>
       </p:ext>
     </p:extLst>
   </p:cSld>
@@ -1704,7 +1705,7 @@
             <a:fld id="{3D599013-5C43-42B3-986A-3CF64AAE02B4}" type="datetimeFigureOut">
               <a:rPr lang="en-US" smtClean="0"/>
               <a:pPr/>
-              <a:t>3/1/2016</a:t>
+              <a:t>3/2/2016</a:t>
             </a:fld>
             <a:endParaRPr lang="en-US"/>
           </a:p>
@@ -1756,7 +1757,7 @@
     </p:spTree>
     <p:extLst>
       <p:ext uri="{BB962C8B-B14F-4D97-AF65-F5344CB8AC3E}">
-        <p14:creationId xmlns:p14="http://schemas.microsoft.com/office/powerpoint/2010/main" xmlns="" val="700055631"/>
+        <p14:creationId xmlns:p14="http://schemas.microsoft.com/office/powerpoint/2010/main" val="700055631"/>
       </p:ext>
     </p:extLst>
   </p:cSld>
@@ -2073,7 +2074,7 @@
             <a:fld id="{3D599013-5C43-42B3-986A-3CF64AAE02B4}" type="datetimeFigureOut">
               <a:rPr lang="en-US" smtClean="0"/>
               <a:pPr/>
-              <a:t>3/1/2016</a:t>
+              <a:t>3/2/2016</a:t>
             </a:fld>
             <a:endParaRPr lang="en-US"/>
           </a:p>
@@ -2125,7 +2126,7 @@
     </p:spTree>
     <p:extLst>
       <p:ext uri="{BB962C8B-B14F-4D97-AF65-F5344CB8AC3E}">
-        <p14:creationId xmlns:p14="http://schemas.microsoft.com/office/powerpoint/2010/main" xmlns="" val="2359288918"/>
+        <p14:creationId xmlns:p14="http://schemas.microsoft.com/office/powerpoint/2010/main" val="2359288918"/>
       </p:ext>
     </p:extLst>
   </p:cSld>
@@ -2193,7 +2194,7 @@
             <a:fld id="{3D599013-5C43-42B3-986A-3CF64AAE02B4}" type="datetimeFigureOut">
               <a:rPr lang="en-US" smtClean="0"/>
               <a:pPr/>
-              <a:t>3/1/2016</a:t>
+              <a:t>3/2/2016</a:t>
             </a:fld>
             <a:endParaRPr lang="en-US"/>
           </a:p>
@@ -2245,7 +2246,7 @@
     </p:spTree>
     <p:extLst>
       <p:ext uri="{BB962C8B-B14F-4D97-AF65-F5344CB8AC3E}">
-        <p14:creationId xmlns:p14="http://schemas.microsoft.com/office/powerpoint/2010/main" xmlns="" val="1245979004"/>
+        <p14:creationId xmlns:p14="http://schemas.microsoft.com/office/powerpoint/2010/main" val="1245979004"/>
       </p:ext>
     </p:extLst>
   </p:cSld>
@@ -2290,7 +2291,7 @@
             <a:fld id="{3D599013-5C43-42B3-986A-3CF64AAE02B4}" type="datetimeFigureOut">
               <a:rPr lang="en-US" smtClean="0"/>
               <a:pPr/>
-              <a:t>3/1/2016</a:t>
+              <a:t>3/2/2016</a:t>
             </a:fld>
             <a:endParaRPr lang="en-US"/>
           </a:p>
@@ -2342,7 +2343,7 @@
     </p:spTree>
     <p:extLst>
       <p:ext uri="{BB962C8B-B14F-4D97-AF65-F5344CB8AC3E}">
-        <p14:creationId xmlns:p14="http://schemas.microsoft.com/office/powerpoint/2010/main" xmlns="" val="2472079974"/>
+        <p14:creationId xmlns:p14="http://schemas.microsoft.com/office/powerpoint/2010/main" val="2472079974"/>
       </p:ext>
     </p:extLst>
   </p:cSld>
@@ -2569,7 +2570,7 @@
             <a:fld id="{3D599013-5C43-42B3-986A-3CF64AAE02B4}" type="datetimeFigureOut">
               <a:rPr lang="en-US" smtClean="0"/>
               <a:pPr/>
-              <a:t>3/1/2016</a:t>
+              <a:t>3/2/2016</a:t>
             </a:fld>
             <a:endParaRPr lang="en-US"/>
           </a:p>
@@ -2621,7 +2622,7 @@
     </p:spTree>
     <p:extLst>
       <p:ext uri="{BB962C8B-B14F-4D97-AF65-F5344CB8AC3E}">
-        <p14:creationId xmlns:p14="http://schemas.microsoft.com/office/powerpoint/2010/main" xmlns="" val="4244452049"/>
+        <p14:creationId xmlns:p14="http://schemas.microsoft.com/office/powerpoint/2010/main" val="4244452049"/>
       </p:ext>
     </p:extLst>
   </p:cSld>
@@ -2828,7 +2829,7 @@
             <a:fld id="{3D599013-5C43-42B3-986A-3CF64AAE02B4}" type="datetimeFigureOut">
               <a:rPr lang="en-US" smtClean="0"/>
               <a:pPr/>
-              <a:t>3/1/2016</a:t>
+              <a:t>3/2/2016</a:t>
             </a:fld>
             <a:endParaRPr lang="en-US"/>
           </a:p>
@@ -2880,7 +2881,7 @@
     </p:spTree>
     <p:extLst>
       <p:ext uri="{BB962C8B-B14F-4D97-AF65-F5344CB8AC3E}">
-        <p14:creationId xmlns:p14="http://schemas.microsoft.com/office/powerpoint/2010/main" xmlns="" val="182241103"/>
+        <p14:creationId xmlns:p14="http://schemas.microsoft.com/office/powerpoint/2010/main" val="182241103"/>
       </p:ext>
     </p:extLst>
   </p:cSld>
@@ -3043,7 +3044,7 @@
             <a:fld id="{3D599013-5C43-42B3-986A-3CF64AAE02B4}" type="datetimeFigureOut">
               <a:rPr lang="en-US" smtClean="0"/>
               <a:pPr/>
-              <a:t>3/1/2016</a:t>
+              <a:t>3/2/2016</a:t>
             </a:fld>
             <a:endParaRPr lang="en-US"/>
           </a:p>
@@ -3131,7 +3132,7 @@
     </p:spTree>
     <p:extLst>
       <p:ext uri="{BB962C8B-B14F-4D97-AF65-F5344CB8AC3E}">
-        <p14:creationId xmlns:p14="http://schemas.microsoft.com/office/powerpoint/2010/main" xmlns="" val="636156023"/>
+        <p14:creationId xmlns:p14="http://schemas.microsoft.com/office/powerpoint/2010/main" val="636156023"/>
       </p:ext>
     </p:extLst>
   </p:cSld>
@@ -6979,7 +6980,7 @@
           <a:blip r:embed="rId3" cstate="print">
             <a:extLst>
               <a:ext uri="{28A0092B-C50C-407E-A947-70E740481C1C}">
-                <a14:useLocalDpi xmlns="" xmlns:a14="http://schemas.microsoft.com/office/drawing/2010/main" val="0"/>
+                <a14:useLocalDpi xmlns:a14="http://schemas.microsoft.com/office/drawing/2010/main" val="0"/>
               </a:ext>
             </a:extLst>
           </a:blip>
@@ -9448,8 +9449,20 @@
                 <a:tableStyleId>{5C22544A-7EE6-4342-B048-85BDC9FD1C3A}</a:tableStyleId>
               </a:tblPr>
               <a:tblGrid>
-                <a:gridCol w="1250165"/>
-                <a:gridCol w="1250165"/>
+                <a:gridCol w="1250165">
+                  <a:extLst>
+                    <a:ext uri="{9D8B030D-6E8A-4147-A177-3AD203B41FA5}">
+                      <a16:colId xmlns:a16="http://schemas.microsoft.com/office/drawing/2014/main" val="20000"/>
+                    </a:ext>
+                  </a:extLst>
+                </a:gridCol>
+                <a:gridCol w="1250165">
+                  <a:extLst>
+                    <a:ext uri="{9D8B030D-6E8A-4147-A177-3AD203B41FA5}">
+                      <a16:colId xmlns:a16="http://schemas.microsoft.com/office/drawing/2014/main" val="20001"/>
+                    </a:ext>
+                  </a:extLst>
+                </a:gridCol>
               </a:tblGrid>
               <a:tr h="357190">
                 <a:tc>
@@ -9480,6 +9493,11 @@
                   </a:txBody>
                   <a:tcPr/>
                 </a:tc>
+                <a:extLst>
+                  <a:ext uri="{0D108BD9-81ED-4DB2-BD59-A6C34878D82A}">
+                    <a16:rowId xmlns:a16="http://schemas.microsoft.com/office/drawing/2014/main" val="10000"/>
+                  </a:ext>
+                </a:extLst>
               </a:tr>
               <a:tr h="357190">
                 <a:tc>
@@ -9522,6 +9540,11 @@
                   </a:txBody>
                   <a:tcPr/>
                 </a:tc>
+                <a:extLst>
+                  <a:ext uri="{0D108BD9-81ED-4DB2-BD59-A6C34878D82A}">
+                    <a16:rowId xmlns:a16="http://schemas.microsoft.com/office/drawing/2014/main" val="10001"/>
+                  </a:ext>
+                </a:extLst>
               </a:tr>
               <a:tr h="357190">
                 <a:tc>
@@ -9568,6 +9591,11 @@
                   </a:txBody>
                   <a:tcPr/>
                 </a:tc>
+                <a:extLst>
+                  <a:ext uri="{0D108BD9-81ED-4DB2-BD59-A6C34878D82A}">
+                    <a16:rowId xmlns:a16="http://schemas.microsoft.com/office/drawing/2014/main" val="10002"/>
+                  </a:ext>
+                </a:extLst>
               </a:tr>
               <a:tr h="357190">
                 <a:tc>
@@ -9610,6 +9638,11 @@
                   </a:txBody>
                   <a:tcPr/>
                 </a:tc>
+                <a:extLst>
+                  <a:ext uri="{0D108BD9-81ED-4DB2-BD59-A6C34878D82A}">
+                    <a16:rowId xmlns:a16="http://schemas.microsoft.com/office/drawing/2014/main" val="10003"/>
+                  </a:ext>
+                </a:extLst>
               </a:tr>
               <a:tr h="357190">
                 <a:tc>
@@ -9656,6 +9689,11 @@
                   </a:txBody>
                   <a:tcPr/>
                 </a:tc>
+                <a:extLst>
+                  <a:ext uri="{0D108BD9-81ED-4DB2-BD59-A6C34878D82A}">
+                    <a16:rowId xmlns:a16="http://schemas.microsoft.com/office/drawing/2014/main" val="10004"/>
+                  </a:ext>
+                </a:extLst>
               </a:tr>
             </a:tbl>
           </a:graphicData>
@@ -9752,8 +9790,20 @@
                 <a:tableStyleId>{5C22544A-7EE6-4342-B048-85BDC9FD1C3A}</a:tableStyleId>
               </a:tblPr>
               <a:tblGrid>
-                <a:gridCol w="1250165"/>
-                <a:gridCol w="1250165"/>
+                <a:gridCol w="1250165">
+                  <a:extLst>
+                    <a:ext uri="{9D8B030D-6E8A-4147-A177-3AD203B41FA5}">
+                      <a16:colId xmlns:a16="http://schemas.microsoft.com/office/drawing/2014/main" val="20000"/>
+                    </a:ext>
+                  </a:extLst>
+                </a:gridCol>
+                <a:gridCol w="1250165">
+                  <a:extLst>
+                    <a:ext uri="{9D8B030D-6E8A-4147-A177-3AD203B41FA5}">
+                      <a16:colId xmlns:a16="http://schemas.microsoft.com/office/drawing/2014/main" val="20001"/>
+                    </a:ext>
+                  </a:extLst>
+                </a:gridCol>
               </a:tblGrid>
               <a:tr h="357190">
                 <a:tc>
@@ -9784,6 +9834,11 @@
                   </a:txBody>
                   <a:tcPr/>
                 </a:tc>
+                <a:extLst>
+                  <a:ext uri="{0D108BD9-81ED-4DB2-BD59-A6C34878D82A}">
+                    <a16:rowId xmlns:a16="http://schemas.microsoft.com/office/drawing/2014/main" val="10000"/>
+                  </a:ext>
+                </a:extLst>
               </a:tr>
               <a:tr h="357190">
                 <a:tc>
@@ -9826,6 +9881,11 @@
                   </a:txBody>
                   <a:tcPr/>
                 </a:tc>
+                <a:extLst>
+                  <a:ext uri="{0D108BD9-81ED-4DB2-BD59-A6C34878D82A}">
+                    <a16:rowId xmlns:a16="http://schemas.microsoft.com/office/drawing/2014/main" val="10001"/>
+                  </a:ext>
+                </a:extLst>
               </a:tr>
               <a:tr h="357190">
                 <a:tc>
@@ -9872,6 +9932,11 @@
                   </a:txBody>
                   <a:tcPr/>
                 </a:tc>
+                <a:extLst>
+                  <a:ext uri="{0D108BD9-81ED-4DB2-BD59-A6C34878D82A}">
+                    <a16:rowId xmlns:a16="http://schemas.microsoft.com/office/drawing/2014/main" val="10002"/>
+                  </a:ext>
+                </a:extLst>
               </a:tr>
               <a:tr h="357190">
                 <a:tc>
@@ -9914,6 +9979,11 @@
                   </a:txBody>
                   <a:tcPr/>
                 </a:tc>
+                <a:extLst>
+                  <a:ext uri="{0D108BD9-81ED-4DB2-BD59-A6C34878D82A}">
+                    <a16:rowId xmlns:a16="http://schemas.microsoft.com/office/drawing/2014/main" val="10003"/>
+                  </a:ext>
+                </a:extLst>
               </a:tr>
               <a:tr h="357190">
                 <a:tc>
@@ -9960,6 +10030,11 @@
                   </a:txBody>
                   <a:tcPr/>
                 </a:tc>
+                <a:extLst>
+                  <a:ext uri="{0D108BD9-81ED-4DB2-BD59-A6C34878D82A}">
+                    <a16:rowId xmlns:a16="http://schemas.microsoft.com/office/drawing/2014/main" val="10004"/>
+                  </a:ext>
+                </a:extLst>
               </a:tr>
             </a:tbl>
           </a:graphicData>
@@ -10579,6 +10654,1053 @@
   <p:clrMapOvr>
     <a:masterClrMapping/>
   </p:clrMapOvr>
+</p:sld>
+</file>
+
+<file path=ppt/slides/slide4.xml><?xml version="1.0" encoding="utf-8"?>
+<p:sld xmlns:a="http://schemas.openxmlformats.org/drawingml/2006/main" xmlns:r="http://schemas.openxmlformats.org/officeDocument/2006/relationships" xmlns:p="http://schemas.openxmlformats.org/presentationml/2006/main">
+  <p:cSld>
+    <p:spTree>
+      <p:nvGrpSpPr>
+        <p:cNvPr id="1" name=""/>
+        <p:cNvGrpSpPr/>
+        <p:nvPr/>
+      </p:nvGrpSpPr>
+      <p:grpSpPr>
+        <a:xfrm>
+          <a:off x="0" y="0"/>
+          <a:ext cx="0" cy="0"/>
+          <a:chOff x="0" y="0"/>
+          <a:chExt cx="0" cy="0"/>
+        </a:xfrm>
+      </p:grpSpPr>
+      <p:sp>
+        <p:nvSpPr>
+          <p:cNvPr id="19" name="Nuvola 18"/>
+          <p:cNvSpPr/>
+          <p:nvPr/>
+        </p:nvSpPr>
+        <p:spPr>
+          <a:xfrm>
+            <a:off x="3338360" y="2360736"/>
+            <a:ext cx="2032390" cy="1199466"/>
+          </a:xfrm>
+          <a:prstGeom prst="cloud">
+            <a:avLst/>
+          </a:prstGeom>
+          <a:gradFill>
+            <a:gsLst>
+              <a:gs pos="0">
+                <a:schemeClr val="accent1">
+                  <a:lumMod val="5000"/>
+                  <a:lumOff val="95000"/>
+                </a:schemeClr>
+              </a:gs>
+              <a:gs pos="74000">
+                <a:schemeClr val="accent1">
+                  <a:lumMod val="45000"/>
+                  <a:lumOff val="55000"/>
+                </a:schemeClr>
+              </a:gs>
+              <a:gs pos="83000">
+                <a:schemeClr val="accent1">
+                  <a:lumMod val="45000"/>
+                  <a:lumOff val="55000"/>
+                </a:schemeClr>
+              </a:gs>
+              <a:gs pos="100000">
+                <a:schemeClr val="accent1">
+                  <a:lumMod val="30000"/>
+                  <a:lumOff val="70000"/>
+                </a:schemeClr>
+              </a:gs>
+            </a:gsLst>
+            <a:lin ang="5400000" scaled="1"/>
+          </a:gradFill>
+        </p:spPr>
+        <p:style>
+          <a:lnRef idx="2">
+            <a:schemeClr val="accent1">
+              <a:shade val="50000"/>
+            </a:schemeClr>
+          </a:lnRef>
+          <a:fillRef idx="1">
+            <a:schemeClr val="accent1"/>
+          </a:fillRef>
+          <a:effectRef idx="0">
+            <a:schemeClr val="accent1"/>
+          </a:effectRef>
+          <a:fontRef idx="minor">
+            <a:schemeClr val="lt1"/>
+          </a:fontRef>
+        </p:style>
+        <p:txBody>
+          <a:bodyPr rtlCol="0" anchor="ctr"/>
+          <a:lstStyle/>
+          <a:p>
+            <a:pPr algn="ctr"/>
+            <a:endParaRPr lang="en-US">
+              <a:latin typeface="Arial" panose="020B0604020202020204" pitchFamily="34" charset="0"/>
+              <a:cs typeface="Arial" panose="020B0604020202020204" pitchFamily="34" charset="0"/>
+            </a:endParaRPr>
+          </a:p>
+        </p:txBody>
+      </p:sp>
+      <p:sp>
+        <p:nvSpPr>
+          <p:cNvPr id="8" name="Cilindro 7"/>
+          <p:cNvSpPr/>
+          <p:nvPr/>
+        </p:nvSpPr>
+        <p:spPr>
+          <a:xfrm rot="5400000">
+            <a:off x="4278526" y="1645791"/>
+            <a:ext cx="363052" cy="2727121"/>
+          </a:xfrm>
+          <a:prstGeom prst="can">
+            <a:avLst/>
+          </a:prstGeom>
+        </p:spPr>
+        <p:style>
+          <a:lnRef idx="2">
+            <a:schemeClr val="accent1">
+              <a:shade val="50000"/>
+            </a:schemeClr>
+          </a:lnRef>
+          <a:fillRef idx="1">
+            <a:schemeClr val="accent1"/>
+          </a:fillRef>
+          <a:effectRef idx="0">
+            <a:schemeClr val="accent1"/>
+          </a:effectRef>
+          <a:fontRef idx="minor">
+            <a:schemeClr val="lt1"/>
+          </a:fontRef>
+        </p:style>
+        <p:txBody>
+          <a:bodyPr vert="vert270" rtlCol="0" anchor="ctr"/>
+          <a:lstStyle/>
+          <a:p>
+            <a:pPr algn="ctr"/>
+            <a:r>
+              <a:rPr lang="en-US" dirty="0" smtClean="0">
+                <a:latin typeface="Arial" panose="020B0604020202020204" pitchFamily="34" charset="0"/>
+                <a:cs typeface="Arial" panose="020B0604020202020204" pitchFamily="34" charset="0"/>
+              </a:rPr>
+              <a:t>IPsec tunnel</a:t>
+            </a:r>
+            <a:endParaRPr lang="en-US" dirty="0">
+              <a:latin typeface="Arial" panose="020B0604020202020204" pitchFamily="34" charset="0"/>
+              <a:cs typeface="Arial" panose="020B0604020202020204" pitchFamily="34" charset="0"/>
+            </a:endParaRPr>
+          </a:p>
+        </p:txBody>
+      </p:sp>
+      <p:cxnSp>
+        <p:nvCxnSpPr>
+          <p:cNvPr id="10" name="Connettore 1 9"/>
+          <p:cNvCxnSpPr/>
+          <p:nvPr/>
+        </p:nvCxnSpPr>
+        <p:spPr>
+          <a:xfrm flipH="1" flipV="1">
+            <a:off x="1466850" y="2963313"/>
+            <a:ext cx="431903" cy="1"/>
+          </a:xfrm>
+          <a:prstGeom prst="line">
+            <a:avLst/>
+          </a:prstGeom>
+          <a:ln w="19050">
+            <a:solidFill>
+              <a:schemeClr val="tx1"/>
+            </a:solidFill>
+          </a:ln>
+        </p:spPr>
+        <p:style>
+          <a:lnRef idx="1">
+            <a:schemeClr val="accent1"/>
+          </a:lnRef>
+          <a:fillRef idx="0">
+            <a:schemeClr val="accent1"/>
+          </a:fillRef>
+          <a:effectRef idx="0">
+            <a:schemeClr val="accent1"/>
+          </a:effectRef>
+          <a:fontRef idx="minor">
+            <a:schemeClr val="tx1"/>
+          </a:fontRef>
+        </p:style>
+      </p:cxnSp>
+      <p:cxnSp>
+        <p:nvCxnSpPr>
+          <p:cNvPr id="12" name="Connettore 1 11"/>
+          <p:cNvCxnSpPr/>
+          <p:nvPr/>
+        </p:nvCxnSpPr>
+        <p:spPr>
+          <a:xfrm flipH="1">
+            <a:off x="1447800" y="2527300"/>
+            <a:ext cx="12700" cy="2159000"/>
+          </a:xfrm>
+          <a:prstGeom prst="line">
+            <a:avLst/>
+          </a:prstGeom>
+          <a:ln w="19050">
+            <a:solidFill>
+              <a:schemeClr val="tx1"/>
+            </a:solidFill>
+          </a:ln>
+        </p:spPr>
+        <p:style>
+          <a:lnRef idx="1">
+            <a:schemeClr val="accent1"/>
+          </a:lnRef>
+          <a:fillRef idx="0">
+            <a:schemeClr val="accent1"/>
+          </a:fillRef>
+          <a:effectRef idx="0">
+            <a:schemeClr val="accent1"/>
+          </a:effectRef>
+          <a:fontRef idx="minor">
+            <a:schemeClr val="tx1"/>
+          </a:fontRef>
+        </p:style>
+      </p:cxnSp>
+      <p:cxnSp>
+        <p:nvCxnSpPr>
+          <p:cNvPr id="16" name="Connettore 1 15"/>
+          <p:cNvCxnSpPr/>
+          <p:nvPr/>
+        </p:nvCxnSpPr>
+        <p:spPr>
+          <a:xfrm flipH="1" flipV="1">
+            <a:off x="1028597" y="4237792"/>
+            <a:ext cx="431903" cy="1"/>
+          </a:xfrm>
+          <a:prstGeom prst="line">
+            <a:avLst/>
+          </a:prstGeom>
+          <a:ln w="19050">
+            <a:solidFill>
+              <a:schemeClr val="tx1"/>
+            </a:solidFill>
+          </a:ln>
+        </p:spPr>
+        <p:style>
+          <a:lnRef idx="1">
+            <a:schemeClr val="accent1"/>
+          </a:lnRef>
+          <a:fillRef idx="0">
+            <a:schemeClr val="accent1"/>
+          </a:fillRef>
+          <a:effectRef idx="0">
+            <a:schemeClr val="accent1"/>
+          </a:effectRef>
+          <a:fontRef idx="minor">
+            <a:schemeClr val="tx1"/>
+          </a:fontRef>
+        </p:style>
+      </p:cxnSp>
+      <p:pic>
+        <p:nvPicPr>
+          <p:cNvPr id="17" name="Picture 280"/>
+          <p:cNvPicPr>
+            <a:picLocks noChangeAspect="1"/>
+          </p:cNvPicPr>
+          <p:nvPr/>
+        </p:nvPicPr>
+        <p:blipFill>
+          <a:blip r:embed="rId2" cstate="print">
+            <a:extLst>
+              <a:ext uri="{28A0092B-C50C-407E-A947-70E740481C1C}">
+                <a14:useLocalDpi xmlns:a14="http://schemas.microsoft.com/office/drawing/2010/main" val="0"/>
+              </a:ext>
+            </a:extLst>
+          </a:blip>
+          <a:stretch>
+            <a:fillRect/>
+          </a:stretch>
+        </p:blipFill>
+        <p:spPr>
+          <a:xfrm>
+            <a:off x="515280" y="3983837"/>
+            <a:ext cx="303716" cy="507910"/>
+          </a:xfrm>
+          <a:prstGeom prst="rect">
+            <a:avLst/>
+          </a:prstGeom>
+        </p:spPr>
+      </p:pic>
+      <p:sp>
+        <p:nvSpPr>
+          <p:cNvPr id="15" name="CasellaDiTesto 14"/>
+          <p:cNvSpPr txBox="1"/>
+          <p:nvPr/>
+        </p:nvSpPr>
+        <p:spPr>
+          <a:xfrm>
+            <a:off x="117946" y="2960469"/>
+            <a:ext cx="1338829" cy="646331"/>
+          </a:xfrm>
+          <a:prstGeom prst="rect">
+            <a:avLst/>
+          </a:prstGeom>
+          <a:noFill/>
+        </p:spPr>
+        <p:txBody>
+          <a:bodyPr wrap="none" rtlCol="0">
+            <a:spAutoFit/>
+          </a:bodyPr>
+          <a:lstStyle/>
+          <a:p>
+            <a:pPr algn="ctr"/>
+            <a:r>
+              <a:rPr lang="en-US" dirty="0" smtClean="0">
+                <a:latin typeface="Arial" panose="020B0604020202020204" pitchFamily="34" charset="0"/>
+                <a:cs typeface="Arial" panose="020B0604020202020204" pitchFamily="34" charset="0"/>
+              </a:rPr>
+              <a:t>Network</a:t>
+            </a:r>
+          </a:p>
+          <a:p>
+            <a:pPr algn="ctr"/>
+            <a:r>
+              <a:rPr lang="en-US" dirty="0" smtClean="0">
+                <a:latin typeface="Arial" panose="020B0604020202020204" pitchFamily="34" charset="0"/>
+                <a:cs typeface="Arial" panose="020B0604020202020204" pitchFamily="34" charset="0"/>
+              </a:rPr>
+              <a:t>10.0.1.0/24</a:t>
+            </a:r>
+            <a:endParaRPr lang="en-US" dirty="0">
+              <a:latin typeface="Arial" panose="020B0604020202020204" pitchFamily="34" charset="0"/>
+              <a:cs typeface="Arial" panose="020B0604020202020204" pitchFamily="34" charset="0"/>
+            </a:endParaRPr>
+          </a:p>
+        </p:txBody>
+      </p:sp>
+      <p:sp>
+        <p:nvSpPr>
+          <p:cNvPr id="18" name="Callout 10 17"/>
+          <p:cNvSpPr/>
+          <p:nvPr/>
+        </p:nvSpPr>
+        <p:spPr>
+          <a:xfrm>
+            <a:off x="2183527" y="2069511"/>
+            <a:ext cx="1154833" cy="315952"/>
+          </a:xfrm>
+          <a:prstGeom prst="callout2">
+            <a:avLst>
+              <a:gd name="adj1" fmla="val 18750"/>
+              <a:gd name="adj2" fmla="val -8333"/>
+              <a:gd name="adj3" fmla="val 18750"/>
+              <a:gd name="adj4" fmla="val -16667"/>
+              <a:gd name="adj5" fmla="val 246154"/>
+              <a:gd name="adj6" fmla="val -38394"/>
+            </a:avLst>
+          </a:prstGeom>
+          <a:solidFill>
+            <a:schemeClr val="tx2"/>
+          </a:solidFill>
+        </p:spPr>
+        <p:style>
+          <a:lnRef idx="2">
+            <a:schemeClr val="accent1">
+              <a:shade val="50000"/>
+            </a:schemeClr>
+          </a:lnRef>
+          <a:fillRef idx="1">
+            <a:schemeClr val="accent1"/>
+          </a:fillRef>
+          <a:effectRef idx="0">
+            <a:schemeClr val="accent1"/>
+          </a:effectRef>
+          <a:fontRef idx="minor">
+            <a:schemeClr val="lt1"/>
+          </a:fontRef>
+        </p:style>
+        <p:txBody>
+          <a:bodyPr rtlCol="0" anchor="ctr"/>
+          <a:lstStyle/>
+          <a:p>
+            <a:pPr algn="ctr"/>
+            <a:r>
+              <a:rPr lang="en-US" sz="1600" dirty="0" smtClean="0">
+                <a:latin typeface="Arial" panose="020B0604020202020204" pitchFamily="34" charset="0"/>
+                <a:cs typeface="Arial" panose="020B0604020202020204" pitchFamily="34" charset="0"/>
+              </a:rPr>
+              <a:t>10.0.1.1</a:t>
+            </a:r>
+            <a:endParaRPr lang="en-US" sz="1600" dirty="0">
+              <a:latin typeface="Arial" panose="020B0604020202020204" pitchFamily="34" charset="0"/>
+              <a:cs typeface="Arial" panose="020B0604020202020204" pitchFamily="34" charset="0"/>
+            </a:endParaRPr>
+          </a:p>
+        </p:txBody>
+      </p:sp>
+      <p:sp>
+        <p:nvSpPr>
+          <p:cNvPr id="20" name="Callout 10 19"/>
+          <p:cNvSpPr/>
+          <p:nvPr/>
+        </p:nvSpPr>
+        <p:spPr>
+          <a:xfrm>
+            <a:off x="3197522" y="3851916"/>
+            <a:ext cx="1154833" cy="628522"/>
+          </a:xfrm>
+          <a:prstGeom prst="callout2">
+            <a:avLst>
+              <a:gd name="adj1" fmla="val 18750"/>
+              <a:gd name="adj2" fmla="val -8333"/>
+              <a:gd name="adj3" fmla="val 18750"/>
+              <a:gd name="adj4" fmla="val -16667"/>
+              <a:gd name="adj5" fmla="val -109786"/>
+              <a:gd name="adj6" fmla="val -840"/>
+            </a:avLst>
+          </a:prstGeom>
+          <a:solidFill>
+            <a:schemeClr val="tx2"/>
+          </a:solidFill>
+        </p:spPr>
+        <p:style>
+          <a:lnRef idx="2">
+            <a:schemeClr val="accent1">
+              <a:shade val="50000"/>
+            </a:schemeClr>
+          </a:lnRef>
+          <a:fillRef idx="1">
+            <a:schemeClr val="accent1"/>
+          </a:fillRef>
+          <a:effectRef idx="0">
+            <a:schemeClr val="accent1"/>
+          </a:effectRef>
+          <a:fontRef idx="minor">
+            <a:schemeClr val="lt1"/>
+          </a:fontRef>
+        </p:style>
+        <p:txBody>
+          <a:bodyPr rtlCol="0" anchor="ctr"/>
+          <a:lstStyle/>
+          <a:p>
+            <a:pPr algn="ctr"/>
+            <a:r>
+              <a:rPr lang="en-US" sz="1600" dirty="0" smtClean="0">
+                <a:latin typeface="Arial" panose="020B0604020202020204" pitchFamily="34" charset="0"/>
+                <a:cs typeface="Arial" panose="020B0604020202020204" pitchFamily="34" charset="0"/>
+              </a:rPr>
+              <a:t>Public IP</a:t>
+            </a:r>
+          </a:p>
+          <a:p>
+            <a:pPr algn="ctr"/>
+            <a:r>
+              <a:rPr lang="en-US" sz="1600" dirty="0" err="1" smtClean="0">
+                <a:latin typeface="Arial" panose="020B0604020202020204" pitchFamily="34" charset="0"/>
+                <a:cs typeface="Arial" panose="020B0604020202020204" pitchFamily="34" charset="0"/>
+              </a:rPr>
+              <a:t>x.x.x.x</a:t>
+            </a:r>
+            <a:endParaRPr lang="en-US" sz="1600" dirty="0">
+              <a:latin typeface="Arial" panose="020B0604020202020204" pitchFamily="34" charset="0"/>
+              <a:cs typeface="Arial" panose="020B0604020202020204" pitchFamily="34" charset="0"/>
+            </a:endParaRPr>
+          </a:p>
+        </p:txBody>
+      </p:sp>
+      <p:sp>
+        <p:nvSpPr>
+          <p:cNvPr id="22" name="Callout 10 21"/>
+          <p:cNvSpPr/>
+          <p:nvPr/>
+        </p:nvSpPr>
+        <p:spPr>
+          <a:xfrm>
+            <a:off x="6025760" y="1778000"/>
+            <a:ext cx="1154833" cy="607463"/>
+          </a:xfrm>
+          <a:prstGeom prst="callout2">
+            <a:avLst>
+              <a:gd name="adj1" fmla="val 18750"/>
+              <a:gd name="adj2" fmla="val -8333"/>
+              <a:gd name="adj3" fmla="val 18750"/>
+              <a:gd name="adj4" fmla="val -16667"/>
+              <a:gd name="adj5" fmla="val 158716"/>
+              <a:gd name="adj6" fmla="val -28333"/>
+            </a:avLst>
+          </a:prstGeom>
+          <a:solidFill>
+            <a:schemeClr val="tx2"/>
+          </a:solidFill>
+        </p:spPr>
+        <p:style>
+          <a:lnRef idx="2">
+            <a:schemeClr val="accent1">
+              <a:shade val="50000"/>
+            </a:schemeClr>
+          </a:lnRef>
+          <a:fillRef idx="1">
+            <a:schemeClr val="accent1"/>
+          </a:fillRef>
+          <a:effectRef idx="0">
+            <a:schemeClr val="accent1"/>
+          </a:effectRef>
+          <a:fontRef idx="minor">
+            <a:schemeClr val="lt1"/>
+          </a:fontRef>
+        </p:style>
+        <p:txBody>
+          <a:bodyPr rtlCol="0" anchor="ctr"/>
+          <a:lstStyle/>
+          <a:p>
+            <a:pPr algn="ctr"/>
+            <a:r>
+              <a:rPr lang="en-US" sz="1600" dirty="0" smtClean="0">
+                <a:latin typeface="Arial" panose="020B0604020202020204" pitchFamily="34" charset="0"/>
+                <a:cs typeface="Arial" panose="020B0604020202020204" pitchFamily="34" charset="0"/>
+              </a:rPr>
+              <a:t>Public IP</a:t>
+            </a:r>
+          </a:p>
+          <a:p>
+            <a:pPr algn="ctr"/>
+            <a:r>
+              <a:rPr lang="en-US" sz="1600" dirty="0" err="1" smtClean="0">
+                <a:latin typeface="Arial" panose="020B0604020202020204" pitchFamily="34" charset="0"/>
+                <a:cs typeface="Arial" panose="020B0604020202020204" pitchFamily="34" charset="0"/>
+              </a:rPr>
+              <a:t>y.y.y.y</a:t>
+            </a:r>
+            <a:endParaRPr lang="en-US" sz="1600" dirty="0">
+              <a:latin typeface="Arial" panose="020B0604020202020204" pitchFamily="34" charset="0"/>
+              <a:cs typeface="Arial" panose="020B0604020202020204" pitchFamily="34" charset="0"/>
+            </a:endParaRPr>
+          </a:p>
+        </p:txBody>
+      </p:sp>
+      <p:cxnSp>
+        <p:nvCxnSpPr>
+          <p:cNvPr id="23" name="Connettore 1 22"/>
+          <p:cNvCxnSpPr/>
+          <p:nvPr/>
+        </p:nvCxnSpPr>
+        <p:spPr>
+          <a:xfrm flipH="1" flipV="1">
+            <a:off x="6988337" y="2960469"/>
+            <a:ext cx="431903" cy="1"/>
+          </a:xfrm>
+          <a:prstGeom prst="line">
+            <a:avLst/>
+          </a:prstGeom>
+          <a:ln w="19050">
+            <a:solidFill>
+              <a:schemeClr val="tx1"/>
+            </a:solidFill>
+          </a:ln>
+        </p:spPr>
+        <p:style>
+          <a:lnRef idx="1">
+            <a:schemeClr val="accent1"/>
+          </a:lnRef>
+          <a:fillRef idx="0">
+            <a:schemeClr val="accent1"/>
+          </a:fillRef>
+          <a:effectRef idx="0">
+            <a:schemeClr val="accent1"/>
+          </a:effectRef>
+          <a:fontRef idx="minor">
+            <a:schemeClr val="tx1"/>
+          </a:fontRef>
+        </p:style>
+      </p:cxnSp>
+      <p:cxnSp>
+        <p:nvCxnSpPr>
+          <p:cNvPr id="24" name="Connettore 1 23"/>
+          <p:cNvCxnSpPr/>
+          <p:nvPr/>
+        </p:nvCxnSpPr>
+        <p:spPr>
+          <a:xfrm flipH="1">
+            <a:off x="7407540" y="2524456"/>
+            <a:ext cx="12700" cy="2159000"/>
+          </a:xfrm>
+          <a:prstGeom prst="line">
+            <a:avLst/>
+          </a:prstGeom>
+          <a:ln w="19050">
+            <a:solidFill>
+              <a:schemeClr val="tx1"/>
+            </a:solidFill>
+          </a:ln>
+        </p:spPr>
+        <p:style>
+          <a:lnRef idx="1">
+            <a:schemeClr val="accent1"/>
+          </a:lnRef>
+          <a:fillRef idx="0">
+            <a:schemeClr val="accent1"/>
+          </a:fillRef>
+          <a:effectRef idx="0">
+            <a:schemeClr val="accent1"/>
+          </a:effectRef>
+          <a:fontRef idx="minor">
+            <a:schemeClr val="tx1"/>
+          </a:fontRef>
+        </p:style>
+      </p:cxnSp>
+      <p:cxnSp>
+        <p:nvCxnSpPr>
+          <p:cNvPr id="25" name="Connettore 1 24"/>
+          <p:cNvCxnSpPr/>
+          <p:nvPr/>
+        </p:nvCxnSpPr>
+        <p:spPr>
+          <a:xfrm flipH="1" flipV="1">
+            <a:off x="7413890" y="4237289"/>
+            <a:ext cx="431903" cy="1"/>
+          </a:xfrm>
+          <a:prstGeom prst="line">
+            <a:avLst/>
+          </a:prstGeom>
+          <a:ln w="19050">
+            <a:solidFill>
+              <a:schemeClr val="tx1"/>
+            </a:solidFill>
+          </a:ln>
+        </p:spPr>
+        <p:style>
+          <a:lnRef idx="1">
+            <a:schemeClr val="accent1"/>
+          </a:lnRef>
+          <a:fillRef idx="0">
+            <a:schemeClr val="accent1"/>
+          </a:fillRef>
+          <a:effectRef idx="0">
+            <a:schemeClr val="accent1"/>
+          </a:effectRef>
+          <a:fontRef idx="minor">
+            <a:schemeClr val="tx1"/>
+          </a:fontRef>
+        </p:style>
+      </p:cxnSp>
+      <p:pic>
+        <p:nvPicPr>
+          <p:cNvPr id="1028" name="Picture 4" descr="http://www.rw-designer.com/icon-image/7507-256x256x32.png"/>
+          <p:cNvPicPr>
+            <a:picLocks noChangeAspect="1" noChangeArrowheads="1"/>
+          </p:cNvPicPr>
+          <p:nvPr/>
+        </p:nvPicPr>
+        <p:blipFill>
+          <a:blip r:embed="rId3" cstate="print">
+            <a:extLst>
+              <a:ext uri="{28A0092B-C50C-407E-A947-70E740481C1C}">
+                <a14:useLocalDpi xmlns:a14="http://schemas.microsoft.com/office/drawing/2010/main" val="0"/>
+              </a:ext>
+            </a:extLst>
+          </a:blip>
+          <a:srcRect/>
+          <a:stretch>
+            <a:fillRect/>
+          </a:stretch>
+        </p:blipFill>
+        <p:spPr bwMode="auto">
+          <a:xfrm>
+            <a:off x="7852143" y="3860805"/>
+            <a:ext cx="822651" cy="822651"/>
+          </a:xfrm>
+          <a:prstGeom prst="rect">
+            <a:avLst/>
+          </a:prstGeom>
+          <a:noFill/>
+          <a:extLst>
+            <a:ext uri="{909E8E84-426E-40DD-AFC4-6F175D3DCCD1}">
+              <a14:hiddenFill xmlns:a14="http://schemas.microsoft.com/office/drawing/2010/main">
+                <a:solidFill>
+                  <a:srgbClr val="FFFFFF"/>
+                </a:solidFill>
+              </a14:hiddenFill>
+            </a:ext>
+          </a:extLst>
+        </p:spPr>
+      </p:pic>
+      <p:sp>
+        <p:nvSpPr>
+          <p:cNvPr id="28" name="CasellaDiTesto 27"/>
+          <p:cNvSpPr txBox="1"/>
+          <p:nvPr/>
+        </p:nvSpPr>
+        <p:spPr>
+          <a:xfrm>
+            <a:off x="7523011" y="2906825"/>
+            <a:ext cx="1338829" cy="646331"/>
+          </a:xfrm>
+          <a:prstGeom prst="rect">
+            <a:avLst/>
+          </a:prstGeom>
+          <a:noFill/>
+        </p:spPr>
+        <p:txBody>
+          <a:bodyPr wrap="none" rtlCol="0">
+            <a:spAutoFit/>
+          </a:bodyPr>
+          <a:lstStyle/>
+          <a:p>
+            <a:pPr algn="ctr"/>
+            <a:r>
+              <a:rPr lang="en-US" dirty="0" smtClean="0">
+                <a:latin typeface="Arial" panose="020B0604020202020204" pitchFamily="34" charset="0"/>
+                <a:cs typeface="Arial" panose="020B0604020202020204" pitchFamily="34" charset="0"/>
+              </a:rPr>
+              <a:t>Network</a:t>
+            </a:r>
+          </a:p>
+          <a:p>
+            <a:pPr algn="ctr"/>
+            <a:r>
+              <a:rPr lang="en-US" dirty="0" smtClean="0">
+                <a:latin typeface="Arial" panose="020B0604020202020204" pitchFamily="34" charset="0"/>
+                <a:cs typeface="Arial" panose="020B0604020202020204" pitchFamily="34" charset="0"/>
+              </a:rPr>
+              <a:t>10.0.2.0/24</a:t>
+            </a:r>
+            <a:endParaRPr lang="en-US" dirty="0">
+              <a:latin typeface="Arial" panose="020B0604020202020204" pitchFamily="34" charset="0"/>
+              <a:cs typeface="Arial" panose="020B0604020202020204" pitchFamily="34" charset="0"/>
+            </a:endParaRPr>
+          </a:p>
+        </p:txBody>
+      </p:sp>
+      <p:sp>
+        <p:nvSpPr>
+          <p:cNvPr id="30" name="Callout 10 29"/>
+          <p:cNvSpPr/>
+          <p:nvPr/>
+        </p:nvSpPr>
+        <p:spPr>
+          <a:xfrm>
+            <a:off x="5370750" y="3955712"/>
+            <a:ext cx="1154833" cy="315952"/>
+          </a:xfrm>
+          <a:prstGeom prst="callout2">
+            <a:avLst>
+              <a:gd name="adj1" fmla="val 34828"/>
+              <a:gd name="adj2" fmla="val 102739"/>
+              <a:gd name="adj3" fmla="val 34828"/>
+              <a:gd name="adj4" fmla="val 114200"/>
+              <a:gd name="adj5" fmla="val -301516"/>
+              <a:gd name="adj6" fmla="val 151747"/>
+            </a:avLst>
+          </a:prstGeom>
+          <a:solidFill>
+            <a:schemeClr val="tx2"/>
+          </a:solidFill>
+        </p:spPr>
+        <p:style>
+          <a:lnRef idx="2">
+            <a:schemeClr val="accent1">
+              <a:shade val="50000"/>
+            </a:schemeClr>
+          </a:lnRef>
+          <a:fillRef idx="1">
+            <a:schemeClr val="accent1"/>
+          </a:fillRef>
+          <a:effectRef idx="0">
+            <a:schemeClr val="accent1"/>
+          </a:effectRef>
+          <a:fontRef idx="minor">
+            <a:schemeClr val="lt1"/>
+          </a:fontRef>
+        </p:style>
+        <p:txBody>
+          <a:bodyPr rtlCol="0" anchor="ctr"/>
+          <a:lstStyle/>
+          <a:p>
+            <a:pPr algn="ctr"/>
+            <a:r>
+              <a:rPr lang="en-US" sz="1600" dirty="0" smtClean="0">
+                <a:latin typeface="Arial" panose="020B0604020202020204" pitchFamily="34" charset="0"/>
+                <a:cs typeface="Arial" panose="020B0604020202020204" pitchFamily="34" charset="0"/>
+              </a:rPr>
+              <a:t>10.0.2.1</a:t>
+            </a:r>
+          </a:p>
+        </p:txBody>
+      </p:sp>
+      <p:cxnSp>
+        <p:nvCxnSpPr>
+          <p:cNvPr id="29" name="Connettore 1 28"/>
+          <p:cNvCxnSpPr/>
+          <p:nvPr/>
+        </p:nvCxnSpPr>
+        <p:spPr>
+          <a:xfrm>
+            <a:off x="1028597" y="4074038"/>
+            <a:ext cx="635103" cy="0"/>
+          </a:xfrm>
+          <a:prstGeom prst="line">
+            <a:avLst/>
+          </a:prstGeom>
+          <a:ln w="38100">
+            <a:solidFill>
+              <a:schemeClr val="accent4"/>
+            </a:solidFill>
+          </a:ln>
+        </p:spPr>
+        <p:style>
+          <a:lnRef idx="1">
+            <a:schemeClr val="accent1"/>
+          </a:lnRef>
+          <a:fillRef idx="0">
+            <a:schemeClr val="accent1"/>
+          </a:fillRef>
+          <a:effectRef idx="0">
+            <a:schemeClr val="accent1"/>
+          </a:effectRef>
+          <a:fontRef idx="minor">
+            <a:schemeClr val="tx1"/>
+          </a:fontRef>
+        </p:style>
+      </p:cxnSp>
+      <p:cxnSp>
+        <p:nvCxnSpPr>
+          <p:cNvPr id="34" name="Connettore 1 33"/>
+          <p:cNvCxnSpPr/>
+          <p:nvPr/>
+        </p:nvCxnSpPr>
+        <p:spPr>
+          <a:xfrm flipH="1" flipV="1">
+            <a:off x="1640894" y="3098803"/>
+            <a:ext cx="6350" cy="975235"/>
+          </a:xfrm>
+          <a:prstGeom prst="line">
+            <a:avLst/>
+          </a:prstGeom>
+          <a:ln w="38100">
+            <a:solidFill>
+              <a:schemeClr val="accent4"/>
+            </a:solidFill>
+          </a:ln>
+        </p:spPr>
+        <p:style>
+          <a:lnRef idx="1">
+            <a:schemeClr val="accent1"/>
+          </a:lnRef>
+          <a:fillRef idx="0">
+            <a:schemeClr val="accent1"/>
+          </a:fillRef>
+          <a:effectRef idx="0">
+            <a:schemeClr val="accent1"/>
+          </a:effectRef>
+          <a:fontRef idx="minor">
+            <a:schemeClr val="tx1"/>
+          </a:fontRef>
+        </p:style>
+      </p:cxnSp>
+      <p:cxnSp>
+        <p:nvCxnSpPr>
+          <p:cNvPr id="38" name="Connettore 1 37"/>
+          <p:cNvCxnSpPr/>
+          <p:nvPr/>
+        </p:nvCxnSpPr>
+        <p:spPr>
+          <a:xfrm>
+            <a:off x="1640894" y="3100903"/>
+            <a:ext cx="5627807" cy="7218"/>
+          </a:xfrm>
+          <a:prstGeom prst="line">
+            <a:avLst/>
+          </a:prstGeom>
+          <a:ln w="38100">
+            <a:solidFill>
+              <a:schemeClr val="accent4"/>
+            </a:solidFill>
+          </a:ln>
+        </p:spPr>
+        <p:style>
+          <a:lnRef idx="1">
+            <a:schemeClr val="accent1"/>
+          </a:lnRef>
+          <a:fillRef idx="0">
+            <a:schemeClr val="accent1"/>
+          </a:fillRef>
+          <a:effectRef idx="0">
+            <a:schemeClr val="accent1"/>
+          </a:effectRef>
+          <a:fontRef idx="minor">
+            <a:schemeClr val="tx1"/>
+          </a:fontRef>
+        </p:style>
+      </p:cxnSp>
+      <p:cxnSp>
+        <p:nvCxnSpPr>
+          <p:cNvPr id="41" name="Connettore 1 40"/>
+          <p:cNvCxnSpPr/>
+          <p:nvPr/>
+        </p:nvCxnSpPr>
+        <p:spPr>
+          <a:xfrm flipH="1" flipV="1">
+            <a:off x="7262351" y="3116338"/>
+            <a:ext cx="6350" cy="975235"/>
+          </a:xfrm>
+          <a:prstGeom prst="line">
+            <a:avLst/>
+          </a:prstGeom>
+          <a:ln w="38100">
+            <a:solidFill>
+              <a:schemeClr val="accent4"/>
+            </a:solidFill>
+          </a:ln>
+        </p:spPr>
+        <p:style>
+          <a:lnRef idx="1">
+            <a:schemeClr val="accent1"/>
+          </a:lnRef>
+          <a:fillRef idx="0">
+            <a:schemeClr val="accent1"/>
+          </a:fillRef>
+          <a:effectRef idx="0">
+            <a:schemeClr val="accent1"/>
+          </a:effectRef>
+          <a:fontRef idx="minor">
+            <a:schemeClr val="tx1"/>
+          </a:fontRef>
+        </p:style>
+      </p:cxnSp>
+      <p:cxnSp>
+        <p:nvCxnSpPr>
+          <p:cNvPr id="42" name="Connettore 1 41"/>
+          <p:cNvCxnSpPr/>
+          <p:nvPr/>
+        </p:nvCxnSpPr>
+        <p:spPr>
+          <a:xfrm>
+            <a:off x="7268701" y="4074038"/>
+            <a:ext cx="635103" cy="0"/>
+          </a:xfrm>
+          <a:prstGeom prst="line">
+            <a:avLst/>
+          </a:prstGeom>
+          <a:ln w="38100">
+            <a:solidFill>
+              <a:schemeClr val="accent4"/>
+            </a:solidFill>
+          </a:ln>
+        </p:spPr>
+        <p:style>
+          <a:lnRef idx="1">
+            <a:schemeClr val="accent1"/>
+          </a:lnRef>
+          <a:fillRef idx="0">
+            <a:schemeClr val="accent1"/>
+          </a:fillRef>
+          <a:effectRef idx="0">
+            <a:schemeClr val="accent1"/>
+          </a:effectRef>
+          <a:fontRef idx="minor">
+            <a:schemeClr val="tx1"/>
+          </a:fontRef>
+        </p:style>
+      </p:cxnSp>
+      <p:pic>
+        <p:nvPicPr>
+          <p:cNvPr id="1026" name="Picture 2" descr="http://www.clker.com/cliparts/6/c/4/a/1195429795336159975juanjo_Router.svg.hi.png"/>
+          <p:cNvPicPr>
+            <a:picLocks noChangeAspect="1" noChangeArrowheads="1"/>
+          </p:cNvPicPr>
+          <p:nvPr/>
+        </p:nvPicPr>
+        <p:blipFill>
+          <a:blip r:embed="rId4" cstate="print">
+            <a:extLst>
+              <a:ext uri="{28A0092B-C50C-407E-A947-70E740481C1C}">
+                <a14:useLocalDpi xmlns:a14="http://schemas.microsoft.com/office/drawing/2010/main" val="0"/>
+              </a:ext>
+            </a:extLst>
+          </a:blip>
+          <a:srcRect/>
+          <a:stretch>
+            <a:fillRect/>
+          </a:stretch>
+        </p:blipFill>
+        <p:spPr bwMode="auto">
+          <a:xfrm>
+            <a:off x="1892403" y="2617748"/>
+            <a:ext cx="1258064" cy="836613"/>
+          </a:xfrm>
+          <a:prstGeom prst="rect">
+            <a:avLst/>
+          </a:prstGeom>
+          <a:noFill/>
+          <a:extLst>
+            <a:ext uri="{909E8E84-426E-40DD-AFC4-6F175D3DCCD1}">
+              <a14:hiddenFill xmlns:a14="http://schemas.microsoft.com/office/drawing/2010/main">
+                <a:solidFill>
+                  <a:srgbClr val="FFFFFF"/>
+                </a:solidFill>
+              </a14:hiddenFill>
+            </a:ext>
+          </a:extLst>
+        </p:spPr>
+      </p:pic>
+      <p:pic>
+        <p:nvPicPr>
+          <p:cNvPr id="6" name="Picture 2" descr="http://www.clker.com/cliparts/6/c/4/a/1195429795336159975juanjo_Router.svg.hi.png"/>
+          <p:cNvPicPr>
+            <a:picLocks noChangeAspect="1" noChangeArrowheads="1"/>
+          </p:cNvPicPr>
+          <p:nvPr/>
+        </p:nvPicPr>
+        <p:blipFill>
+          <a:blip r:embed="rId4" cstate="print">
+            <a:extLst>
+              <a:ext uri="{28A0092B-C50C-407E-A947-70E740481C1C}">
+                <a14:useLocalDpi xmlns:a14="http://schemas.microsoft.com/office/drawing/2010/main" val="0"/>
+              </a:ext>
+            </a:extLst>
+          </a:blip>
+          <a:srcRect/>
+          <a:stretch>
+            <a:fillRect/>
+          </a:stretch>
+        </p:blipFill>
+        <p:spPr bwMode="auto">
+          <a:xfrm>
+            <a:off x="5769638" y="2617748"/>
+            <a:ext cx="1258064" cy="836613"/>
+          </a:xfrm>
+          <a:prstGeom prst="rect">
+            <a:avLst/>
+          </a:prstGeom>
+          <a:noFill/>
+          <a:extLst>
+            <a:ext uri="{909E8E84-426E-40DD-AFC4-6F175D3DCCD1}">
+              <a14:hiddenFill xmlns:a14="http://schemas.microsoft.com/office/drawing/2010/main">
+                <a:solidFill>
+                  <a:srgbClr val="FFFFFF"/>
+                </a:solidFill>
+              </a14:hiddenFill>
+            </a:ext>
+          </a:extLst>
+        </p:spPr>
+      </p:pic>
+    </p:spTree>
+    <p:extLst>
+      <p:ext uri="{BB962C8B-B14F-4D97-AF65-F5344CB8AC3E}">
+        <p14:creationId xmlns:p14="http://schemas.microsoft.com/office/powerpoint/2010/main" val="225926590"/>
+      </p:ext>
+    </p:extLst>
+  </p:cSld>
+  <p:clrMapOvr>
+    <a:masterClrMapping/>
+  </p:clrMapOvr>
+  <p:timing>
+    <p:tnLst>
+      <p:par>
+        <p:cTn id="1" dur="indefinite" restart="never" nodeType="tmRoot"/>
+      </p:par>
+    </p:tnLst>
+  </p:timing>
 </p:sld>
 </file>
 
@@ -10903,7 +12025,7 @@
   <a:extraClrSchemeLst/>
   <a:extLst>
     <a:ext uri="{05A4C25C-085E-4340-85A3-A5531E510DB2}">
-      <thm15:themeFamily xmlns:thm15="http://schemas.microsoft.com/office/thememl/2012/main" xmlns="" name="Office Theme" id="{62F939B6-93AF-4DB8-9C6B-D6C7DFDC589F}" vid="{4A3C46E8-61CC-4603-A589-7422A47A8E4A}"/>
+      <thm15:themeFamily xmlns:thm15="http://schemas.microsoft.com/office/thememl/2012/main" name="Office Theme" id="{62F939B6-93AF-4DB8-9C6B-D6C7DFDC589F}" vid="{4A3C46E8-61CC-4603-A589-7422A47A8E4A}"/>
     </a:ext>
   </a:extLst>
 </a:theme>
@@ -11164,7 +12286,7 @@
   <a:extraClrSchemeLst/>
   <a:extLst>
     <a:ext uri="{05A4C25C-085E-4340-85A3-A5531E510DB2}">
-      <thm15:themeFamily xmlns:thm15="http://schemas.microsoft.com/office/thememl/2012/main" xmlns="" name="Office Theme" id="{62F939B6-93AF-4DB8-9C6B-D6C7DFDC589F}" vid="{4A3C46E8-61CC-4603-A589-7422A47A8E4A}"/>
+      <thm15:themeFamily xmlns:thm15="http://schemas.microsoft.com/office/thememl/2012/main" name="Office Theme" id="{62F939B6-93AF-4DB8-9C6B-D6C7DFDC589F}" vid="{4A3C46E8-61CC-4603-A589-7422A47A8E4A}"/>
     </a:ext>
   </a:extLst>
 </a:theme>

</xml_diff>

<commit_message>
Ops... still a missing info. Updated the previous commit.
</commit_message>
<xml_diff>
--- a/images/Pictures.pptx
+++ b/images/Pictures.pptx
@@ -3463,8 +3463,8 @@
         </p:nvSpPr>
         <p:spPr>
           <a:xfrm>
-            <a:off x="301759" y="928670"/>
-            <a:ext cx="6811422" cy="4640267"/>
+            <a:off x="301758" y="790162"/>
+            <a:ext cx="7063565" cy="4778776"/>
           </a:xfrm>
           <a:prstGeom prst="rect">
             <a:avLst/>
@@ -3584,6 +3584,7 @@
             </a:lvl9pPr>
           </a:lstStyle>
           <a:p>
+            <a:pPr algn="r"/>
             <a:r>
               <a:rPr lang="it-IT" dirty="0"/>
               <a:t>Universal </a:t>
@@ -3604,8 +3605,8 @@
         </p:nvSpPr>
         <p:spPr>
           <a:xfrm>
-            <a:off x="744387" y="3966758"/>
-            <a:ext cx="4524291" cy="1241650"/>
+            <a:off x="876968" y="3966758"/>
+            <a:ext cx="4105867" cy="1241650"/>
           </a:xfrm>
           <a:prstGeom prst="roundRect">
             <a:avLst>
@@ -3640,7 +3641,7 @@
         </p:nvSpPr>
         <p:spPr>
           <a:xfrm>
-            <a:off x="2358548" y="4846868"/>
+            <a:off x="1945258" y="4846868"/>
             <a:ext cx="1179392" cy="359640"/>
           </a:xfrm>
           <a:prstGeom prst="rect">
@@ -3781,7 +3782,7 @@
         </p:nvSpPr>
         <p:spPr>
           <a:xfrm>
-            <a:off x="1445463" y="4919097"/>
+            <a:off x="1032173" y="4919097"/>
             <a:ext cx="719640" cy="289800"/>
           </a:xfrm>
           <a:prstGeom prst="rect">
@@ -3906,7 +3907,7 @@
         </p:nvSpPr>
         <p:spPr>
           <a:xfrm>
-            <a:off x="2652687" y="2096271"/>
+            <a:off x="2785268" y="2096271"/>
             <a:ext cx="657756" cy="423904"/>
           </a:xfrm>
           <a:prstGeom prst="rect">
@@ -4066,7 +4067,7 @@
         </p:nvSpPr>
         <p:spPr>
           <a:xfrm>
-            <a:off x="4354442" y="2096270"/>
+            <a:off x="4487023" y="2096270"/>
             <a:ext cx="697691" cy="430182"/>
           </a:xfrm>
           <a:prstGeom prst="rect">
@@ -4223,13 +4224,14 @@
           <p:cNvPr id="8" name="Straight Connector 3"/>
           <p:cNvCxnSpPr>
             <a:stCxn id="7" idx="2"/>
+            <a:endCxn id="4" idx="3"/>
           </p:cNvCxnSpPr>
           <p:nvPr/>
         </p:nvCxnSpPr>
         <p:spPr>
           <a:xfrm rot="5400000">
-            <a:off x="2870496" y="3193896"/>
-            <a:ext cx="2500236" cy="1165348"/>
+            <a:off x="2730142" y="2920961"/>
+            <a:ext cx="2500236" cy="1711219"/>
           </a:xfrm>
           <a:prstGeom prst="curvedConnector2">
             <a:avLst/>
@@ -4255,7 +4257,7 @@
         </p:nvCxnSpPr>
         <p:spPr>
           <a:xfrm rot="5400000">
-            <a:off x="1552038" y="2915060"/>
+            <a:off x="1684619" y="2915060"/>
             <a:ext cx="1824413" cy="1034642"/>
           </a:xfrm>
           <a:prstGeom prst="curvedConnector2">
@@ -4420,7 +4422,7 @@
         </p:nvCxnSpPr>
         <p:spPr>
           <a:xfrm>
-            <a:off x="2577907" y="5208408"/>
+            <a:off x="2164617" y="5208408"/>
             <a:ext cx="1198" cy="457200"/>
           </a:xfrm>
           <a:prstGeom prst="line">
@@ -4455,7 +4457,7 @@
         </p:nvCxnSpPr>
         <p:spPr>
           <a:xfrm>
-            <a:off x="2827963" y="5208408"/>
+            <a:off x="2414673" y="5208408"/>
             <a:ext cx="0" cy="457200"/>
           </a:xfrm>
           <a:prstGeom prst="line">
@@ -4490,7 +4492,7 @@
         </p:nvCxnSpPr>
         <p:spPr>
           <a:xfrm>
-            <a:off x="3078019" y="5212936"/>
+            <a:off x="2664729" y="5212936"/>
             <a:ext cx="0" cy="457200"/>
           </a:xfrm>
           <a:prstGeom prst="line">
@@ -4525,7 +4527,7 @@
         </p:nvCxnSpPr>
         <p:spPr>
           <a:xfrm>
-            <a:off x="3328075" y="5215496"/>
+            <a:off x="2914785" y="5215496"/>
             <a:ext cx="0" cy="457200"/>
           </a:xfrm>
           <a:prstGeom prst="line">
@@ -4560,7 +4562,7 @@
         </p:nvSpPr>
         <p:spPr>
           <a:xfrm flipH="1">
-            <a:off x="1619672" y="285728"/>
+            <a:off x="1752253" y="285728"/>
             <a:ext cx="0" cy="718314"/>
           </a:xfrm>
           <a:prstGeom prst="line">
@@ -4590,7 +4592,7 @@
         </p:nvSpPr>
         <p:spPr>
           <a:xfrm>
-            <a:off x="1619672" y="510072"/>
+            <a:off x="1752253" y="407385"/>
             <a:ext cx="1857388" cy="275722"/>
           </a:xfrm>
           <a:prstGeom prst="rect">
@@ -4721,7 +4723,7 @@
         </p:nvSpPr>
         <p:spPr>
           <a:xfrm>
-            <a:off x="451417" y="1730253"/>
+            <a:off x="583998" y="1730253"/>
             <a:ext cx="1904136" cy="380436"/>
           </a:xfrm>
           <a:prstGeom prst="rect">
@@ -4859,7 +4861,7 @@
         </p:nvSpPr>
         <p:spPr>
           <a:xfrm>
-            <a:off x="1854247" y="2107200"/>
+            <a:off x="1986828" y="2107200"/>
             <a:ext cx="501306" cy="412532"/>
           </a:xfrm>
           <a:prstGeom prst="rect">
@@ -4910,7 +4912,7 @@
         </p:nvSpPr>
         <p:spPr>
           <a:xfrm>
-            <a:off x="1401097" y="2517064"/>
+            <a:off x="1533678" y="2517064"/>
             <a:ext cx="453151" cy="215805"/>
           </a:xfrm>
           <a:prstGeom prst="rect">
@@ -5050,7 +5052,7 @@
         </p:nvCxnSpPr>
         <p:spPr>
           <a:xfrm rot="16200000" flipH="1">
-            <a:off x="2550699" y="2073932"/>
+            <a:off x="2683280" y="2073932"/>
             <a:ext cx="624744" cy="1516343"/>
           </a:xfrm>
           <a:prstGeom prst="curvedConnector3">
@@ -5079,7 +5081,7 @@
         </p:nvCxnSpPr>
         <p:spPr>
           <a:xfrm rot="16200000" flipH="1">
-            <a:off x="1611173" y="2749369"/>
+            <a:off x="1743754" y="2749369"/>
             <a:ext cx="413463" cy="380462"/>
           </a:xfrm>
           <a:prstGeom prst="curvedConnector3">
@@ -5106,7 +5108,7 @@
         </p:nvSpPr>
         <p:spPr>
           <a:xfrm>
-            <a:off x="5107658" y="2096269"/>
+            <a:off x="5240239" y="2096269"/>
             <a:ext cx="1872530" cy="419745"/>
           </a:xfrm>
           <a:prstGeom prst="rect">
@@ -5244,8 +5246,8 @@
         </p:nvSpPr>
         <p:spPr>
           <a:xfrm>
-            <a:off x="5107520" y="2516737"/>
-            <a:ext cx="605800" cy="408440"/>
+            <a:off x="5240101" y="2516737"/>
+            <a:ext cx="610376" cy="408440"/>
           </a:xfrm>
           <a:prstGeom prst="rect">
             <a:avLst/>
@@ -5401,7 +5403,7 @@
         </p:nvSpPr>
         <p:spPr>
           <a:xfrm>
-            <a:off x="5717896" y="2516504"/>
+            <a:off x="5850477" y="2516504"/>
             <a:ext cx="635975" cy="408440"/>
           </a:xfrm>
           <a:prstGeom prst="rect">
@@ -5558,7 +5560,7 @@
         </p:nvSpPr>
         <p:spPr>
           <a:xfrm>
-            <a:off x="3607608" y="2096271"/>
+            <a:off x="3740189" y="2096271"/>
             <a:ext cx="746835" cy="423903"/>
           </a:xfrm>
           <a:prstGeom prst="rect">
@@ -5718,7 +5720,7 @@
         </p:nvCxnSpPr>
         <p:spPr>
           <a:xfrm>
-            <a:off x="3409567" y="2314232"/>
+            <a:off x="3542148" y="2314232"/>
             <a:ext cx="108000" cy="0"/>
           </a:xfrm>
           <a:prstGeom prst="line">
@@ -5751,13 +5753,16 @@
         </p:nvCxnSpPr>
         <p:spPr>
           <a:xfrm>
-            <a:off x="2206611" y="4419550"/>
+            <a:off x="2352809" y="4419550"/>
             <a:ext cx="216000" cy="0"/>
           </a:xfrm>
           <a:prstGeom prst="line">
             <a:avLst/>
           </a:prstGeom>
           <a:ln w="50800" cap="rnd">
+            <a:solidFill>
+              <a:schemeClr val="tx1"/>
+            </a:solidFill>
             <a:prstDash val="sysDot"/>
           </a:ln>
         </p:spPr>
@@ -5786,7 +5791,7 @@
         </p:nvCxnSpPr>
         <p:spPr>
           <a:xfrm rot="5400000">
-            <a:off x="2968384" y="3320906"/>
+            <a:off x="3100965" y="3320906"/>
             <a:ext cx="1813375" cy="211910"/>
           </a:xfrm>
           <a:prstGeom prst="curvedConnector2">
@@ -5813,7 +5818,7 @@
         </p:nvCxnSpPr>
         <p:spPr>
           <a:xfrm rot="16200000" flipH="1">
-            <a:off x="2130436" y="2230105"/>
+            <a:off x="2263017" y="2230105"/>
             <a:ext cx="413040" cy="1418567"/>
           </a:xfrm>
           <a:prstGeom prst="curvedConnector3">
@@ -5843,8 +5848,8 @@
         </p:nvCxnSpPr>
         <p:spPr>
           <a:xfrm rot="5400000">
-            <a:off x="4820962" y="3372660"/>
-            <a:ext cx="1662639" cy="767206"/>
+            <a:off x="4744331" y="3163448"/>
+            <a:ext cx="1662639" cy="1185630"/>
           </a:xfrm>
           <a:prstGeom prst="curvedConnector2">
             <a:avLst/>
@@ -5868,7 +5873,7 @@
         </p:nvSpPr>
         <p:spPr>
           <a:xfrm>
-            <a:off x="2794240" y="3145909"/>
+            <a:off x="2926821" y="3145909"/>
             <a:ext cx="504000" cy="504000"/>
           </a:xfrm>
           <a:prstGeom prst="rect">
@@ -5908,7 +5913,7 @@
         </p:nvSpPr>
         <p:spPr>
           <a:xfrm>
-            <a:off x="451417" y="2107200"/>
+            <a:off x="583998" y="2107200"/>
             <a:ext cx="429396" cy="412532"/>
           </a:xfrm>
           <a:prstGeom prst="rect">
@@ -5967,7 +5972,7 @@
         </p:nvSpPr>
         <p:spPr>
           <a:xfrm>
-            <a:off x="877207" y="2107200"/>
+            <a:off x="1009788" y="2107200"/>
             <a:ext cx="530001" cy="412532"/>
           </a:xfrm>
           <a:prstGeom prst="rect">
@@ -6031,7 +6036,7 @@
         </p:nvCxnSpPr>
         <p:spPr>
           <a:xfrm rot="16200000" flipH="1">
-            <a:off x="972189" y="2689750"/>
+            <a:off x="1104770" y="2689750"/>
             <a:ext cx="619512" cy="279475"/>
           </a:xfrm>
           <a:prstGeom prst="curvedConnector3">
@@ -6060,7 +6065,7 @@
         </p:nvCxnSpPr>
         <p:spPr>
           <a:xfrm rot="16200000" flipH="1">
-            <a:off x="445259" y="2740587"/>
+            <a:off x="577840" y="2740587"/>
             <a:ext cx="626600" cy="184889"/>
           </a:xfrm>
           <a:prstGeom prst="curvedConnector3">
@@ -6087,7 +6092,7 @@
         </p:nvSpPr>
         <p:spPr>
           <a:xfrm>
-            <a:off x="1169683" y="3139244"/>
+            <a:off x="1302264" y="3139244"/>
             <a:ext cx="504000" cy="503640"/>
           </a:xfrm>
           <a:prstGeom prst="rect">
@@ -6225,7 +6230,7 @@
         </p:nvSpPr>
         <p:spPr>
           <a:xfrm>
-            <a:off x="919481" y="4128768"/>
+            <a:off x="1052062" y="4128768"/>
             <a:ext cx="1027442" cy="431640"/>
           </a:xfrm>
           <a:prstGeom prst="rect">
@@ -6384,7 +6389,7 @@
         </p:nvSpPr>
         <p:spPr>
           <a:xfrm>
-            <a:off x="1756135" y="3146332"/>
+            <a:off x="1888716" y="3146332"/>
             <a:ext cx="504000" cy="503640"/>
           </a:xfrm>
           <a:prstGeom prst="rect">
@@ -6522,7 +6527,7 @@
         </p:nvSpPr>
         <p:spPr>
           <a:xfrm>
-            <a:off x="599004" y="3146332"/>
+            <a:off x="731585" y="3146332"/>
             <a:ext cx="504000" cy="503640"/>
           </a:xfrm>
           <a:prstGeom prst="rect">
@@ -6660,7 +6665,7 @@
         </p:nvSpPr>
         <p:spPr>
           <a:xfrm>
-            <a:off x="451417" y="1036156"/>
+            <a:off x="583998" y="1036156"/>
             <a:ext cx="2272733" cy="242610"/>
           </a:xfrm>
           <a:prstGeom prst="rect">
@@ -6817,8 +6822,8 @@
         </p:nvCxnSpPr>
         <p:spPr>
           <a:xfrm rot="16200000" flipV="1">
-            <a:off x="7162987" y="1324072"/>
-            <a:ext cx="634090" cy="999688"/>
+            <a:off x="7229278" y="1390362"/>
+            <a:ext cx="634090" cy="867107"/>
           </a:xfrm>
           <a:prstGeom prst="bentConnector2">
             <a:avLst/>
@@ -7809,7 +7814,7 @@
         </p:nvSpPr>
         <p:spPr>
           <a:xfrm>
-            <a:off x="451418" y="1278766"/>
+            <a:off x="583999" y="1278766"/>
             <a:ext cx="6528770" cy="456209"/>
           </a:xfrm>
           <a:prstGeom prst="rect">
@@ -7987,7 +7992,7 @@
         </p:nvSpPr>
         <p:spPr>
           <a:xfrm>
-            <a:off x="1401309" y="2107200"/>
+            <a:off x="1533890" y="2107200"/>
             <a:ext cx="454505" cy="412532"/>
           </a:xfrm>
           <a:prstGeom prst="rect">
@@ -8140,7 +8145,7 @@
         </p:nvSpPr>
         <p:spPr>
           <a:xfrm>
-            <a:off x="2741674" y="4117729"/>
+            <a:off x="2874255" y="4117729"/>
             <a:ext cx="1027442" cy="431640"/>
           </a:xfrm>
           <a:prstGeom prst="rect">
@@ -8205,7 +8210,7 @@
         </p:nvSpPr>
         <p:spPr>
           <a:xfrm>
-            <a:off x="3369243" y="3144476"/>
+            <a:off x="3501824" y="3144476"/>
             <a:ext cx="504000" cy="504000"/>
           </a:xfrm>
           <a:prstGeom prst="rect">
@@ -8245,7 +8250,7 @@
         </p:nvSpPr>
         <p:spPr>
           <a:xfrm>
-            <a:off x="6347343" y="2516504"/>
+            <a:off x="6479924" y="2516504"/>
             <a:ext cx="627615" cy="408440"/>
           </a:xfrm>
           <a:prstGeom prst="rect">
@@ -8402,7 +8407,7 @@
         </p:nvCxnSpPr>
         <p:spPr>
           <a:xfrm>
-            <a:off x="1421683" y="3642884"/>
+            <a:off x="1554264" y="3642884"/>
             <a:ext cx="11519" cy="485884"/>
           </a:xfrm>
           <a:prstGeom prst="line">
@@ -8425,7 +8430,7 @@
         </p:nvCxnSpPr>
         <p:spPr>
           <a:xfrm>
-            <a:off x="851004" y="3649972"/>
+            <a:off x="983585" y="3649972"/>
             <a:ext cx="582198" cy="478796"/>
           </a:xfrm>
           <a:prstGeom prst="line">
@@ -8448,7 +8453,7 @@
         </p:nvCxnSpPr>
         <p:spPr>
           <a:xfrm flipH="1">
-            <a:off x="1433202" y="3649972"/>
+            <a:off x="1565783" y="3649972"/>
             <a:ext cx="574933" cy="478796"/>
           </a:xfrm>
           <a:prstGeom prst="line">
@@ -8471,7 +8476,7 @@
         </p:nvCxnSpPr>
         <p:spPr>
           <a:xfrm>
-            <a:off x="3046240" y="3649909"/>
+            <a:off x="3178821" y="3649909"/>
             <a:ext cx="209155" cy="467820"/>
           </a:xfrm>
           <a:prstGeom prst="line">
@@ -8494,7 +8499,7 @@
         </p:nvCxnSpPr>
         <p:spPr>
           <a:xfrm flipV="1">
-            <a:off x="3255395" y="3648476"/>
+            <a:off x="3387976" y="3648476"/>
             <a:ext cx="365848" cy="469253"/>
           </a:xfrm>
           <a:prstGeom prst="line">
@@ -8512,13 +8517,15 @@
       <p:cxnSp>
         <p:nvCxnSpPr>
           <p:cNvPr id="68" name="Straight Connector 161"/>
-          <p:cNvCxnSpPr/>
+          <p:cNvCxnSpPr>
+            <a:stCxn id="4" idx="0"/>
+          </p:cNvCxnSpPr>
           <p:nvPr/>
         </p:nvCxnSpPr>
         <p:spPr>
           <a:xfrm flipH="1" flipV="1">
-            <a:off x="1433202" y="4560408"/>
-            <a:ext cx="1515042" cy="286460"/>
+            <a:off x="1565783" y="4560408"/>
+            <a:ext cx="969171" cy="286460"/>
           </a:xfrm>
           <a:prstGeom prst="line">
             <a:avLst/>
@@ -8535,13 +8542,15 @@
       <p:cxnSp>
         <p:nvCxnSpPr>
           <p:cNvPr id="69" name="Straight Connector 162"/>
-          <p:cNvCxnSpPr/>
+          <p:cNvCxnSpPr>
+            <a:stCxn id="4" idx="0"/>
+          </p:cNvCxnSpPr>
           <p:nvPr/>
         </p:nvCxnSpPr>
         <p:spPr>
           <a:xfrm flipV="1">
-            <a:off x="2948244" y="4549369"/>
-            <a:ext cx="307151" cy="297499"/>
+            <a:off x="2534954" y="4549370"/>
+            <a:ext cx="853022" cy="297498"/>
           </a:xfrm>
           <a:prstGeom prst="line">
             <a:avLst/>
@@ -8563,7 +8572,7 @@
         </p:nvSpPr>
         <p:spPr>
           <a:xfrm>
-            <a:off x="2719053" y="1035499"/>
+            <a:off x="2851634" y="1035499"/>
             <a:ext cx="2131201" cy="245833"/>
           </a:xfrm>
           <a:prstGeom prst="rect">
@@ -8703,11 +8712,6 @@
               </a:rPr>
               <a:t>Local DB manager</a:t>
             </a:r>
-            <a:endParaRPr lang="it-IT" sz="1400" dirty="0" smtClean="0">
-              <a:solidFill>
-                <a:schemeClr val="tx1"/>
-              </a:solidFill>
-            </a:endParaRPr>
           </a:p>
         </p:txBody>
       </p:sp>
@@ -8719,7 +8723,7 @@
         </p:nvSpPr>
         <p:spPr>
           <a:xfrm>
-            <a:off x="4850524" y="1035009"/>
+            <a:off x="4983105" y="1035009"/>
             <a:ext cx="2129395" cy="246323"/>
           </a:xfrm>
           <a:prstGeom prst="rect">
@@ -8884,7 +8888,7 @@
         </p:nvSpPr>
         <p:spPr>
           <a:xfrm>
-            <a:off x="2652686" y="1736629"/>
+            <a:off x="2785267" y="1736629"/>
             <a:ext cx="4327501" cy="361783"/>
           </a:xfrm>
           <a:prstGeom prst="rect">
@@ -9025,7 +9029,7 @@
         </p:nvSpPr>
         <p:spPr>
           <a:xfrm flipH="1">
-            <a:off x="2475620" y="1164096"/>
+            <a:off x="2608201" y="1164096"/>
             <a:ext cx="486865" cy="0"/>
           </a:xfrm>
           <a:prstGeom prst="line">
@@ -9046,6 +9050,186 @@
           <a:lstStyle/>
           <a:p>
             <a:endParaRPr lang="it-IT"/>
+          </a:p>
+        </p:txBody>
+      </p:sp>
+      <p:sp>
+        <p:nvSpPr>
+          <p:cNvPr id="73" name="Line 28"/>
+          <p:cNvSpPr/>
+          <p:nvPr/>
+        </p:nvSpPr>
+        <p:spPr>
+          <a:xfrm flipH="1">
+            <a:off x="6000725" y="317686"/>
+            <a:ext cx="0" cy="718314"/>
+          </a:xfrm>
+          <a:prstGeom prst="line">
+            <a:avLst/>
+          </a:prstGeom>
+          <a:ln w="19050">
+            <a:solidFill>
+              <a:srgbClr val="000000"/>
+            </a:solidFill>
+            <a:round/>
+            <a:headEnd type="triangle" w="med" len="med"/>
+            <a:tailEnd type="none" w="med" len="med"/>
+          </a:ln>
+        </p:spPr>
+        <p:txBody>
+          <a:bodyPr/>
+          <a:lstStyle/>
+          <a:p>
+            <a:endParaRPr lang="it-IT"/>
+          </a:p>
+        </p:txBody>
+      </p:sp>
+      <p:sp>
+        <p:nvSpPr>
+          <p:cNvPr id="74" name="CustomShape 29"/>
+          <p:cNvSpPr/>
+          <p:nvPr/>
+        </p:nvSpPr>
+        <p:spPr>
+          <a:xfrm>
+            <a:off x="6026980" y="404664"/>
+            <a:ext cx="1857388" cy="275722"/>
+          </a:xfrm>
+          <a:prstGeom prst="rect">
+            <a:avLst/>
+          </a:prstGeom>
+        </p:spPr>
+        <p:txBody>
+          <a:bodyPr wrap="none" lIns="90000" tIns="45000" rIns="90000" bIns="45000"/>
+          <a:lstStyle>
+            <a:defPPr>
+              <a:defRPr lang="en-US"/>
+            </a:defPPr>
+            <a:lvl1pPr marL="0" algn="l" defTabSz="914400" rtl="0" eaLnBrk="1" latinLnBrk="0" hangingPunct="1">
+              <a:defRPr sz="1800" kern="1200">
+                <a:solidFill>
+                  <a:schemeClr val="tx1"/>
+                </a:solidFill>
+                <a:latin typeface="+mn-lt"/>
+                <a:ea typeface="+mn-ea"/>
+                <a:cs typeface="+mn-cs"/>
+              </a:defRPr>
+            </a:lvl1pPr>
+            <a:lvl2pPr marL="457200" algn="l" defTabSz="914400" rtl="0" eaLnBrk="1" latinLnBrk="0" hangingPunct="1">
+              <a:defRPr sz="1800" kern="1200">
+                <a:solidFill>
+                  <a:schemeClr val="tx1"/>
+                </a:solidFill>
+                <a:latin typeface="+mn-lt"/>
+                <a:ea typeface="+mn-ea"/>
+                <a:cs typeface="+mn-cs"/>
+              </a:defRPr>
+            </a:lvl2pPr>
+            <a:lvl3pPr marL="914400" algn="l" defTabSz="914400" rtl="0" eaLnBrk="1" latinLnBrk="0" hangingPunct="1">
+              <a:defRPr sz="1800" kern="1200">
+                <a:solidFill>
+                  <a:schemeClr val="tx1"/>
+                </a:solidFill>
+                <a:latin typeface="+mn-lt"/>
+                <a:ea typeface="+mn-ea"/>
+                <a:cs typeface="+mn-cs"/>
+              </a:defRPr>
+            </a:lvl3pPr>
+            <a:lvl4pPr marL="1371600" algn="l" defTabSz="914400" rtl="0" eaLnBrk="1" latinLnBrk="0" hangingPunct="1">
+              <a:defRPr sz="1800" kern="1200">
+                <a:solidFill>
+                  <a:schemeClr val="tx1"/>
+                </a:solidFill>
+                <a:latin typeface="+mn-lt"/>
+                <a:ea typeface="+mn-ea"/>
+                <a:cs typeface="+mn-cs"/>
+              </a:defRPr>
+            </a:lvl4pPr>
+            <a:lvl5pPr marL="1828800" algn="l" defTabSz="914400" rtl="0" eaLnBrk="1" latinLnBrk="0" hangingPunct="1">
+              <a:defRPr sz="1800" kern="1200">
+                <a:solidFill>
+                  <a:schemeClr val="tx1"/>
+                </a:solidFill>
+                <a:latin typeface="+mn-lt"/>
+                <a:ea typeface="+mn-ea"/>
+                <a:cs typeface="+mn-cs"/>
+              </a:defRPr>
+            </a:lvl5pPr>
+            <a:lvl6pPr marL="2286000" algn="l" defTabSz="914400" rtl="0" eaLnBrk="1" latinLnBrk="0" hangingPunct="1">
+              <a:defRPr sz="1800" kern="1200">
+                <a:solidFill>
+                  <a:schemeClr val="tx1"/>
+                </a:solidFill>
+                <a:latin typeface="+mn-lt"/>
+                <a:ea typeface="+mn-ea"/>
+                <a:cs typeface="+mn-cs"/>
+              </a:defRPr>
+            </a:lvl6pPr>
+            <a:lvl7pPr marL="2743200" algn="l" defTabSz="914400" rtl="0" eaLnBrk="1" latinLnBrk="0" hangingPunct="1">
+              <a:defRPr sz="1800" kern="1200">
+                <a:solidFill>
+                  <a:schemeClr val="tx1"/>
+                </a:solidFill>
+                <a:latin typeface="+mn-lt"/>
+                <a:ea typeface="+mn-ea"/>
+                <a:cs typeface="+mn-cs"/>
+              </a:defRPr>
+            </a:lvl7pPr>
+            <a:lvl8pPr marL="3200400" algn="l" defTabSz="914400" rtl="0" eaLnBrk="1" latinLnBrk="0" hangingPunct="1">
+              <a:defRPr sz="1800" kern="1200">
+                <a:solidFill>
+                  <a:schemeClr val="tx1"/>
+                </a:solidFill>
+                <a:latin typeface="+mn-lt"/>
+                <a:ea typeface="+mn-ea"/>
+                <a:cs typeface="+mn-cs"/>
+              </a:defRPr>
+            </a:lvl8pPr>
+            <a:lvl9pPr marL="3657600" algn="l" defTabSz="914400" rtl="0" eaLnBrk="1" latinLnBrk="0" hangingPunct="1">
+              <a:defRPr sz="1800" kern="1200">
+                <a:solidFill>
+                  <a:schemeClr val="tx1"/>
+                </a:solidFill>
+                <a:latin typeface="+mn-lt"/>
+                <a:ea typeface="+mn-ea"/>
+                <a:cs typeface="+mn-cs"/>
+              </a:defRPr>
+            </a:lvl9pPr>
+          </a:lstStyle>
+          <a:p>
+            <a:r>
+              <a:rPr lang="it-IT" sz="1400" dirty="0" smtClean="0">
+                <a:cs typeface="Times New Roman" pitchFamily="18" charset="0"/>
+              </a:rPr>
+              <a:t>[</a:t>
+            </a:r>
+            <a:r>
+              <a:rPr lang="it-IT" sz="1400" dirty="0" err="1" smtClean="0">
+                <a:cs typeface="Times New Roman" pitchFamily="18" charset="0"/>
+              </a:rPr>
+              <a:t>Node</a:t>
+            </a:r>
+            <a:r>
+              <a:rPr lang="it-IT" sz="1400" dirty="0" smtClean="0">
+                <a:cs typeface="Times New Roman" pitchFamily="18" charset="0"/>
+              </a:rPr>
+              <a:t> </a:t>
+            </a:r>
+            <a:r>
+              <a:rPr lang="it-IT" sz="1400" dirty="0" err="1" smtClean="0">
+                <a:cs typeface="Times New Roman" pitchFamily="18" charset="0"/>
+              </a:rPr>
+              <a:t>description</a:t>
+            </a:r>
+            <a:r>
+              <a:rPr lang="it-IT" sz="1400" dirty="0" smtClean="0">
+                <a:cs typeface="Times New Roman" pitchFamily="18" charset="0"/>
+              </a:rPr>
+              <a:t>]</a:t>
+            </a:r>
+            <a:endParaRPr sz="1400" dirty="0">
+              <a:cs typeface="Times New Roman" pitchFamily="18" charset="0"/>
+            </a:endParaRPr>
           </a:p>
         </p:txBody>
       </p:sp>
@@ -9788,14 +9972,14 @@
                 <a:gridCol w="1250165">
                   <a:extLst>
                     <a:ext uri="{9D8B030D-6E8A-4147-A177-3AD203B41FA5}">
-                      <a16:colId xmlns:a16="http://schemas.microsoft.com/office/drawing/2014/main" xmlns="" val="20000"/>
+                      <a16:colId xmlns="" xmlns:a16="http://schemas.microsoft.com/office/drawing/2014/main" val="20000"/>
                     </a:ext>
                   </a:extLst>
                 </a:gridCol>
                 <a:gridCol w="1250165">
                   <a:extLst>
                     <a:ext uri="{9D8B030D-6E8A-4147-A177-3AD203B41FA5}">
-                      <a16:colId xmlns:a16="http://schemas.microsoft.com/office/drawing/2014/main" xmlns="" val="20001"/>
+                      <a16:colId xmlns="" xmlns:a16="http://schemas.microsoft.com/office/drawing/2014/main" val="20001"/>
                     </a:ext>
                   </a:extLst>
                 </a:gridCol>
@@ -9831,7 +10015,7 @@
                 </a:tc>
                 <a:extLst>
                   <a:ext uri="{0D108BD9-81ED-4DB2-BD59-A6C34878D82A}">
-                    <a16:rowId xmlns:a16="http://schemas.microsoft.com/office/drawing/2014/main" xmlns="" val="10000"/>
+                    <a16:rowId xmlns="" xmlns:a16="http://schemas.microsoft.com/office/drawing/2014/main" val="10000"/>
                   </a:ext>
                 </a:extLst>
               </a:tr>
@@ -9878,7 +10062,7 @@
                 </a:tc>
                 <a:extLst>
                   <a:ext uri="{0D108BD9-81ED-4DB2-BD59-A6C34878D82A}">
-                    <a16:rowId xmlns:a16="http://schemas.microsoft.com/office/drawing/2014/main" xmlns="" val="10001"/>
+                    <a16:rowId xmlns="" xmlns:a16="http://schemas.microsoft.com/office/drawing/2014/main" val="10001"/>
                   </a:ext>
                 </a:extLst>
               </a:tr>
@@ -9929,7 +10113,7 @@
                 </a:tc>
                 <a:extLst>
                   <a:ext uri="{0D108BD9-81ED-4DB2-BD59-A6C34878D82A}">
-                    <a16:rowId xmlns:a16="http://schemas.microsoft.com/office/drawing/2014/main" xmlns="" val="10002"/>
+                    <a16:rowId xmlns="" xmlns:a16="http://schemas.microsoft.com/office/drawing/2014/main" val="10002"/>
                   </a:ext>
                 </a:extLst>
               </a:tr>
@@ -9976,7 +10160,7 @@
                 </a:tc>
                 <a:extLst>
                   <a:ext uri="{0D108BD9-81ED-4DB2-BD59-A6C34878D82A}">
-                    <a16:rowId xmlns:a16="http://schemas.microsoft.com/office/drawing/2014/main" xmlns="" val="10003"/>
+                    <a16:rowId xmlns="" xmlns:a16="http://schemas.microsoft.com/office/drawing/2014/main" val="10003"/>
                   </a:ext>
                 </a:extLst>
               </a:tr>
@@ -10027,7 +10211,7 @@
                 </a:tc>
                 <a:extLst>
                   <a:ext uri="{0D108BD9-81ED-4DB2-BD59-A6C34878D82A}">
-                    <a16:rowId xmlns:a16="http://schemas.microsoft.com/office/drawing/2014/main" xmlns="" val="10004"/>
+                    <a16:rowId xmlns="" xmlns:a16="http://schemas.microsoft.com/office/drawing/2014/main" val="10004"/>
                   </a:ext>
                 </a:extLst>
               </a:tr>
@@ -10129,14 +10313,14 @@
                 <a:gridCol w="1250165">
                   <a:extLst>
                     <a:ext uri="{9D8B030D-6E8A-4147-A177-3AD203B41FA5}">
-                      <a16:colId xmlns:a16="http://schemas.microsoft.com/office/drawing/2014/main" xmlns="" val="20000"/>
+                      <a16:colId xmlns="" xmlns:a16="http://schemas.microsoft.com/office/drawing/2014/main" val="20000"/>
                     </a:ext>
                   </a:extLst>
                 </a:gridCol>
                 <a:gridCol w="1250165">
                   <a:extLst>
                     <a:ext uri="{9D8B030D-6E8A-4147-A177-3AD203B41FA5}">
-                      <a16:colId xmlns:a16="http://schemas.microsoft.com/office/drawing/2014/main" xmlns="" val="20001"/>
+                      <a16:colId xmlns="" xmlns:a16="http://schemas.microsoft.com/office/drawing/2014/main" val="20001"/>
                     </a:ext>
                   </a:extLst>
                 </a:gridCol>
@@ -10172,7 +10356,7 @@
                 </a:tc>
                 <a:extLst>
                   <a:ext uri="{0D108BD9-81ED-4DB2-BD59-A6C34878D82A}">
-                    <a16:rowId xmlns:a16="http://schemas.microsoft.com/office/drawing/2014/main" xmlns="" val="10000"/>
+                    <a16:rowId xmlns="" xmlns:a16="http://schemas.microsoft.com/office/drawing/2014/main" val="10000"/>
                   </a:ext>
                 </a:extLst>
               </a:tr>
@@ -10219,7 +10403,7 @@
                 </a:tc>
                 <a:extLst>
                   <a:ext uri="{0D108BD9-81ED-4DB2-BD59-A6C34878D82A}">
-                    <a16:rowId xmlns:a16="http://schemas.microsoft.com/office/drawing/2014/main" xmlns="" val="10001"/>
+                    <a16:rowId xmlns="" xmlns:a16="http://schemas.microsoft.com/office/drawing/2014/main" val="10001"/>
                   </a:ext>
                 </a:extLst>
               </a:tr>
@@ -10270,7 +10454,7 @@
                 </a:tc>
                 <a:extLst>
                   <a:ext uri="{0D108BD9-81ED-4DB2-BD59-A6C34878D82A}">
-                    <a16:rowId xmlns:a16="http://schemas.microsoft.com/office/drawing/2014/main" xmlns="" val="10002"/>
+                    <a16:rowId xmlns="" xmlns:a16="http://schemas.microsoft.com/office/drawing/2014/main" val="10002"/>
                   </a:ext>
                 </a:extLst>
               </a:tr>
@@ -10317,7 +10501,7 @@
                 </a:tc>
                 <a:extLst>
                   <a:ext uri="{0D108BD9-81ED-4DB2-BD59-A6C34878D82A}">
-                    <a16:rowId xmlns:a16="http://schemas.microsoft.com/office/drawing/2014/main" xmlns="" val="10003"/>
+                    <a16:rowId xmlns="" xmlns:a16="http://schemas.microsoft.com/office/drawing/2014/main" val="10003"/>
                   </a:ext>
                 </a:extLst>
               </a:tr>
@@ -10368,7 +10552,7 @@
                 </a:tc>
                 <a:extLst>
                   <a:ext uri="{0D108BD9-81ED-4DB2-BD59-A6C34878D82A}">
-                    <a16:rowId xmlns:a16="http://schemas.microsoft.com/office/drawing/2014/main" xmlns="" val="10004"/>
+                    <a16:rowId xmlns="" xmlns:a16="http://schemas.microsoft.com/office/drawing/2014/main" val="10004"/>
                   </a:ext>
                 </a:extLst>
               </a:tr>

</xml_diff>

<commit_message>
Updated image for orchestration port
</commit_message>
<xml_diff>
--- a/images/Pictures.pptx
+++ b/images/Pictures.pptx
@@ -373,7 +373,7 @@
             <a:fld id="{96ADF636-4A01-4CCE-85D9-7F2B0C6E604A}" type="slidenum">
               <a:rPr lang="en-US" smtClean="0"/>
               <a:pPr/>
-              <a:t>‹N›</a:t>
+              <a:t>‹#›</a:t>
             </a:fld>
             <a:endParaRPr lang="en-US"/>
           </a:p>
@@ -573,6 +573,95 @@
 </p:notes>
 </file>
 
+<file path=ppt/notesSlides/notesSlide2.xml><?xml version="1.0" encoding="utf-8"?>
+<p:notes xmlns:a="http://schemas.openxmlformats.org/drawingml/2006/main" xmlns:r="http://schemas.openxmlformats.org/officeDocument/2006/relationships" xmlns:p="http://schemas.openxmlformats.org/presentationml/2006/main">
+  <p:cSld>
+    <p:spTree>
+      <p:nvGrpSpPr>
+        <p:cNvPr id="1" name=""/>
+        <p:cNvGrpSpPr/>
+        <p:nvPr/>
+      </p:nvGrpSpPr>
+      <p:grpSpPr>
+        <a:xfrm>
+          <a:off x="0" y="0"/>
+          <a:ext cx="0" cy="0"/>
+          <a:chOff x="0" y="0"/>
+          <a:chExt cx="0" cy="0"/>
+        </a:xfrm>
+      </p:grpSpPr>
+      <p:sp>
+        <p:nvSpPr>
+          <p:cNvPr id="2" name="Slide Image Placeholder 1"/>
+          <p:cNvSpPr>
+            <a:spLocks noGrp="1" noRot="1" noChangeAspect="1"/>
+          </p:cNvSpPr>
+          <p:nvPr>
+            <p:ph type="sldImg"/>
+          </p:nvPr>
+        </p:nvSpPr>
+        <p:spPr/>
+      </p:sp>
+      <p:sp>
+        <p:nvSpPr>
+          <p:cNvPr id="3" name="Notes Placeholder 2"/>
+          <p:cNvSpPr>
+            <a:spLocks noGrp="1"/>
+          </p:cNvSpPr>
+          <p:nvPr>
+            <p:ph type="body" idx="1"/>
+          </p:nvPr>
+        </p:nvSpPr>
+        <p:spPr/>
+        <p:txBody>
+          <a:bodyPr/>
+          <a:lstStyle/>
+          <a:p>
+            <a:r>
+              <a:rPr lang="en-US" smtClean="0"/>
+              <a:t>orchestrator_in_band_and_out_of_band</a:t>
+            </a:r>
+            <a:endParaRPr lang="en-US"/>
+          </a:p>
+        </p:txBody>
+      </p:sp>
+      <p:sp>
+        <p:nvSpPr>
+          <p:cNvPr id="4" name="Slide Number Placeholder 3"/>
+          <p:cNvSpPr>
+            <a:spLocks noGrp="1"/>
+          </p:cNvSpPr>
+          <p:nvPr>
+            <p:ph type="sldNum" sz="quarter" idx="10"/>
+          </p:nvPr>
+        </p:nvSpPr>
+        <p:spPr/>
+        <p:txBody>
+          <a:bodyPr/>
+          <a:lstStyle/>
+          <a:p>
+            <a:fld id="{96ADF636-4A01-4CCE-85D9-7F2B0C6E604A}" type="slidenum">
+              <a:rPr lang="en-US" smtClean="0"/>
+              <a:pPr/>
+              <a:t>5</a:t>
+            </a:fld>
+            <a:endParaRPr lang="en-US"/>
+          </a:p>
+        </p:txBody>
+      </p:sp>
+    </p:spTree>
+    <p:extLst>
+      <p:ext uri="{BB962C8B-B14F-4D97-AF65-F5344CB8AC3E}">
+        <p14:creationId xmlns:p14="http://schemas.microsoft.com/office/powerpoint/2010/main" val="4178323500"/>
+      </p:ext>
+    </p:extLst>
+  </p:cSld>
+  <p:clrMapOvr>
+    <a:masterClrMapping/>
+  </p:clrMapOvr>
+</p:notes>
+</file>
+
 <file path=ppt/slideLayouts/slideLayout1.xml><?xml version="1.0" encoding="utf-8"?>
 <p:sldLayout xmlns:a="http://schemas.openxmlformats.org/drawingml/2006/main" xmlns:r="http://schemas.openxmlformats.org/officeDocument/2006/relationships" xmlns:p="http://schemas.openxmlformats.org/presentationml/2006/main" type="title" preserve="1">
   <p:cSld name="Title Slide">
@@ -748,7 +837,7 @@
             <a:fld id="{376BEEA2-7DBA-48C8-A1DD-5F88B3EB48CF}" type="slidenum">
               <a:rPr lang="en-US" smtClean="0"/>
               <a:pPr/>
-              <a:t>‹N›</a:t>
+              <a:t>‹#›</a:t>
             </a:fld>
             <a:endParaRPr lang="en-US"/>
           </a:p>
@@ -920,7 +1009,7 @@
             <a:fld id="{376BEEA2-7DBA-48C8-A1DD-5F88B3EB48CF}" type="slidenum">
               <a:rPr lang="en-US" smtClean="0"/>
               <a:pPr/>
-              <a:t>‹N›</a:t>
+              <a:t>‹#›</a:t>
             </a:fld>
             <a:endParaRPr lang="en-US"/>
           </a:p>
@@ -1102,7 +1191,7 @@
             <a:fld id="{376BEEA2-7DBA-48C8-A1DD-5F88B3EB48CF}" type="slidenum">
               <a:rPr lang="en-US" smtClean="0"/>
               <a:pPr/>
-              <a:t>‹N›</a:t>
+              <a:t>‹#›</a:t>
             </a:fld>
             <a:endParaRPr lang="en-US"/>
           </a:p>
@@ -1274,7 +1363,7 @@
             <a:fld id="{376BEEA2-7DBA-48C8-A1DD-5F88B3EB48CF}" type="slidenum">
               <a:rPr lang="en-US" smtClean="0"/>
               <a:pPr/>
-              <a:t>‹N›</a:t>
+              <a:t>‹#›</a:t>
             </a:fld>
             <a:endParaRPr lang="en-US"/>
           </a:p>
@@ -1520,7 +1609,7 @@
             <a:fld id="{376BEEA2-7DBA-48C8-A1DD-5F88B3EB48CF}" type="slidenum">
               <a:rPr lang="en-US" smtClean="0"/>
               <a:pPr/>
-              <a:t>‹N›</a:t>
+              <a:t>‹#›</a:t>
             </a:fld>
             <a:endParaRPr lang="en-US"/>
           </a:p>
@@ -1754,7 +1843,7 @@
             <a:fld id="{376BEEA2-7DBA-48C8-A1DD-5F88B3EB48CF}" type="slidenum">
               <a:rPr lang="en-US" smtClean="0"/>
               <a:pPr/>
-              <a:t>‹N›</a:t>
+              <a:t>‹#›</a:t>
             </a:fld>
             <a:endParaRPr lang="en-US"/>
           </a:p>
@@ -2123,7 +2212,7 @@
             <a:fld id="{376BEEA2-7DBA-48C8-A1DD-5F88B3EB48CF}" type="slidenum">
               <a:rPr lang="en-US" smtClean="0"/>
               <a:pPr/>
-              <a:t>‹N›</a:t>
+              <a:t>‹#›</a:t>
             </a:fld>
             <a:endParaRPr lang="en-US"/>
           </a:p>
@@ -2243,7 +2332,7 @@
             <a:fld id="{376BEEA2-7DBA-48C8-A1DD-5F88B3EB48CF}" type="slidenum">
               <a:rPr lang="en-US" smtClean="0"/>
               <a:pPr/>
-              <a:t>‹N›</a:t>
+              <a:t>‹#›</a:t>
             </a:fld>
             <a:endParaRPr lang="en-US"/>
           </a:p>
@@ -2340,7 +2429,7 @@
             <a:fld id="{376BEEA2-7DBA-48C8-A1DD-5F88B3EB48CF}" type="slidenum">
               <a:rPr lang="en-US" smtClean="0"/>
               <a:pPr/>
-              <a:t>‹N›</a:t>
+              <a:t>‹#›</a:t>
             </a:fld>
             <a:endParaRPr lang="en-US"/>
           </a:p>
@@ -2619,7 +2708,7 @@
             <a:fld id="{376BEEA2-7DBA-48C8-A1DD-5F88B3EB48CF}" type="slidenum">
               <a:rPr lang="en-US" smtClean="0"/>
               <a:pPr/>
-              <a:t>‹N›</a:t>
+              <a:t>‹#›</a:t>
             </a:fld>
             <a:endParaRPr lang="en-US"/>
           </a:p>
@@ -2878,7 +2967,7 @@
             <a:fld id="{376BEEA2-7DBA-48C8-A1DD-5F88B3EB48CF}" type="slidenum">
               <a:rPr lang="en-US" smtClean="0"/>
               <a:pPr/>
-              <a:t>‹N›</a:t>
+              <a:t>‹#›</a:t>
             </a:fld>
             <a:endParaRPr lang="en-US"/>
           </a:p>
@@ -3129,7 +3218,7 @@
             <a:fld id="{376BEEA2-7DBA-48C8-A1DD-5F88B3EB48CF}" type="slidenum">
               <a:rPr lang="en-US" smtClean="0"/>
               <a:pPr/>
-              <a:t>‹N›</a:t>
+              <a:t>‹#›</a:t>
             </a:fld>
             <a:endParaRPr lang="en-US"/>
           </a:p>
@@ -9973,14 +10062,14 @@
                 <a:gridCol w="1250165">
                   <a:extLst>
                     <a:ext uri="{9D8B030D-6E8A-4147-A177-3AD203B41FA5}">
-                      <a16:colId xmlns:a16="http://schemas.microsoft.com/office/drawing/2014/main" xmlns="" val="20000"/>
+                      <a16:colId xmlns="" xmlns:a16="http://schemas.microsoft.com/office/drawing/2014/main" val="20000"/>
                     </a:ext>
                   </a:extLst>
                 </a:gridCol>
                 <a:gridCol w="1250165">
                   <a:extLst>
                     <a:ext uri="{9D8B030D-6E8A-4147-A177-3AD203B41FA5}">
-                      <a16:colId xmlns:a16="http://schemas.microsoft.com/office/drawing/2014/main" xmlns="" val="20001"/>
+                      <a16:colId xmlns="" xmlns:a16="http://schemas.microsoft.com/office/drawing/2014/main" val="20001"/>
                     </a:ext>
                   </a:extLst>
                 </a:gridCol>
@@ -10016,7 +10105,7 @@
                 </a:tc>
                 <a:extLst>
                   <a:ext uri="{0D108BD9-81ED-4DB2-BD59-A6C34878D82A}">
-                    <a16:rowId xmlns:a16="http://schemas.microsoft.com/office/drawing/2014/main" xmlns="" val="10000"/>
+                    <a16:rowId xmlns="" xmlns:a16="http://schemas.microsoft.com/office/drawing/2014/main" val="10000"/>
                   </a:ext>
                 </a:extLst>
               </a:tr>
@@ -10063,7 +10152,7 @@
                 </a:tc>
                 <a:extLst>
                   <a:ext uri="{0D108BD9-81ED-4DB2-BD59-A6C34878D82A}">
-                    <a16:rowId xmlns:a16="http://schemas.microsoft.com/office/drawing/2014/main" xmlns="" val="10001"/>
+                    <a16:rowId xmlns="" xmlns:a16="http://schemas.microsoft.com/office/drawing/2014/main" val="10001"/>
                   </a:ext>
                 </a:extLst>
               </a:tr>
@@ -10114,7 +10203,7 @@
                 </a:tc>
                 <a:extLst>
                   <a:ext uri="{0D108BD9-81ED-4DB2-BD59-A6C34878D82A}">
-                    <a16:rowId xmlns:a16="http://schemas.microsoft.com/office/drawing/2014/main" xmlns="" val="10002"/>
+                    <a16:rowId xmlns="" xmlns:a16="http://schemas.microsoft.com/office/drawing/2014/main" val="10002"/>
                   </a:ext>
                 </a:extLst>
               </a:tr>
@@ -10161,7 +10250,7 @@
                 </a:tc>
                 <a:extLst>
                   <a:ext uri="{0D108BD9-81ED-4DB2-BD59-A6C34878D82A}">
-                    <a16:rowId xmlns:a16="http://schemas.microsoft.com/office/drawing/2014/main" xmlns="" val="10003"/>
+                    <a16:rowId xmlns="" xmlns:a16="http://schemas.microsoft.com/office/drawing/2014/main" val="10003"/>
                   </a:ext>
                 </a:extLst>
               </a:tr>
@@ -10212,7 +10301,7 @@
                 </a:tc>
                 <a:extLst>
                   <a:ext uri="{0D108BD9-81ED-4DB2-BD59-A6C34878D82A}">
-                    <a16:rowId xmlns:a16="http://schemas.microsoft.com/office/drawing/2014/main" xmlns="" val="10004"/>
+                    <a16:rowId xmlns="" xmlns:a16="http://schemas.microsoft.com/office/drawing/2014/main" val="10004"/>
                   </a:ext>
                 </a:extLst>
               </a:tr>
@@ -10314,14 +10403,14 @@
                 <a:gridCol w="1250165">
                   <a:extLst>
                     <a:ext uri="{9D8B030D-6E8A-4147-A177-3AD203B41FA5}">
-                      <a16:colId xmlns:a16="http://schemas.microsoft.com/office/drawing/2014/main" xmlns="" val="20000"/>
+                      <a16:colId xmlns="" xmlns:a16="http://schemas.microsoft.com/office/drawing/2014/main" val="20000"/>
                     </a:ext>
                   </a:extLst>
                 </a:gridCol>
                 <a:gridCol w="1250165">
                   <a:extLst>
                     <a:ext uri="{9D8B030D-6E8A-4147-A177-3AD203B41FA5}">
-                      <a16:colId xmlns:a16="http://schemas.microsoft.com/office/drawing/2014/main" xmlns="" val="20001"/>
+                      <a16:colId xmlns="" xmlns:a16="http://schemas.microsoft.com/office/drawing/2014/main" val="20001"/>
                     </a:ext>
                   </a:extLst>
                 </a:gridCol>
@@ -10357,7 +10446,7 @@
                 </a:tc>
                 <a:extLst>
                   <a:ext uri="{0D108BD9-81ED-4DB2-BD59-A6C34878D82A}">
-                    <a16:rowId xmlns:a16="http://schemas.microsoft.com/office/drawing/2014/main" xmlns="" val="10000"/>
+                    <a16:rowId xmlns="" xmlns:a16="http://schemas.microsoft.com/office/drawing/2014/main" val="10000"/>
                   </a:ext>
                 </a:extLst>
               </a:tr>
@@ -10404,7 +10493,7 @@
                 </a:tc>
                 <a:extLst>
                   <a:ext uri="{0D108BD9-81ED-4DB2-BD59-A6C34878D82A}">
-                    <a16:rowId xmlns:a16="http://schemas.microsoft.com/office/drawing/2014/main" xmlns="" val="10001"/>
+                    <a16:rowId xmlns="" xmlns:a16="http://schemas.microsoft.com/office/drawing/2014/main" val="10001"/>
                   </a:ext>
                 </a:extLst>
               </a:tr>
@@ -10455,7 +10544,7 @@
                 </a:tc>
                 <a:extLst>
                   <a:ext uri="{0D108BD9-81ED-4DB2-BD59-A6C34878D82A}">
-                    <a16:rowId xmlns:a16="http://schemas.microsoft.com/office/drawing/2014/main" xmlns="" val="10002"/>
+                    <a16:rowId xmlns="" xmlns:a16="http://schemas.microsoft.com/office/drawing/2014/main" val="10002"/>
                   </a:ext>
                 </a:extLst>
               </a:tr>
@@ -10502,7 +10591,7 @@
                 </a:tc>
                 <a:extLst>
                   <a:ext uri="{0D108BD9-81ED-4DB2-BD59-A6C34878D82A}">
-                    <a16:rowId xmlns:a16="http://schemas.microsoft.com/office/drawing/2014/main" xmlns="" val="10003"/>
+                    <a16:rowId xmlns="" xmlns:a16="http://schemas.microsoft.com/office/drawing/2014/main" val="10003"/>
                   </a:ext>
                 </a:extLst>
               </a:tr>
@@ -10553,7 +10642,7 @@
                 </a:tc>
                 <a:extLst>
                   <a:ext uri="{0D108BD9-81ED-4DB2-BD59-A6C34878D82A}">
-                    <a16:rowId xmlns:a16="http://schemas.microsoft.com/office/drawing/2014/main" xmlns="" val="10004"/>
+                    <a16:rowId xmlns="" xmlns:a16="http://schemas.microsoft.com/office/drawing/2014/main" val="10004"/>
                   </a:ext>
                 </a:extLst>
               </a:tr>
@@ -12749,7 +12838,23 @@
                   <a:schemeClr val="tx1"/>
                 </a:solidFill>
               </a:rPr>
-              <a:t>Orchestrator</a:t>
+              <a:t>Local </a:t>
+            </a:r>
+            <a:r>
+              <a:rPr lang="it-IT" sz="1400" dirty="0">
+                <a:solidFill>
+                  <a:schemeClr val="tx1"/>
+                </a:solidFill>
+              </a:rPr>
+              <a:t>o</a:t>
+            </a:r>
+            <a:r>
+              <a:rPr lang="it-IT" sz="1400" dirty="0" smtClean="0">
+                <a:solidFill>
+                  <a:schemeClr val="tx1"/>
+                </a:solidFill>
+              </a:rPr>
+              <a:t>rchestrator</a:t>
             </a:r>
             <a:endParaRPr sz="1400" dirty="0">
               <a:solidFill>
@@ -13701,7 +13806,7 @@
                   <a:schemeClr val="tx1"/>
                 </a:solidFill>
               </a:rPr>
-              <a:t>Orchestrator</a:t>
+              <a:t>Local orchestrator</a:t>
             </a:r>
             <a:endParaRPr sz="1400" dirty="0">
               <a:solidFill>
@@ -14280,7 +14385,7 @@
         <p:spPr>
           <a:xfrm>
             <a:off x="1716047" y="5886008"/>
-            <a:ext cx="1103653" cy="307777"/>
+            <a:ext cx="3215993" cy="307777"/>
           </a:xfrm>
           <a:prstGeom prst="rect">
             <a:avLst/>
@@ -14295,11 +14400,15 @@
           <a:p>
             <a:r>
               <a:rPr lang="it-IT" sz="1400" dirty="0" smtClean="0"/>
-              <a:t>UN-</a:t>
+              <a:t>Management IP </a:t>
             </a:r>
             <a:r>
               <a:rPr lang="it-IT" sz="1400" dirty="0" err="1" smtClean="0"/>
-              <a:t>Address</a:t>
+              <a:t>address</a:t>
+            </a:r>
+            <a:r>
+              <a:rPr lang="it-IT" sz="1400" dirty="0" smtClean="0"/>
+              <a:t> of the UN</a:t>
             </a:r>
             <a:endParaRPr lang="it-IT" sz="1400" dirty="0"/>
           </a:p>
@@ -14573,6 +14682,128 @@
           </a:fontRef>
         </p:style>
       </p:cxnSp>
+      <p:pic>
+        <p:nvPicPr>
+          <p:cNvPr id="5" name="Picture 4"/>
+          <p:cNvPicPr>
+            <a:picLocks noChangeAspect="1"/>
+          </p:cNvPicPr>
+          <p:nvPr/>
+        </p:nvPicPr>
+        <p:blipFill>
+          <a:blip r:embed="rId3" cstate="print">
+            <a:extLst>
+              <a:ext uri="{28A0092B-C50C-407E-A947-70E740481C1C}">
+                <a14:useLocalDpi xmlns:a14="http://schemas.microsoft.com/office/drawing/2010/main" val="0"/>
+              </a:ext>
+            </a:extLst>
+          </a:blip>
+          <a:stretch>
+            <a:fillRect/>
+          </a:stretch>
+        </p:blipFill>
+        <p:spPr>
+          <a:xfrm flipH="1">
+            <a:off x="4242819" y="4365598"/>
+            <a:ext cx="572008" cy="877079"/>
+          </a:xfrm>
+          <a:prstGeom prst="rect">
+            <a:avLst/>
+          </a:prstGeom>
+        </p:spPr>
+      </p:pic>
+      <p:sp>
+        <p:nvSpPr>
+          <p:cNvPr id="47" name="CasellaDiTesto 23"/>
+          <p:cNvSpPr txBox="1"/>
+          <p:nvPr/>
+        </p:nvSpPr>
+        <p:spPr>
+          <a:xfrm>
+            <a:off x="4461461" y="4846014"/>
+            <a:ext cx="1255050" cy="523220"/>
+          </a:xfrm>
+          <a:prstGeom prst="rect">
+            <a:avLst/>
+          </a:prstGeom>
+          <a:noFill/>
+        </p:spPr>
+        <p:txBody>
+          <a:bodyPr wrap="square" rtlCol="0">
+            <a:spAutoFit/>
+          </a:bodyPr>
+          <a:lstStyle/>
+          <a:p>
+            <a:pPr algn="ctr"/>
+            <a:r>
+              <a:rPr lang="it-IT" sz="1400" dirty="0" smtClean="0"/>
+              <a:t>Global orchestrator</a:t>
+            </a:r>
+            <a:endParaRPr lang="it-IT" sz="1400" dirty="0"/>
+          </a:p>
+        </p:txBody>
+      </p:sp>
+      <p:pic>
+        <p:nvPicPr>
+          <p:cNvPr id="54" name="Picture 53"/>
+          <p:cNvPicPr>
+            <a:picLocks noChangeAspect="1"/>
+          </p:cNvPicPr>
+          <p:nvPr/>
+        </p:nvPicPr>
+        <p:blipFill>
+          <a:blip r:embed="rId3" cstate="print">
+            <a:extLst>
+              <a:ext uri="{28A0092B-C50C-407E-A947-70E740481C1C}">
+                <a14:useLocalDpi xmlns:a14="http://schemas.microsoft.com/office/drawing/2010/main" val="0"/>
+              </a:ext>
+            </a:extLst>
+          </a:blip>
+          <a:stretch>
+            <a:fillRect/>
+          </a:stretch>
+        </p:blipFill>
+        <p:spPr>
+          <a:xfrm flipH="1">
+            <a:off x="7407886" y="4434806"/>
+            <a:ext cx="572008" cy="877079"/>
+          </a:xfrm>
+          <a:prstGeom prst="rect">
+            <a:avLst/>
+          </a:prstGeom>
+        </p:spPr>
+      </p:pic>
+      <p:sp>
+        <p:nvSpPr>
+          <p:cNvPr id="55" name="CasellaDiTesto 23"/>
+          <p:cNvSpPr txBox="1"/>
+          <p:nvPr/>
+        </p:nvSpPr>
+        <p:spPr>
+          <a:xfrm>
+            <a:off x="7626528" y="4915222"/>
+            <a:ext cx="1255050" cy="523220"/>
+          </a:xfrm>
+          <a:prstGeom prst="rect">
+            <a:avLst/>
+          </a:prstGeom>
+          <a:noFill/>
+        </p:spPr>
+        <p:txBody>
+          <a:bodyPr wrap="square" rtlCol="0">
+            <a:spAutoFit/>
+          </a:bodyPr>
+          <a:lstStyle/>
+          <a:p>
+            <a:pPr algn="ctr"/>
+            <a:r>
+              <a:rPr lang="it-IT" sz="1400" dirty="0" smtClean="0"/>
+              <a:t>Global orchestrator</a:t>
+            </a:r>
+            <a:endParaRPr lang="it-IT" sz="1400" dirty="0"/>
+          </a:p>
+        </p:txBody>
+      </p:sp>
     </p:spTree>
     <p:extLst>
       <p:ext uri="{BB962C8B-B14F-4D97-AF65-F5344CB8AC3E}">

</xml_diff>

<commit_message>
Moved pictures to main PPTX file.
</commit_message>
<xml_diff>
--- a/images/Pictures.pptx
+++ b/images/Pictures.pptx
@@ -5,7 +5,7 @@
     <p:sldMasterId id="2147483660" r:id="rId1"/>
   </p:sldMasterIdLst>
   <p:notesMasterIdLst>
-    <p:notesMasterId r:id="rId7"/>
+    <p:notesMasterId r:id="rId9"/>
   </p:notesMasterIdLst>
   <p:sldIdLst>
     <p:sldId id="303" r:id="rId2"/>
@@ -13,6 +13,8 @@
     <p:sldId id="302" r:id="rId4"/>
     <p:sldId id="304" r:id="rId5"/>
     <p:sldId id="305" r:id="rId6"/>
+    <p:sldId id="307" r:id="rId7"/>
+    <p:sldId id="308" r:id="rId8"/>
   </p:sldIdLst>
   <p:sldSz cx="9144000" cy="6858000" type="screen4x3"/>
   <p:notesSz cx="6858000" cy="9144000"/>
@@ -213,7 +215,7 @@
             <a:fld id="{581B34DE-D9D5-401C-8A45-6D5600A3470E}" type="datetimeFigureOut">
               <a:rPr lang="en-US" smtClean="0"/>
               <a:pPr/>
-              <a:t>3/26/2016</a:t>
+              <a:t>6/16/2016</a:t>
             </a:fld>
             <a:endParaRPr lang="en-US"/>
           </a:p>
@@ -530,7 +532,7 @@
           <a:p>
             <a:r>
               <a:rPr lang="it-IT" dirty="0" smtClean="0"/>
-              <a:t>universal-node.pdf</a:t>
+              <a:t>universal-node.png</a:t>
             </a:r>
             <a:endParaRPr lang="it-IT" dirty="0"/>
           </a:p>
@@ -653,6 +655,184 @@
     <p:extLst>
       <p:ext uri="{BB962C8B-B14F-4D97-AF65-F5344CB8AC3E}">
         <p14:creationId xmlns:p14="http://schemas.microsoft.com/office/powerpoint/2010/main" val="4178323500"/>
+      </p:ext>
+    </p:extLst>
+  </p:cSld>
+  <p:clrMapOvr>
+    <a:masterClrMapping/>
+  </p:clrMapOvr>
+</p:notes>
+</file>
+
+<file path=ppt/notesSlides/notesSlide3.xml><?xml version="1.0" encoding="utf-8"?>
+<p:notes xmlns:a="http://schemas.openxmlformats.org/drawingml/2006/main" xmlns:r="http://schemas.openxmlformats.org/officeDocument/2006/relationships" xmlns:p="http://schemas.openxmlformats.org/presentationml/2006/main">
+  <p:cSld>
+    <p:spTree>
+      <p:nvGrpSpPr>
+        <p:cNvPr id="1" name=""/>
+        <p:cNvGrpSpPr/>
+        <p:nvPr/>
+      </p:nvGrpSpPr>
+      <p:grpSpPr>
+        <a:xfrm>
+          <a:off x="0" y="0"/>
+          <a:ext cx="0" cy="0"/>
+          <a:chOff x="0" y="0"/>
+          <a:chExt cx="0" cy="0"/>
+        </a:xfrm>
+      </p:grpSpPr>
+      <p:sp>
+        <p:nvSpPr>
+          <p:cNvPr id="2" name="Slide Image Placeholder 1"/>
+          <p:cNvSpPr>
+            <a:spLocks noGrp="1" noRot="1" noChangeAspect="1"/>
+          </p:cNvSpPr>
+          <p:nvPr>
+            <p:ph type="sldImg"/>
+          </p:nvPr>
+        </p:nvSpPr>
+        <p:spPr/>
+      </p:sp>
+      <p:sp>
+        <p:nvSpPr>
+          <p:cNvPr id="3" name="Notes Placeholder 2"/>
+          <p:cNvSpPr>
+            <a:spLocks noGrp="1"/>
+          </p:cNvSpPr>
+          <p:nvPr>
+            <p:ph type="body" idx="1"/>
+          </p:nvPr>
+        </p:nvSpPr>
+        <p:spPr/>
+        <p:txBody>
+          <a:bodyPr/>
+          <a:lstStyle/>
+          <a:p>
+            <a:r>
+              <a:rPr lang="en-US" dirty="0" smtClean="0"/>
+              <a:t>RUD.png</a:t>
+            </a:r>
+            <a:endParaRPr lang="en-US" dirty="0"/>
+          </a:p>
+        </p:txBody>
+      </p:sp>
+      <p:sp>
+        <p:nvSpPr>
+          <p:cNvPr id="4" name="Slide Number Placeholder 3"/>
+          <p:cNvSpPr>
+            <a:spLocks noGrp="1"/>
+          </p:cNvSpPr>
+          <p:nvPr>
+            <p:ph type="sldNum" sz="quarter" idx="10"/>
+          </p:nvPr>
+        </p:nvSpPr>
+        <p:spPr/>
+        <p:txBody>
+          <a:bodyPr/>
+          <a:lstStyle/>
+          <a:p>
+            <a:fld id="{96ADF636-4A01-4CCE-85D9-7F2B0C6E604A}" type="slidenum">
+              <a:rPr lang="en-US" smtClean="0"/>
+              <a:pPr/>
+              <a:t>6</a:t>
+            </a:fld>
+            <a:endParaRPr lang="en-US"/>
+          </a:p>
+        </p:txBody>
+      </p:sp>
+    </p:spTree>
+    <p:extLst>
+      <p:ext uri="{BB962C8B-B14F-4D97-AF65-F5344CB8AC3E}">
+        <p14:creationId xmlns:p14="http://schemas.microsoft.com/office/powerpoint/2010/main" val="3164758251"/>
+      </p:ext>
+    </p:extLst>
+  </p:cSld>
+  <p:clrMapOvr>
+    <a:masterClrMapping/>
+  </p:clrMapOvr>
+</p:notes>
+</file>
+
+<file path=ppt/notesSlides/notesSlide4.xml><?xml version="1.0" encoding="utf-8"?>
+<p:notes xmlns:a="http://schemas.openxmlformats.org/drawingml/2006/main" xmlns:r="http://schemas.openxmlformats.org/officeDocument/2006/relationships" xmlns:p="http://schemas.openxmlformats.org/presentationml/2006/main">
+  <p:cSld>
+    <p:spTree>
+      <p:nvGrpSpPr>
+        <p:cNvPr id="1" name=""/>
+        <p:cNvGrpSpPr/>
+        <p:nvPr/>
+      </p:nvGrpSpPr>
+      <p:grpSpPr>
+        <a:xfrm>
+          <a:off x="0" y="0"/>
+          <a:ext cx="0" cy="0"/>
+          <a:chOff x="0" y="0"/>
+          <a:chExt cx="0" cy="0"/>
+        </a:xfrm>
+      </p:grpSpPr>
+      <p:sp>
+        <p:nvSpPr>
+          <p:cNvPr id="2" name="Slide Image Placeholder 1"/>
+          <p:cNvSpPr>
+            <a:spLocks noGrp="1" noRot="1" noChangeAspect="1"/>
+          </p:cNvSpPr>
+          <p:nvPr>
+            <p:ph type="sldImg"/>
+          </p:nvPr>
+        </p:nvSpPr>
+        <p:spPr/>
+      </p:sp>
+      <p:sp>
+        <p:nvSpPr>
+          <p:cNvPr id="3" name="Notes Placeholder 2"/>
+          <p:cNvSpPr>
+            <a:spLocks noGrp="1"/>
+          </p:cNvSpPr>
+          <p:nvPr>
+            <p:ph type="body" idx="1"/>
+          </p:nvPr>
+        </p:nvSpPr>
+        <p:spPr/>
+        <p:txBody>
+          <a:bodyPr/>
+          <a:lstStyle/>
+          <a:p>
+            <a:r>
+              <a:rPr lang="en-US" smtClean="0"/>
+              <a:t>Creation.png</a:t>
+            </a:r>
+            <a:endParaRPr lang="en-US" dirty="0"/>
+          </a:p>
+        </p:txBody>
+      </p:sp>
+      <p:sp>
+        <p:nvSpPr>
+          <p:cNvPr id="4" name="Slide Number Placeholder 3"/>
+          <p:cNvSpPr>
+            <a:spLocks noGrp="1"/>
+          </p:cNvSpPr>
+          <p:nvPr>
+            <p:ph type="sldNum" sz="quarter" idx="10"/>
+          </p:nvPr>
+        </p:nvSpPr>
+        <p:spPr/>
+        <p:txBody>
+          <a:bodyPr/>
+          <a:lstStyle/>
+          <a:p>
+            <a:fld id="{96ADF636-4A01-4CCE-85D9-7F2B0C6E604A}" type="slidenum">
+              <a:rPr lang="en-US" smtClean="0"/>
+              <a:pPr/>
+              <a:t>7</a:t>
+            </a:fld>
+            <a:endParaRPr lang="en-US"/>
+          </a:p>
+        </p:txBody>
+      </p:sp>
+    </p:spTree>
+    <p:extLst>
+      <p:ext uri="{BB962C8B-B14F-4D97-AF65-F5344CB8AC3E}">
+        <p14:creationId xmlns:p14="http://schemas.microsoft.com/office/powerpoint/2010/main" val="2769061943"/>
       </p:ext>
     </p:extLst>
   </p:cSld>
@@ -794,7 +974,7 @@
             <a:fld id="{3D599013-5C43-42B3-986A-3CF64AAE02B4}" type="datetimeFigureOut">
               <a:rPr lang="en-US" smtClean="0"/>
               <a:pPr/>
-              <a:t>3/26/2016</a:t>
+              <a:t>6/16/2016</a:t>
             </a:fld>
             <a:endParaRPr lang="en-US"/>
           </a:p>
@@ -966,7 +1146,7 @@
             <a:fld id="{3D599013-5C43-42B3-986A-3CF64AAE02B4}" type="datetimeFigureOut">
               <a:rPr lang="en-US" smtClean="0"/>
               <a:pPr/>
-              <a:t>3/26/2016</a:t>
+              <a:t>6/16/2016</a:t>
             </a:fld>
             <a:endParaRPr lang="en-US"/>
           </a:p>
@@ -1148,7 +1328,7 @@
             <a:fld id="{3D599013-5C43-42B3-986A-3CF64AAE02B4}" type="datetimeFigureOut">
               <a:rPr lang="en-US" smtClean="0"/>
               <a:pPr/>
-              <a:t>3/26/2016</a:t>
+              <a:t>6/16/2016</a:t>
             </a:fld>
             <a:endParaRPr lang="en-US"/>
           </a:p>
@@ -1320,7 +1500,7 @@
             <a:fld id="{3D599013-5C43-42B3-986A-3CF64AAE02B4}" type="datetimeFigureOut">
               <a:rPr lang="en-US" smtClean="0"/>
               <a:pPr/>
-              <a:t>3/26/2016</a:t>
+              <a:t>6/16/2016</a:t>
             </a:fld>
             <a:endParaRPr lang="en-US"/>
           </a:p>
@@ -1566,7 +1746,7 @@
             <a:fld id="{3D599013-5C43-42B3-986A-3CF64AAE02B4}" type="datetimeFigureOut">
               <a:rPr lang="en-US" smtClean="0"/>
               <a:pPr/>
-              <a:t>3/26/2016</a:t>
+              <a:t>6/16/2016</a:t>
             </a:fld>
             <a:endParaRPr lang="en-US"/>
           </a:p>
@@ -1800,7 +1980,7 @@
             <a:fld id="{3D599013-5C43-42B3-986A-3CF64AAE02B4}" type="datetimeFigureOut">
               <a:rPr lang="en-US" smtClean="0"/>
               <a:pPr/>
-              <a:t>3/26/2016</a:t>
+              <a:t>6/16/2016</a:t>
             </a:fld>
             <a:endParaRPr lang="en-US"/>
           </a:p>
@@ -2169,7 +2349,7 @@
             <a:fld id="{3D599013-5C43-42B3-986A-3CF64AAE02B4}" type="datetimeFigureOut">
               <a:rPr lang="en-US" smtClean="0"/>
               <a:pPr/>
-              <a:t>3/26/2016</a:t>
+              <a:t>6/16/2016</a:t>
             </a:fld>
             <a:endParaRPr lang="en-US"/>
           </a:p>
@@ -2289,7 +2469,7 @@
             <a:fld id="{3D599013-5C43-42B3-986A-3CF64AAE02B4}" type="datetimeFigureOut">
               <a:rPr lang="en-US" smtClean="0"/>
               <a:pPr/>
-              <a:t>3/26/2016</a:t>
+              <a:t>6/16/2016</a:t>
             </a:fld>
             <a:endParaRPr lang="en-US"/>
           </a:p>
@@ -2386,7 +2566,7 @@
             <a:fld id="{3D599013-5C43-42B3-986A-3CF64AAE02B4}" type="datetimeFigureOut">
               <a:rPr lang="en-US" smtClean="0"/>
               <a:pPr/>
-              <a:t>3/26/2016</a:t>
+              <a:t>6/16/2016</a:t>
             </a:fld>
             <a:endParaRPr lang="en-US"/>
           </a:p>
@@ -2665,7 +2845,7 @@
             <a:fld id="{3D599013-5C43-42B3-986A-3CF64AAE02B4}" type="datetimeFigureOut">
               <a:rPr lang="en-US" smtClean="0"/>
               <a:pPr/>
-              <a:t>3/26/2016</a:t>
+              <a:t>6/16/2016</a:t>
             </a:fld>
             <a:endParaRPr lang="en-US"/>
           </a:p>
@@ -2924,7 +3104,7 @@
             <a:fld id="{3D599013-5C43-42B3-986A-3CF64AAE02B4}" type="datetimeFigureOut">
               <a:rPr lang="en-US" smtClean="0"/>
               <a:pPr/>
-              <a:t>3/26/2016</a:t>
+              <a:t>6/16/2016</a:t>
             </a:fld>
             <a:endParaRPr lang="en-US"/>
           </a:p>
@@ -3139,7 +3319,7 @@
             <a:fld id="{3D599013-5C43-42B3-986A-3CF64AAE02B4}" type="datetimeFigureOut">
               <a:rPr lang="en-US" smtClean="0"/>
               <a:pPr/>
-              <a:t>3/26/2016</a:t>
+              <a:t>6/16/2016</a:t>
             </a:fld>
             <a:endParaRPr lang="en-US"/>
           </a:p>
@@ -15381,6 +15561,105 @@
           </a:p>
         </p:txBody>
       </p:sp>
+      <p:sp>
+        <p:nvSpPr>
+          <p:cNvPr id="7" name="Rectangle 6"/>
+          <p:cNvSpPr/>
+          <p:nvPr/>
+        </p:nvSpPr>
+        <p:spPr>
+          <a:xfrm>
+            <a:off x="3355673" y="3244334"/>
+            <a:ext cx="2432654" cy="369332"/>
+          </a:xfrm>
+          <a:prstGeom prst="rect">
+            <a:avLst/>
+          </a:prstGeom>
+        </p:spPr>
+        <p:txBody>
+          <a:bodyPr wrap="none">
+            <a:spAutoFit/>
+          </a:bodyPr>
+          <a:lstStyle/>
+          <a:p>
+            <a:r>
+              <a:rPr lang="en-US" dirty="0">
+                <a:solidFill>
+                  <a:srgbClr val="606060"/>
+                </a:solidFill>
+              </a:rPr>
+              <a:t>Intel Corporation NV/SA</a:t>
+            </a:r>
+            <a:endParaRPr lang="en-US" dirty="0"/>
+          </a:p>
+        </p:txBody>
+      </p:sp>
+      <p:sp>
+        <p:nvSpPr>
+          <p:cNvPr id="8" name="Rectangle 7"/>
+          <p:cNvSpPr/>
+          <p:nvPr/>
+        </p:nvSpPr>
+        <p:spPr>
+          <a:xfrm>
+            <a:off x="3355673" y="3244334"/>
+            <a:ext cx="2432654" cy="369332"/>
+          </a:xfrm>
+          <a:prstGeom prst="rect">
+            <a:avLst/>
+          </a:prstGeom>
+        </p:spPr>
+        <p:txBody>
+          <a:bodyPr wrap="none">
+            <a:spAutoFit/>
+          </a:bodyPr>
+          <a:lstStyle/>
+          <a:p>
+            <a:r>
+              <a:rPr lang="en-US" dirty="0">
+                <a:solidFill>
+                  <a:srgbClr val="606060"/>
+                </a:solidFill>
+              </a:rPr>
+              <a:t>Intel Corporation NV/SA</a:t>
+            </a:r>
+            <a:endParaRPr lang="en-US" dirty="0"/>
+          </a:p>
+        </p:txBody>
+      </p:sp>
+      <p:sp>
+        <p:nvSpPr>
+          <p:cNvPr id="9" name="Rectangle 8"/>
+          <p:cNvSpPr/>
+          <p:nvPr/>
+        </p:nvSpPr>
+        <p:spPr>
+          <a:xfrm>
+            <a:off x="3355673" y="3244334"/>
+            <a:ext cx="2432654" cy="369332"/>
+          </a:xfrm>
+          <a:prstGeom prst="rect">
+            <a:avLst/>
+          </a:prstGeom>
+        </p:spPr>
+        <p:txBody>
+          <a:bodyPr wrap="none">
+            <a:spAutoFit/>
+          </a:bodyPr>
+          <a:lstStyle/>
+          <a:p>
+            <a:r>
+              <a:rPr lang="en-US" dirty="0">
+                <a:solidFill>
+                  <a:srgbClr val="606060"/>
+                </a:solidFill>
+              </a:rPr>
+              <a:t>Intel Corporation NV/SA</a:t>
+            </a:r>
+            <a:endParaRPr lang="en-US" dirty="0"/>
+          </a:p>
+        </p:txBody>
+      </p:sp>
     </p:spTree>
     <p:extLst>
       <p:ext uri="{BB962C8B-B14F-4D97-AF65-F5344CB8AC3E}">
@@ -15398,6 +15677,3445 @@
       </p:par>
     </p:tnLst>
   </p:timing>
+</p:sld>
+</file>
+
+<file path=ppt/slides/slide6.xml><?xml version="1.0" encoding="utf-8"?>
+<p:sld xmlns:a="http://schemas.openxmlformats.org/drawingml/2006/main" xmlns:r="http://schemas.openxmlformats.org/officeDocument/2006/relationships" xmlns:p="http://schemas.openxmlformats.org/presentationml/2006/main">
+  <p:cSld>
+    <p:spTree>
+      <p:nvGrpSpPr>
+        <p:cNvPr id="1" name=""/>
+        <p:cNvGrpSpPr/>
+        <p:nvPr/>
+      </p:nvGrpSpPr>
+      <p:grpSpPr>
+        <a:xfrm>
+          <a:off x="0" y="0"/>
+          <a:ext cx="0" cy="0"/>
+          <a:chOff x="0" y="0"/>
+          <a:chExt cx="0" cy="0"/>
+        </a:xfrm>
+      </p:grpSpPr>
+      <p:sp>
+        <p:nvSpPr>
+          <p:cNvPr id="32" name="Terminatore 31"/>
+          <p:cNvSpPr/>
+          <p:nvPr/>
+        </p:nvSpPr>
+        <p:spPr>
+          <a:xfrm>
+            <a:off x="1806464" y="958880"/>
+            <a:ext cx="731505" cy="331533"/>
+          </a:xfrm>
+          <a:prstGeom prst="flowChartTerminator">
+            <a:avLst/>
+          </a:prstGeom>
+          <a:solidFill>
+            <a:schemeClr val="accent1">
+              <a:lumMod val="20000"/>
+              <a:lumOff val="80000"/>
+            </a:schemeClr>
+          </a:solidFill>
+          <a:ln>
+            <a:solidFill>
+              <a:schemeClr val="tx1"/>
+            </a:solidFill>
+          </a:ln>
+        </p:spPr>
+        <p:style>
+          <a:lnRef idx="2">
+            <a:schemeClr val="accent1">
+              <a:shade val="50000"/>
+            </a:schemeClr>
+          </a:lnRef>
+          <a:fillRef idx="1">
+            <a:schemeClr val="accent1"/>
+          </a:fillRef>
+          <a:effectRef idx="0">
+            <a:schemeClr val="accent1"/>
+          </a:effectRef>
+          <a:fontRef idx="minor">
+            <a:schemeClr val="lt1"/>
+          </a:fontRef>
+        </p:style>
+        <p:txBody>
+          <a:bodyPr rtlCol="0" anchor="ctr"/>
+          <a:lstStyle/>
+          <a:p>
+            <a:pPr algn="ctr"/>
+            <a:r>
+              <a:rPr lang="it-IT" sz="900" dirty="0">
+                <a:solidFill>
+                  <a:schemeClr val="tx1"/>
+                </a:solidFill>
+              </a:rPr>
+              <a:t>Start</a:t>
+            </a:r>
+          </a:p>
+        </p:txBody>
+      </p:sp>
+      <p:sp>
+        <p:nvSpPr>
+          <p:cNvPr id="33" name="Elaborazione 32"/>
+          <p:cNvSpPr/>
+          <p:nvPr/>
+        </p:nvSpPr>
+        <p:spPr>
+          <a:xfrm>
+            <a:off x="972234" y="1459768"/>
+            <a:ext cx="2398208" cy="419204"/>
+          </a:xfrm>
+          <a:prstGeom prst="flowChartProcess">
+            <a:avLst/>
+          </a:prstGeom>
+          <a:solidFill>
+            <a:srgbClr val="CCFFCC"/>
+          </a:solidFill>
+          <a:ln>
+            <a:solidFill>
+              <a:schemeClr val="tx1"/>
+            </a:solidFill>
+          </a:ln>
+        </p:spPr>
+        <p:style>
+          <a:lnRef idx="2">
+            <a:schemeClr val="accent1">
+              <a:shade val="50000"/>
+            </a:schemeClr>
+          </a:lnRef>
+          <a:fillRef idx="1">
+            <a:schemeClr val="accent1"/>
+          </a:fillRef>
+          <a:effectRef idx="0">
+            <a:schemeClr val="accent1"/>
+          </a:effectRef>
+          <a:fontRef idx="minor">
+            <a:schemeClr val="lt1"/>
+          </a:fontRef>
+        </p:style>
+        <p:txBody>
+          <a:bodyPr rtlCol="0" anchor="ctr"/>
+          <a:lstStyle/>
+          <a:p>
+            <a:pPr algn="ctr"/>
+            <a:r>
+              <a:rPr lang="en-US" sz="1200" dirty="0">
+                <a:solidFill>
+                  <a:schemeClr val="tx1"/>
+                </a:solidFill>
+              </a:rPr>
+              <a:t>Receive a read / update / delete request</a:t>
+            </a:r>
+            <a:endParaRPr lang="it-IT" sz="1200" dirty="0">
+              <a:solidFill>
+                <a:schemeClr val="tx1"/>
+              </a:solidFill>
+            </a:endParaRPr>
+          </a:p>
+        </p:txBody>
+      </p:sp>
+      <p:sp>
+        <p:nvSpPr>
+          <p:cNvPr id="36" name="Elaborazione 35"/>
+          <p:cNvSpPr/>
+          <p:nvPr/>
+        </p:nvSpPr>
+        <p:spPr>
+          <a:xfrm>
+            <a:off x="978494" y="3329099"/>
+            <a:ext cx="2398208" cy="424575"/>
+          </a:xfrm>
+          <a:prstGeom prst="flowChartProcess">
+            <a:avLst/>
+          </a:prstGeom>
+          <a:solidFill>
+            <a:srgbClr val="CCFFCC"/>
+          </a:solidFill>
+          <a:ln>
+            <a:solidFill>
+              <a:schemeClr val="tx1"/>
+            </a:solidFill>
+          </a:ln>
+        </p:spPr>
+        <p:style>
+          <a:lnRef idx="2">
+            <a:schemeClr val="accent1">
+              <a:shade val="50000"/>
+            </a:schemeClr>
+          </a:lnRef>
+          <a:fillRef idx="1">
+            <a:schemeClr val="accent1"/>
+          </a:fillRef>
+          <a:effectRef idx="0">
+            <a:schemeClr val="accent1"/>
+          </a:effectRef>
+          <a:fontRef idx="minor">
+            <a:schemeClr val="lt1"/>
+          </a:fontRef>
+        </p:style>
+        <p:txBody>
+          <a:bodyPr rtlCol="0" anchor="ctr"/>
+          <a:lstStyle/>
+          <a:p>
+            <a:pPr algn="ctr"/>
+            <a:r>
+              <a:rPr lang="it-IT" sz="1200" dirty="0" err="1">
+                <a:solidFill>
+                  <a:schemeClr val="tx1"/>
+                </a:solidFill>
+              </a:rPr>
+              <a:t>Verify</a:t>
+            </a:r>
+            <a:r>
+              <a:rPr lang="it-IT" sz="1200" dirty="0">
+                <a:solidFill>
+                  <a:schemeClr val="tx1"/>
+                </a:solidFill>
+              </a:rPr>
+              <a:t> </a:t>
+            </a:r>
+            <a:r>
+              <a:rPr lang="it-IT" sz="1200" dirty="0" err="1">
+                <a:solidFill>
+                  <a:schemeClr val="tx1"/>
+                </a:solidFill>
+              </a:rPr>
+              <a:t>that</a:t>
+            </a:r>
+            <a:r>
+              <a:rPr lang="it-IT" sz="1200" dirty="0">
+                <a:solidFill>
+                  <a:schemeClr val="tx1"/>
+                </a:solidFill>
+              </a:rPr>
+              <a:t> the </a:t>
+            </a:r>
+            <a:r>
+              <a:rPr lang="it-IT" sz="1200" dirty="0" err="1">
+                <a:solidFill>
+                  <a:schemeClr val="tx1"/>
+                </a:solidFill>
+              </a:rPr>
+              <a:t>requested</a:t>
+            </a:r>
+            <a:r>
+              <a:rPr lang="it-IT" sz="1200" dirty="0">
+                <a:solidFill>
+                  <a:schemeClr val="tx1"/>
+                </a:solidFill>
+              </a:rPr>
+              <a:t> </a:t>
+            </a:r>
+            <a:r>
+              <a:rPr lang="it-IT" sz="1200" dirty="0" err="1">
+                <a:solidFill>
+                  <a:schemeClr val="tx1"/>
+                </a:solidFill>
+              </a:rPr>
+              <a:t>resource</a:t>
+            </a:r>
+            <a:r>
+              <a:rPr lang="it-IT" sz="1200" dirty="0">
+                <a:solidFill>
+                  <a:schemeClr val="tx1"/>
+                </a:solidFill>
+              </a:rPr>
+              <a:t> </a:t>
+            </a:r>
+            <a:r>
+              <a:rPr lang="it-IT" sz="1200" dirty="0" err="1">
+                <a:solidFill>
+                  <a:schemeClr val="tx1"/>
+                </a:solidFill>
+              </a:rPr>
+              <a:t>exists</a:t>
+            </a:r>
+            <a:endParaRPr lang="it-IT" sz="1200" dirty="0">
+              <a:solidFill>
+                <a:schemeClr val="tx1"/>
+              </a:solidFill>
+            </a:endParaRPr>
+          </a:p>
+        </p:txBody>
+      </p:sp>
+      <p:sp>
+        <p:nvSpPr>
+          <p:cNvPr id="37" name="Decisione 36"/>
+          <p:cNvSpPr/>
+          <p:nvPr/>
+        </p:nvSpPr>
+        <p:spPr>
+          <a:xfrm>
+            <a:off x="1670346" y="2659528"/>
+            <a:ext cx="1001984" cy="506708"/>
+          </a:xfrm>
+          <a:prstGeom prst="flowChartDecision">
+            <a:avLst/>
+          </a:prstGeom>
+          <a:solidFill>
+            <a:srgbClr val="FFFFCC"/>
+          </a:solidFill>
+          <a:ln>
+            <a:solidFill>
+              <a:schemeClr val="tx1"/>
+            </a:solidFill>
+          </a:ln>
+        </p:spPr>
+        <p:style>
+          <a:lnRef idx="2">
+            <a:schemeClr val="accent1">
+              <a:shade val="50000"/>
+            </a:schemeClr>
+          </a:lnRef>
+          <a:fillRef idx="1">
+            <a:schemeClr val="accent1"/>
+          </a:fillRef>
+          <a:effectRef idx="0">
+            <a:schemeClr val="accent1"/>
+          </a:effectRef>
+          <a:fontRef idx="minor">
+            <a:schemeClr val="lt1"/>
+          </a:fontRef>
+        </p:style>
+        <p:txBody>
+          <a:bodyPr rtlCol="0" anchor="ctr"/>
+          <a:lstStyle/>
+          <a:p>
+            <a:pPr algn="ctr"/>
+            <a:r>
+              <a:rPr lang="it-IT" sz="900" dirty="0">
+                <a:solidFill>
+                  <a:schemeClr val="tx1"/>
+                </a:solidFill>
+              </a:rPr>
+              <a:t>Match?</a:t>
+            </a:r>
+          </a:p>
+        </p:txBody>
+      </p:sp>
+      <p:sp>
+        <p:nvSpPr>
+          <p:cNvPr id="38" name="Elaborazione 37"/>
+          <p:cNvSpPr/>
+          <p:nvPr/>
+        </p:nvSpPr>
+        <p:spPr>
+          <a:xfrm>
+            <a:off x="4889819" y="3327941"/>
+            <a:ext cx="2648015" cy="427197"/>
+          </a:xfrm>
+          <a:prstGeom prst="flowChartProcess">
+            <a:avLst/>
+          </a:prstGeom>
+          <a:solidFill>
+            <a:srgbClr val="CCFFCC"/>
+          </a:solidFill>
+          <a:ln>
+            <a:solidFill>
+              <a:schemeClr val="tx1"/>
+            </a:solidFill>
+          </a:ln>
+        </p:spPr>
+        <p:style>
+          <a:lnRef idx="2">
+            <a:schemeClr val="accent1">
+              <a:shade val="50000"/>
+            </a:schemeClr>
+          </a:lnRef>
+          <a:fillRef idx="1">
+            <a:schemeClr val="accent1"/>
+          </a:fillRef>
+          <a:effectRef idx="0">
+            <a:schemeClr val="accent1"/>
+          </a:effectRef>
+          <a:fontRef idx="minor">
+            <a:schemeClr val="lt1"/>
+          </a:fontRef>
+        </p:style>
+        <p:txBody>
+          <a:bodyPr rtlCol="0" anchor="ctr"/>
+          <a:lstStyle/>
+          <a:p>
+            <a:pPr algn="ctr"/>
+            <a:r>
+              <a:rPr lang="it-IT" sz="1200" dirty="0" err="1">
+                <a:solidFill>
+                  <a:schemeClr val="tx1"/>
+                </a:solidFill>
+              </a:rPr>
+              <a:t>Check</a:t>
+            </a:r>
+            <a:r>
+              <a:rPr lang="it-IT" sz="1200" dirty="0">
+                <a:solidFill>
+                  <a:schemeClr val="tx1"/>
+                </a:solidFill>
+              </a:rPr>
+              <a:t> </a:t>
+            </a:r>
+            <a:r>
+              <a:rPr lang="it-IT" sz="1200" dirty="0" err="1">
+                <a:solidFill>
+                  <a:schemeClr val="tx1"/>
+                </a:solidFill>
+              </a:rPr>
+              <a:t>permissions</a:t>
+            </a:r>
+            <a:endParaRPr lang="it-IT" sz="1200" dirty="0">
+              <a:solidFill>
+                <a:schemeClr val="tx1"/>
+              </a:solidFill>
+            </a:endParaRPr>
+          </a:p>
+        </p:txBody>
+      </p:sp>
+      <p:sp>
+        <p:nvSpPr>
+          <p:cNvPr id="41" name="Elaborazione 40"/>
+          <p:cNvSpPr/>
+          <p:nvPr/>
+        </p:nvSpPr>
+        <p:spPr>
+          <a:xfrm>
+            <a:off x="4889819" y="4702011"/>
+            <a:ext cx="2648015" cy="462143"/>
+          </a:xfrm>
+          <a:prstGeom prst="flowChartProcess">
+            <a:avLst/>
+          </a:prstGeom>
+          <a:solidFill>
+            <a:srgbClr val="CCFFCC"/>
+          </a:solidFill>
+          <a:ln>
+            <a:solidFill>
+              <a:schemeClr val="tx1"/>
+            </a:solidFill>
+          </a:ln>
+        </p:spPr>
+        <p:style>
+          <a:lnRef idx="2">
+            <a:schemeClr val="accent1">
+              <a:shade val="50000"/>
+            </a:schemeClr>
+          </a:lnRef>
+          <a:fillRef idx="1">
+            <a:schemeClr val="accent1"/>
+          </a:fillRef>
+          <a:effectRef idx="0">
+            <a:schemeClr val="accent1"/>
+          </a:effectRef>
+          <a:fontRef idx="minor">
+            <a:schemeClr val="lt1"/>
+          </a:fontRef>
+        </p:style>
+        <p:txBody>
+          <a:bodyPr rtlCol="0" anchor="ctr"/>
+          <a:lstStyle/>
+          <a:p>
+            <a:pPr algn="ctr"/>
+            <a:r>
+              <a:rPr lang="it-IT" sz="1200" dirty="0" err="1">
+                <a:solidFill>
+                  <a:schemeClr val="tx1"/>
+                </a:solidFill>
+              </a:rPr>
+              <a:t>Perform</a:t>
+            </a:r>
+            <a:r>
+              <a:rPr lang="it-IT" sz="1200" dirty="0">
+                <a:solidFill>
+                  <a:schemeClr val="tx1"/>
+                </a:solidFill>
+              </a:rPr>
+              <a:t> </a:t>
+            </a:r>
+            <a:r>
+              <a:rPr lang="it-IT" sz="1200" dirty="0" err="1">
+                <a:solidFill>
+                  <a:schemeClr val="tx1"/>
+                </a:solidFill>
+              </a:rPr>
+              <a:t>operation</a:t>
+            </a:r>
+            <a:endParaRPr lang="it-IT" sz="1200" dirty="0">
+              <a:solidFill>
+                <a:schemeClr val="tx1"/>
+              </a:solidFill>
+            </a:endParaRPr>
+          </a:p>
+        </p:txBody>
+      </p:sp>
+      <p:sp>
+        <p:nvSpPr>
+          <p:cNvPr id="64" name="CasellaDiTesto 63"/>
+          <p:cNvSpPr txBox="1"/>
+          <p:nvPr/>
+        </p:nvSpPr>
+        <p:spPr>
+          <a:xfrm>
+            <a:off x="4561693" y="3339359"/>
+            <a:ext cx="340158" cy="230832"/>
+          </a:xfrm>
+          <a:prstGeom prst="rect">
+            <a:avLst/>
+          </a:prstGeom>
+          <a:noFill/>
+          <a:ln>
+            <a:noFill/>
+          </a:ln>
+        </p:spPr>
+        <p:txBody>
+          <a:bodyPr wrap="none" rtlCol="0">
+            <a:spAutoFit/>
+          </a:bodyPr>
+          <a:lstStyle/>
+          <a:p>
+            <a:r>
+              <a:rPr lang="it-IT" sz="900" dirty="0"/>
+              <a:t>yes</a:t>
+            </a:r>
+            <a:endParaRPr lang="en-GB" sz="900" dirty="0"/>
+          </a:p>
+        </p:txBody>
+      </p:sp>
+      <p:sp>
+        <p:nvSpPr>
+          <p:cNvPr id="70" name="Disco magnetico 69"/>
+          <p:cNvSpPr/>
+          <p:nvPr/>
+        </p:nvSpPr>
+        <p:spPr>
+          <a:xfrm>
+            <a:off x="3237908" y="3587906"/>
+            <a:ext cx="284884" cy="300380"/>
+          </a:xfrm>
+          <a:prstGeom prst="flowChartMagneticDisk">
+            <a:avLst/>
+          </a:prstGeom>
+          <a:ln>
+            <a:solidFill>
+              <a:schemeClr val="tx1"/>
+            </a:solidFill>
+          </a:ln>
+        </p:spPr>
+        <p:style>
+          <a:lnRef idx="2">
+            <a:schemeClr val="accent4">
+              <a:shade val="50000"/>
+            </a:schemeClr>
+          </a:lnRef>
+          <a:fillRef idx="1">
+            <a:schemeClr val="accent4"/>
+          </a:fillRef>
+          <a:effectRef idx="0">
+            <a:schemeClr val="accent4"/>
+          </a:effectRef>
+          <a:fontRef idx="minor">
+            <a:schemeClr val="lt1"/>
+          </a:fontRef>
+        </p:style>
+        <p:txBody>
+          <a:bodyPr rtlCol="0" anchor="ctr"/>
+          <a:lstStyle/>
+          <a:p>
+            <a:pPr algn="ctr"/>
+            <a:endParaRPr lang="en-GB" sz="1350">
+              <a:solidFill>
+                <a:srgbClr val="FFFF00"/>
+              </a:solidFill>
+            </a:endParaRPr>
+          </a:p>
+        </p:txBody>
+      </p:sp>
+      <p:sp>
+        <p:nvSpPr>
+          <p:cNvPr id="73" name="CasellaDiTesto 72"/>
+          <p:cNvSpPr txBox="1"/>
+          <p:nvPr/>
+        </p:nvSpPr>
+        <p:spPr>
+          <a:xfrm>
+            <a:off x="2327776" y="3728505"/>
+            <a:ext cx="1259521" cy="507831"/>
+          </a:xfrm>
+          <a:prstGeom prst="rect">
+            <a:avLst/>
+          </a:prstGeom>
+          <a:noFill/>
+          <a:ln>
+            <a:noFill/>
+          </a:ln>
+        </p:spPr>
+        <p:txBody>
+          <a:bodyPr wrap="square" rtlCol="0">
+            <a:spAutoFit/>
+          </a:bodyPr>
+          <a:lstStyle/>
+          <a:p>
+            <a:r>
+              <a:rPr lang="it-IT" sz="900" i="1" dirty="0" err="1">
+                <a:solidFill>
+                  <a:schemeClr val="accent2">
+                    <a:lumMod val="75000"/>
+                  </a:schemeClr>
+                </a:solidFill>
+              </a:rPr>
+              <a:t>Lookup</a:t>
+            </a:r>
+            <a:r>
+              <a:rPr lang="it-IT" sz="900" i="1" dirty="0">
+                <a:solidFill>
+                  <a:schemeClr val="accent2">
+                    <a:lumMod val="75000"/>
+                  </a:schemeClr>
+                </a:solidFill>
+              </a:rPr>
+              <a:t> on CURRENT_RESOURCES_PERMISSION</a:t>
+            </a:r>
+            <a:endParaRPr lang="en-GB" sz="900" dirty="0">
+              <a:solidFill>
+                <a:schemeClr val="accent2">
+                  <a:lumMod val="75000"/>
+                </a:schemeClr>
+              </a:solidFill>
+            </a:endParaRPr>
+          </a:p>
+        </p:txBody>
+      </p:sp>
+      <p:sp>
+        <p:nvSpPr>
+          <p:cNvPr id="105" name="Decisione 104"/>
+          <p:cNvSpPr/>
+          <p:nvPr/>
+        </p:nvSpPr>
+        <p:spPr>
+          <a:xfrm>
+            <a:off x="5646028" y="3963368"/>
+            <a:ext cx="1135597" cy="506708"/>
+          </a:xfrm>
+          <a:prstGeom prst="flowChartDecision">
+            <a:avLst/>
+          </a:prstGeom>
+          <a:solidFill>
+            <a:srgbClr val="FFFFCC"/>
+          </a:solidFill>
+          <a:ln>
+            <a:solidFill>
+              <a:schemeClr val="tx1"/>
+            </a:solidFill>
+          </a:ln>
+        </p:spPr>
+        <p:style>
+          <a:lnRef idx="2">
+            <a:schemeClr val="accent1">
+              <a:shade val="50000"/>
+            </a:schemeClr>
+          </a:lnRef>
+          <a:fillRef idx="1">
+            <a:schemeClr val="accent1"/>
+          </a:fillRef>
+          <a:effectRef idx="0">
+            <a:schemeClr val="accent1"/>
+          </a:effectRef>
+          <a:fontRef idx="minor">
+            <a:schemeClr val="lt1"/>
+          </a:fontRef>
+        </p:style>
+        <p:txBody>
+          <a:bodyPr rtlCol="0" anchor="ctr"/>
+          <a:lstStyle/>
+          <a:p>
+            <a:pPr algn="ctr"/>
+            <a:r>
+              <a:rPr lang="it-IT" sz="900" dirty="0" err="1">
+                <a:solidFill>
+                  <a:schemeClr val="tx1"/>
+                </a:solidFill>
+              </a:rPr>
+              <a:t>Allowed</a:t>
+            </a:r>
+            <a:r>
+              <a:rPr lang="it-IT" sz="900" dirty="0">
+                <a:solidFill>
+                  <a:schemeClr val="tx1"/>
+                </a:solidFill>
+              </a:rPr>
+              <a:t>?</a:t>
+            </a:r>
+          </a:p>
+        </p:txBody>
+      </p:sp>
+      <p:sp>
+        <p:nvSpPr>
+          <p:cNvPr id="127" name="Terminatore 126"/>
+          <p:cNvSpPr/>
+          <p:nvPr/>
+        </p:nvSpPr>
+        <p:spPr>
+          <a:xfrm>
+            <a:off x="5848073" y="5396088"/>
+            <a:ext cx="731505" cy="331533"/>
+          </a:xfrm>
+          <a:prstGeom prst="flowChartTerminator">
+            <a:avLst/>
+          </a:prstGeom>
+          <a:solidFill>
+            <a:schemeClr val="accent1">
+              <a:lumMod val="20000"/>
+              <a:lumOff val="80000"/>
+            </a:schemeClr>
+          </a:solidFill>
+          <a:ln>
+            <a:solidFill>
+              <a:schemeClr val="tx1"/>
+            </a:solidFill>
+          </a:ln>
+        </p:spPr>
+        <p:style>
+          <a:lnRef idx="2">
+            <a:schemeClr val="accent1">
+              <a:shade val="50000"/>
+            </a:schemeClr>
+          </a:lnRef>
+          <a:fillRef idx="1">
+            <a:schemeClr val="accent1"/>
+          </a:fillRef>
+          <a:effectRef idx="0">
+            <a:schemeClr val="accent1"/>
+          </a:effectRef>
+          <a:fontRef idx="minor">
+            <a:schemeClr val="lt1"/>
+          </a:fontRef>
+        </p:style>
+        <p:txBody>
+          <a:bodyPr rtlCol="0" anchor="ctr"/>
+          <a:lstStyle/>
+          <a:p>
+            <a:pPr algn="ctr"/>
+            <a:r>
+              <a:rPr lang="it-IT" sz="900" dirty="0">
+                <a:solidFill>
+                  <a:schemeClr val="tx1"/>
+                </a:solidFill>
+              </a:rPr>
+              <a:t>End</a:t>
+            </a:r>
+          </a:p>
+        </p:txBody>
+      </p:sp>
+      <p:cxnSp>
+        <p:nvCxnSpPr>
+          <p:cNvPr id="144" name="Connettore 2 143"/>
+          <p:cNvCxnSpPr>
+            <a:stCxn id="38" idx="2"/>
+            <a:endCxn id="105" idx="0"/>
+          </p:cNvCxnSpPr>
+          <p:nvPr/>
+        </p:nvCxnSpPr>
+        <p:spPr>
+          <a:xfrm>
+            <a:off x="6213827" y="3755138"/>
+            <a:ext cx="0" cy="208231"/>
+          </a:xfrm>
+          <a:prstGeom prst="straightConnector1">
+            <a:avLst/>
+          </a:prstGeom>
+          <a:ln>
+            <a:solidFill>
+              <a:schemeClr val="tx1"/>
+            </a:solidFill>
+            <a:tailEnd type="triangle"/>
+          </a:ln>
+        </p:spPr>
+        <p:style>
+          <a:lnRef idx="1">
+            <a:schemeClr val="accent1"/>
+          </a:lnRef>
+          <a:fillRef idx="0">
+            <a:schemeClr val="accent1"/>
+          </a:fillRef>
+          <a:effectRef idx="0">
+            <a:schemeClr val="accent1"/>
+          </a:effectRef>
+          <a:fontRef idx="minor">
+            <a:schemeClr val="tx1"/>
+          </a:fontRef>
+        </p:style>
+      </p:cxnSp>
+      <p:cxnSp>
+        <p:nvCxnSpPr>
+          <p:cNvPr id="8" name="Connettore 2 7"/>
+          <p:cNvCxnSpPr>
+            <a:stCxn id="32" idx="2"/>
+            <a:endCxn id="33" idx="0"/>
+          </p:cNvCxnSpPr>
+          <p:nvPr/>
+        </p:nvCxnSpPr>
+        <p:spPr>
+          <a:xfrm flipH="1">
+            <a:off x="2171338" y="1290413"/>
+            <a:ext cx="878" cy="169355"/>
+          </a:xfrm>
+          <a:prstGeom prst="straightConnector1">
+            <a:avLst/>
+          </a:prstGeom>
+          <a:ln>
+            <a:solidFill>
+              <a:schemeClr val="tx1"/>
+            </a:solidFill>
+            <a:tailEnd type="triangle"/>
+          </a:ln>
+        </p:spPr>
+        <p:style>
+          <a:lnRef idx="1">
+            <a:schemeClr val="accent1"/>
+          </a:lnRef>
+          <a:fillRef idx="0">
+            <a:schemeClr val="accent1"/>
+          </a:fillRef>
+          <a:effectRef idx="0">
+            <a:schemeClr val="accent1"/>
+          </a:effectRef>
+          <a:fontRef idx="minor">
+            <a:schemeClr val="tx1"/>
+          </a:fontRef>
+        </p:style>
+      </p:cxnSp>
+      <p:sp>
+        <p:nvSpPr>
+          <p:cNvPr id="56" name="CasellaDiTesto 55"/>
+          <p:cNvSpPr txBox="1"/>
+          <p:nvPr/>
+        </p:nvSpPr>
+        <p:spPr>
+          <a:xfrm>
+            <a:off x="4155094" y="3753672"/>
+            <a:ext cx="306494" cy="230832"/>
+          </a:xfrm>
+          <a:prstGeom prst="rect">
+            <a:avLst/>
+          </a:prstGeom>
+          <a:noFill/>
+          <a:ln>
+            <a:noFill/>
+          </a:ln>
+        </p:spPr>
+        <p:txBody>
+          <a:bodyPr wrap="none" rtlCol="0">
+            <a:spAutoFit/>
+          </a:bodyPr>
+          <a:lstStyle/>
+          <a:p>
+            <a:r>
+              <a:rPr lang="it-IT" sz="900" dirty="0"/>
+              <a:t>no</a:t>
+            </a:r>
+            <a:endParaRPr lang="en-GB" sz="900" dirty="0"/>
+          </a:p>
+        </p:txBody>
+      </p:sp>
+      <p:sp>
+        <p:nvSpPr>
+          <p:cNvPr id="40" name="Elaborazione 39"/>
+          <p:cNvSpPr/>
+          <p:nvPr/>
+        </p:nvSpPr>
+        <p:spPr>
+          <a:xfrm>
+            <a:off x="978494" y="2059648"/>
+            <a:ext cx="2398208" cy="419204"/>
+          </a:xfrm>
+          <a:prstGeom prst="flowChartProcess">
+            <a:avLst/>
+          </a:prstGeom>
+          <a:solidFill>
+            <a:srgbClr val="CCFFCC"/>
+          </a:solidFill>
+          <a:ln>
+            <a:solidFill>
+              <a:schemeClr val="tx1"/>
+            </a:solidFill>
+          </a:ln>
+        </p:spPr>
+        <p:style>
+          <a:lnRef idx="2">
+            <a:schemeClr val="accent1">
+              <a:shade val="50000"/>
+            </a:schemeClr>
+          </a:lnRef>
+          <a:fillRef idx="1">
+            <a:schemeClr val="accent1"/>
+          </a:fillRef>
+          <a:effectRef idx="0">
+            <a:schemeClr val="accent1"/>
+          </a:effectRef>
+          <a:fontRef idx="minor">
+            <a:schemeClr val="lt1"/>
+          </a:fontRef>
+        </p:style>
+        <p:txBody>
+          <a:bodyPr rtlCol="0" anchor="ctr"/>
+          <a:lstStyle/>
+          <a:p>
+            <a:pPr algn="ctr"/>
+            <a:r>
+              <a:rPr lang="it-IT" sz="1200" dirty="0" err="1">
+                <a:solidFill>
+                  <a:schemeClr val="tx1"/>
+                </a:solidFill>
+              </a:rPr>
+              <a:t>Check</a:t>
+            </a:r>
+            <a:r>
+              <a:rPr lang="it-IT" sz="1200" dirty="0">
+                <a:solidFill>
+                  <a:schemeClr val="tx1"/>
+                </a:solidFill>
+              </a:rPr>
+              <a:t> </a:t>
+            </a:r>
+            <a:r>
+              <a:rPr lang="it-IT" sz="1200" dirty="0" err="1">
+                <a:solidFill>
+                  <a:schemeClr val="tx1"/>
+                </a:solidFill>
+              </a:rPr>
+              <a:t>authentication</a:t>
+            </a:r>
+            <a:r>
+              <a:rPr lang="it-IT" sz="1200" dirty="0">
+                <a:solidFill>
+                  <a:schemeClr val="tx1"/>
+                </a:solidFill>
+              </a:rPr>
+              <a:t> </a:t>
+            </a:r>
+            <a:r>
+              <a:rPr lang="it-IT" sz="1200" dirty="0" err="1">
+                <a:solidFill>
+                  <a:schemeClr val="tx1"/>
+                </a:solidFill>
+              </a:rPr>
+              <a:t>token</a:t>
+            </a:r>
+            <a:endParaRPr lang="it-IT" sz="1200" dirty="0">
+              <a:solidFill>
+                <a:schemeClr val="tx1"/>
+              </a:solidFill>
+            </a:endParaRPr>
+          </a:p>
+        </p:txBody>
+      </p:sp>
+      <p:cxnSp>
+        <p:nvCxnSpPr>
+          <p:cNvPr id="42" name="Connettore 2 41"/>
+          <p:cNvCxnSpPr/>
+          <p:nvPr/>
+        </p:nvCxnSpPr>
+        <p:spPr>
+          <a:xfrm flipH="1">
+            <a:off x="2177599" y="1877800"/>
+            <a:ext cx="878" cy="169355"/>
+          </a:xfrm>
+          <a:prstGeom prst="straightConnector1">
+            <a:avLst/>
+          </a:prstGeom>
+          <a:ln>
+            <a:solidFill>
+              <a:schemeClr val="tx1"/>
+            </a:solidFill>
+            <a:tailEnd type="triangle"/>
+          </a:ln>
+        </p:spPr>
+        <p:style>
+          <a:lnRef idx="1">
+            <a:schemeClr val="accent1"/>
+          </a:lnRef>
+          <a:fillRef idx="0">
+            <a:schemeClr val="accent1"/>
+          </a:fillRef>
+          <a:effectRef idx="0">
+            <a:schemeClr val="accent1"/>
+          </a:effectRef>
+          <a:fontRef idx="minor">
+            <a:schemeClr val="tx1"/>
+          </a:fontRef>
+        </p:style>
+      </p:cxnSp>
+      <p:sp>
+        <p:nvSpPr>
+          <p:cNvPr id="44" name="Decisione 43"/>
+          <p:cNvSpPr/>
+          <p:nvPr/>
+        </p:nvSpPr>
+        <p:spPr>
+          <a:xfrm>
+            <a:off x="3618172" y="3288032"/>
+            <a:ext cx="1001984" cy="506708"/>
+          </a:xfrm>
+          <a:prstGeom prst="flowChartDecision">
+            <a:avLst/>
+          </a:prstGeom>
+          <a:solidFill>
+            <a:srgbClr val="FFFFCC"/>
+          </a:solidFill>
+          <a:ln>
+            <a:solidFill>
+              <a:schemeClr val="tx1"/>
+            </a:solidFill>
+          </a:ln>
+        </p:spPr>
+        <p:style>
+          <a:lnRef idx="2">
+            <a:schemeClr val="accent1">
+              <a:shade val="50000"/>
+            </a:schemeClr>
+          </a:lnRef>
+          <a:fillRef idx="1">
+            <a:schemeClr val="accent1"/>
+          </a:fillRef>
+          <a:effectRef idx="0">
+            <a:schemeClr val="accent1"/>
+          </a:effectRef>
+          <a:fontRef idx="minor">
+            <a:schemeClr val="lt1"/>
+          </a:fontRef>
+        </p:style>
+        <p:txBody>
+          <a:bodyPr rtlCol="0" anchor="ctr"/>
+          <a:lstStyle/>
+          <a:p>
+            <a:pPr algn="ctr"/>
+            <a:r>
+              <a:rPr lang="it-IT" sz="900" dirty="0">
+                <a:solidFill>
+                  <a:schemeClr val="tx1"/>
+                </a:solidFill>
+              </a:rPr>
+              <a:t>Match?</a:t>
+            </a:r>
+          </a:p>
+        </p:txBody>
+      </p:sp>
+      <p:cxnSp>
+        <p:nvCxnSpPr>
+          <p:cNvPr id="47" name="Connettore 2 46"/>
+          <p:cNvCxnSpPr/>
+          <p:nvPr/>
+        </p:nvCxnSpPr>
+        <p:spPr>
+          <a:xfrm flipH="1">
+            <a:off x="2176720" y="2485176"/>
+            <a:ext cx="878" cy="169355"/>
+          </a:xfrm>
+          <a:prstGeom prst="straightConnector1">
+            <a:avLst/>
+          </a:prstGeom>
+          <a:ln>
+            <a:solidFill>
+              <a:schemeClr val="tx1"/>
+            </a:solidFill>
+            <a:tailEnd type="triangle"/>
+          </a:ln>
+        </p:spPr>
+        <p:style>
+          <a:lnRef idx="1">
+            <a:schemeClr val="accent1"/>
+          </a:lnRef>
+          <a:fillRef idx="0">
+            <a:schemeClr val="accent1"/>
+          </a:fillRef>
+          <a:effectRef idx="0">
+            <a:schemeClr val="accent1"/>
+          </a:effectRef>
+          <a:fontRef idx="minor">
+            <a:schemeClr val="tx1"/>
+          </a:fontRef>
+        </p:style>
+      </p:cxnSp>
+      <p:cxnSp>
+        <p:nvCxnSpPr>
+          <p:cNvPr id="49" name="Connettore 2 48"/>
+          <p:cNvCxnSpPr/>
+          <p:nvPr/>
+        </p:nvCxnSpPr>
+        <p:spPr>
+          <a:xfrm flipH="1">
+            <a:off x="2170460" y="3170005"/>
+            <a:ext cx="878" cy="169355"/>
+          </a:xfrm>
+          <a:prstGeom prst="straightConnector1">
+            <a:avLst/>
+          </a:prstGeom>
+          <a:ln>
+            <a:solidFill>
+              <a:schemeClr val="tx1"/>
+            </a:solidFill>
+            <a:tailEnd type="triangle"/>
+          </a:ln>
+        </p:spPr>
+        <p:style>
+          <a:lnRef idx="1">
+            <a:schemeClr val="accent1"/>
+          </a:lnRef>
+          <a:fillRef idx="0">
+            <a:schemeClr val="accent1"/>
+          </a:fillRef>
+          <a:effectRef idx="0">
+            <a:schemeClr val="accent1"/>
+          </a:effectRef>
+          <a:fontRef idx="minor">
+            <a:schemeClr val="tx1"/>
+          </a:fontRef>
+        </p:style>
+      </p:cxnSp>
+      <p:cxnSp>
+        <p:nvCxnSpPr>
+          <p:cNvPr id="26" name="Connettore 2 25"/>
+          <p:cNvCxnSpPr>
+            <a:stCxn id="36" idx="3"/>
+            <a:endCxn id="44" idx="1"/>
+          </p:cNvCxnSpPr>
+          <p:nvPr/>
+        </p:nvCxnSpPr>
+        <p:spPr>
+          <a:xfrm>
+            <a:off x="3376702" y="3541386"/>
+            <a:ext cx="241470" cy="0"/>
+          </a:xfrm>
+          <a:prstGeom prst="straightConnector1">
+            <a:avLst/>
+          </a:prstGeom>
+          <a:ln>
+            <a:solidFill>
+              <a:schemeClr val="tx1"/>
+            </a:solidFill>
+            <a:tailEnd type="triangle"/>
+          </a:ln>
+        </p:spPr>
+        <p:style>
+          <a:lnRef idx="1">
+            <a:schemeClr val="accent1"/>
+          </a:lnRef>
+          <a:fillRef idx="0">
+            <a:schemeClr val="accent1"/>
+          </a:fillRef>
+          <a:effectRef idx="0">
+            <a:schemeClr val="accent1"/>
+          </a:effectRef>
+          <a:fontRef idx="minor">
+            <a:schemeClr val="tx1"/>
+          </a:fontRef>
+        </p:style>
+      </p:cxnSp>
+      <p:cxnSp>
+        <p:nvCxnSpPr>
+          <p:cNvPr id="78" name="Connettore 2 77"/>
+          <p:cNvCxnSpPr>
+            <a:stCxn id="44" idx="3"/>
+            <a:endCxn id="38" idx="1"/>
+          </p:cNvCxnSpPr>
+          <p:nvPr/>
+        </p:nvCxnSpPr>
+        <p:spPr>
+          <a:xfrm>
+            <a:off x="4620155" y="3541386"/>
+            <a:ext cx="269664" cy="153"/>
+          </a:xfrm>
+          <a:prstGeom prst="straightConnector1">
+            <a:avLst/>
+          </a:prstGeom>
+          <a:ln>
+            <a:solidFill>
+              <a:schemeClr val="tx1"/>
+            </a:solidFill>
+            <a:tailEnd type="triangle"/>
+          </a:ln>
+        </p:spPr>
+        <p:style>
+          <a:lnRef idx="1">
+            <a:schemeClr val="accent1"/>
+          </a:lnRef>
+          <a:fillRef idx="0">
+            <a:schemeClr val="accent1"/>
+          </a:fillRef>
+          <a:effectRef idx="0">
+            <a:schemeClr val="accent1"/>
+          </a:effectRef>
+          <a:fontRef idx="minor">
+            <a:schemeClr val="tx1"/>
+          </a:fontRef>
+        </p:style>
+      </p:cxnSp>
+      <p:cxnSp>
+        <p:nvCxnSpPr>
+          <p:cNvPr id="83" name="Connettore 2 82"/>
+          <p:cNvCxnSpPr>
+            <a:stCxn id="105" idx="2"/>
+            <a:endCxn id="41" idx="0"/>
+          </p:cNvCxnSpPr>
+          <p:nvPr/>
+        </p:nvCxnSpPr>
+        <p:spPr>
+          <a:xfrm>
+            <a:off x="6213827" y="4470076"/>
+            <a:ext cx="0" cy="231935"/>
+          </a:xfrm>
+          <a:prstGeom prst="straightConnector1">
+            <a:avLst/>
+          </a:prstGeom>
+          <a:ln>
+            <a:solidFill>
+              <a:schemeClr val="tx1"/>
+            </a:solidFill>
+            <a:tailEnd type="triangle"/>
+          </a:ln>
+        </p:spPr>
+        <p:style>
+          <a:lnRef idx="1">
+            <a:schemeClr val="accent1"/>
+          </a:lnRef>
+          <a:fillRef idx="0">
+            <a:schemeClr val="accent1"/>
+          </a:fillRef>
+          <a:effectRef idx="0">
+            <a:schemeClr val="accent1"/>
+          </a:effectRef>
+          <a:fontRef idx="minor">
+            <a:schemeClr val="tx1"/>
+          </a:fontRef>
+        </p:style>
+      </p:cxnSp>
+      <p:cxnSp>
+        <p:nvCxnSpPr>
+          <p:cNvPr id="87" name="Connettore 2 86"/>
+          <p:cNvCxnSpPr>
+            <a:stCxn id="41" idx="2"/>
+            <a:endCxn id="127" idx="0"/>
+          </p:cNvCxnSpPr>
+          <p:nvPr/>
+        </p:nvCxnSpPr>
+        <p:spPr>
+          <a:xfrm flipH="1">
+            <a:off x="6213826" y="5164153"/>
+            <a:ext cx="1" cy="231935"/>
+          </a:xfrm>
+          <a:prstGeom prst="straightConnector1">
+            <a:avLst/>
+          </a:prstGeom>
+          <a:ln>
+            <a:solidFill>
+              <a:schemeClr val="tx1"/>
+            </a:solidFill>
+            <a:tailEnd type="triangle"/>
+          </a:ln>
+        </p:spPr>
+        <p:style>
+          <a:lnRef idx="1">
+            <a:schemeClr val="accent1"/>
+          </a:lnRef>
+          <a:fillRef idx="0">
+            <a:schemeClr val="accent1"/>
+          </a:fillRef>
+          <a:effectRef idx="0">
+            <a:schemeClr val="accent1"/>
+          </a:effectRef>
+          <a:fontRef idx="minor">
+            <a:schemeClr val="tx1"/>
+          </a:fontRef>
+        </p:style>
+      </p:cxnSp>
+      <p:cxnSp>
+        <p:nvCxnSpPr>
+          <p:cNvPr id="90" name="Connettore 4 89"/>
+          <p:cNvCxnSpPr>
+            <a:stCxn id="36" idx="2"/>
+            <a:endCxn id="127" idx="1"/>
+          </p:cNvCxnSpPr>
+          <p:nvPr/>
+        </p:nvCxnSpPr>
+        <p:spPr>
+          <a:xfrm rot="16200000" flipH="1">
+            <a:off x="3108745" y="2822527"/>
+            <a:ext cx="1808181" cy="3670475"/>
+          </a:xfrm>
+          <a:prstGeom prst="bentConnector2">
+            <a:avLst/>
+          </a:prstGeom>
+          <a:ln>
+            <a:solidFill>
+              <a:schemeClr val="tx1"/>
+            </a:solidFill>
+            <a:tailEnd type="triangle"/>
+          </a:ln>
+        </p:spPr>
+        <p:style>
+          <a:lnRef idx="1">
+            <a:schemeClr val="accent1"/>
+          </a:lnRef>
+          <a:fillRef idx="0">
+            <a:schemeClr val="accent1"/>
+          </a:fillRef>
+          <a:effectRef idx="0">
+            <a:schemeClr val="accent1"/>
+          </a:effectRef>
+          <a:fontRef idx="minor">
+            <a:schemeClr val="tx1"/>
+          </a:fontRef>
+        </p:style>
+      </p:cxnSp>
+      <p:cxnSp>
+        <p:nvCxnSpPr>
+          <p:cNvPr id="97" name="Connettore 1 96"/>
+          <p:cNvCxnSpPr>
+            <a:stCxn id="44" idx="2"/>
+          </p:cNvCxnSpPr>
+          <p:nvPr/>
+        </p:nvCxnSpPr>
+        <p:spPr>
+          <a:xfrm>
+            <a:off x="4119164" y="3794740"/>
+            <a:ext cx="0" cy="1767115"/>
+          </a:xfrm>
+          <a:prstGeom prst="line">
+            <a:avLst/>
+          </a:prstGeom>
+          <a:ln>
+            <a:solidFill>
+              <a:schemeClr val="tx1"/>
+            </a:solidFill>
+          </a:ln>
+        </p:spPr>
+        <p:style>
+          <a:lnRef idx="1">
+            <a:schemeClr val="accent1"/>
+          </a:lnRef>
+          <a:fillRef idx="0">
+            <a:schemeClr val="accent1"/>
+          </a:fillRef>
+          <a:effectRef idx="0">
+            <a:schemeClr val="accent1"/>
+          </a:effectRef>
+          <a:fontRef idx="minor">
+            <a:schemeClr val="tx1"/>
+          </a:fontRef>
+        </p:style>
+      </p:cxnSp>
+      <p:cxnSp>
+        <p:nvCxnSpPr>
+          <p:cNvPr id="102" name="Connettore 4 101"/>
+          <p:cNvCxnSpPr>
+            <a:stCxn id="105" idx="1"/>
+          </p:cNvCxnSpPr>
+          <p:nvPr/>
+        </p:nvCxnSpPr>
+        <p:spPr>
+          <a:xfrm rot="10800000" flipV="1">
+            <a:off x="4486276" y="4216722"/>
+            <a:ext cx="1159753" cy="1345133"/>
+          </a:xfrm>
+          <a:prstGeom prst="bentConnector2">
+            <a:avLst/>
+          </a:prstGeom>
+          <a:ln>
+            <a:solidFill>
+              <a:schemeClr val="tx1"/>
+            </a:solidFill>
+          </a:ln>
+        </p:spPr>
+        <p:style>
+          <a:lnRef idx="1">
+            <a:schemeClr val="accent1"/>
+          </a:lnRef>
+          <a:fillRef idx="0">
+            <a:schemeClr val="accent1"/>
+          </a:fillRef>
+          <a:effectRef idx="0">
+            <a:schemeClr val="accent1"/>
+          </a:effectRef>
+          <a:fontRef idx="minor">
+            <a:schemeClr val="tx1"/>
+          </a:fontRef>
+        </p:style>
+      </p:cxnSp>
+      <p:sp>
+        <p:nvSpPr>
+          <p:cNvPr id="107" name="CasellaDiTesto 106"/>
+          <p:cNvSpPr txBox="1"/>
+          <p:nvPr/>
+        </p:nvSpPr>
+        <p:spPr>
+          <a:xfrm>
+            <a:off x="6274234" y="4470548"/>
+            <a:ext cx="340158" cy="230832"/>
+          </a:xfrm>
+          <a:prstGeom prst="rect">
+            <a:avLst/>
+          </a:prstGeom>
+          <a:noFill/>
+          <a:ln>
+            <a:noFill/>
+          </a:ln>
+        </p:spPr>
+        <p:txBody>
+          <a:bodyPr wrap="none" rtlCol="0">
+            <a:spAutoFit/>
+          </a:bodyPr>
+          <a:lstStyle/>
+          <a:p>
+            <a:r>
+              <a:rPr lang="it-IT" sz="900" dirty="0"/>
+              <a:t>yes</a:t>
+            </a:r>
+            <a:endParaRPr lang="en-GB" sz="900" dirty="0"/>
+          </a:p>
+        </p:txBody>
+      </p:sp>
+      <p:sp>
+        <p:nvSpPr>
+          <p:cNvPr id="108" name="CasellaDiTesto 107"/>
+          <p:cNvSpPr txBox="1"/>
+          <p:nvPr/>
+        </p:nvSpPr>
+        <p:spPr>
+          <a:xfrm>
+            <a:off x="5404900" y="4009939"/>
+            <a:ext cx="306494" cy="230832"/>
+          </a:xfrm>
+          <a:prstGeom prst="rect">
+            <a:avLst/>
+          </a:prstGeom>
+          <a:noFill/>
+          <a:ln>
+            <a:noFill/>
+          </a:ln>
+        </p:spPr>
+        <p:txBody>
+          <a:bodyPr wrap="none" rtlCol="0">
+            <a:spAutoFit/>
+          </a:bodyPr>
+          <a:lstStyle/>
+          <a:p>
+            <a:r>
+              <a:rPr lang="it-IT" sz="900" dirty="0"/>
+              <a:t>no</a:t>
+            </a:r>
+            <a:endParaRPr lang="en-GB" sz="900" dirty="0"/>
+          </a:p>
+        </p:txBody>
+      </p:sp>
+      <p:cxnSp>
+        <p:nvCxnSpPr>
+          <p:cNvPr id="111" name="Connettore 4 110"/>
+          <p:cNvCxnSpPr>
+            <a:endCxn id="37" idx="1"/>
+          </p:cNvCxnSpPr>
+          <p:nvPr/>
+        </p:nvCxnSpPr>
+        <p:spPr>
+          <a:xfrm rot="16200000" flipV="1">
+            <a:off x="595916" y="3987311"/>
+            <a:ext cx="2648973" cy="500114"/>
+          </a:xfrm>
+          <a:prstGeom prst="bentConnector4">
+            <a:avLst>
+              <a:gd name="adj1" fmla="val 164"/>
+              <a:gd name="adj2" fmla="val 321276"/>
+            </a:avLst>
+          </a:prstGeom>
+          <a:ln>
+            <a:solidFill>
+              <a:schemeClr val="tx1"/>
+            </a:solidFill>
+          </a:ln>
+        </p:spPr>
+        <p:style>
+          <a:lnRef idx="1">
+            <a:schemeClr val="accent1"/>
+          </a:lnRef>
+          <a:fillRef idx="0">
+            <a:schemeClr val="accent1"/>
+          </a:fillRef>
+          <a:effectRef idx="0">
+            <a:schemeClr val="accent1"/>
+          </a:effectRef>
+          <a:fontRef idx="minor">
+            <a:schemeClr val="tx1"/>
+          </a:fontRef>
+        </p:style>
+      </p:cxnSp>
+      <p:sp>
+        <p:nvSpPr>
+          <p:cNvPr id="117" name="CasellaDiTesto 116"/>
+          <p:cNvSpPr txBox="1"/>
+          <p:nvPr/>
+        </p:nvSpPr>
+        <p:spPr>
+          <a:xfrm>
+            <a:off x="2184546" y="3121349"/>
+            <a:ext cx="340158" cy="230832"/>
+          </a:xfrm>
+          <a:prstGeom prst="rect">
+            <a:avLst/>
+          </a:prstGeom>
+          <a:noFill/>
+          <a:ln>
+            <a:noFill/>
+          </a:ln>
+        </p:spPr>
+        <p:txBody>
+          <a:bodyPr wrap="none" rtlCol="0">
+            <a:spAutoFit/>
+          </a:bodyPr>
+          <a:lstStyle/>
+          <a:p>
+            <a:r>
+              <a:rPr lang="it-IT" sz="900" dirty="0"/>
+              <a:t>yes</a:t>
+            </a:r>
+            <a:endParaRPr lang="en-GB" sz="900" dirty="0"/>
+          </a:p>
+        </p:txBody>
+      </p:sp>
+      <p:sp>
+        <p:nvSpPr>
+          <p:cNvPr id="118" name="CasellaDiTesto 117"/>
+          <p:cNvSpPr txBox="1"/>
+          <p:nvPr/>
+        </p:nvSpPr>
+        <p:spPr>
+          <a:xfrm>
+            <a:off x="1409541" y="2729219"/>
+            <a:ext cx="306494" cy="230832"/>
+          </a:xfrm>
+          <a:prstGeom prst="rect">
+            <a:avLst/>
+          </a:prstGeom>
+          <a:noFill/>
+          <a:ln>
+            <a:noFill/>
+          </a:ln>
+        </p:spPr>
+        <p:txBody>
+          <a:bodyPr wrap="none" rtlCol="0">
+            <a:spAutoFit/>
+          </a:bodyPr>
+          <a:lstStyle/>
+          <a:p>
+            <a:r>
+              <a:rPr lang="it-IT" sz="900" dirty="0"/>
+              <a:t>no</a:t>
+            </a:r>
+            <a:endParaRPr lang="en-GB" sz="900" dirty="0"/>
+          </a:p>
+        </p:txBody>
+      </p:sp>
+      <p:sp>
+        <p:nvSpPr>
+          <p:cNvPr id="119" name="Disco magnetico 118"/>
+          <p:cNvSpPr/>
+          <p:nvPr/>
+        </p:nvSpPr>
+        <p:spPr>
+          <a:xfrm>
+            <a:off x="3228000" y="1915900"/>
+            <a:ext cx="284884" cy="300380"/>
+          </a:xfrm>
+          <a:prstGeom prst="flowChartMagneticDisk">
+            <a:avLst/>
+          </a:prstGeom>
+          <a:ln>
+            <a:solidFill>
+              <a:schemeClr val="tx1"/>
+            </a:solidFill>
+          </a:ln>
+        </p:spPr>
+        <p:style>
+          <a:lnRef idx="2">
+            <a:schemeClr val="accent4">
+              <a:shade val="50000"/>
+            </a:schemeClr>
+          </a:lnRef>
+          <a:fillRef idx="1">
+            <a:schemeClr val="accent4"/>
+          </a:fillRef>
+          <a:effectRef idx="0">
+            <a:schemeClr val="accent4"/>
+          </a:effectRef>
+          <a:fontRef idx="minor">
+            <a:schemeClr val="lt1"/>
+          </a:fontRef>
+        </p:style>
+        <p:txBody>
+          <a:bodyPr rtlCol="0" anchor="ctr"/>
+          <a:lstStyle/>
+          <a:p>
+            <a:pPr algn="ctr"/>
+            <a:endParaRPr lang="en-GB" sz="1350">
+              <a:solidFill>
+                <a:srgbClr val="FFFF00"/>
+              </a:solidFill>
+            </a:endParaRPr>
+          </a:p>
+        </p:txBody>
+      </p:sp>
+      <p:sp>
+        <p:nvSpPr>
+          <p:cNvPr id="120" name="CasellaDiTesto 119"/>
+          <p:cNvSpPr txBox="1"/>
+          <p:nvPr/>
+        </p:nvSpPr>
+        <p:spPr>
+          <a:xfrm>
+            <a:off x="3429685" y="2174441"/>
+            <a:ext cx="689479" cy="369332"/>
+          </a:xfrm>
+          <a:prstGeom prst="rect">
+            <a:avLst/>
+          </a:prstGeom>
+          <a:noFill/>
+          <a:ln>
+            <a:noFill/>
+          </a:ln>
+        </p:spPr>
+        <p:txBody>
+          <a:bodyPr wrap="square" rtlCol="0">
+            <a:spAutoFit/>
+          </a:bodyPr>
+          <a:lstStyle/>
+          <a:p>
+            <a:r>
+              <a:rPr lang="it-IT" sz="900" i="1" dirty="0" err="1">
+                <a:solidFill>
+                  <a:schemeClr val="accent2">
+                    <a:lumMod val="75000"/>
+                  </a:schemeClr>
+                </a:solidFill>
+              </a:rPr>
+              <a:t>Lookup</a:t>
+            </a:r>
+            <a:r>
+              <a:rPr lang="it-IT" sz="900" i="1" dirty="0">
+                <a:solidFill>
+                  <a:schemeClr val="accent2">
+                    <a:lumMod val="75000"/>
+                  </a:schemeClr>
+                </a:solidFill>
+              </a:rPr>
+              <a:t> on LOGIN</a:t>
+            </a:r>
+            <a:endParaRPr lang="en-GB" sz="900" dirty="0">
+              <a:solidFill>
+                <a:schemeClr val="accent2">
+                  <a:lumMod val="75000"/>
+                </a:schemeClr>
+              </a:solidFill>
+            </a:endParaRPr>
+          </a:p>
+        </p:txBody>
+      </p:sp>
+    </p:spTree>
+    <p:extLst>
+      <p:ext uri="{BB962C8B-B14F-4D97-AF65-F5344CB8AC3E}">
+        <p14:creationId xmlns:p14="http://schemas.microsoft.com/office/powerpoint/2010/main" val="116685902"/>
+      </p:ext>
+    </p:extLst>
+  </p:cSld>
+  <p:clrMapOvr>
+    <a:masterClrMapping/>
+  </p:clrMapOvr>
+  <p:timing>
+    <p:tnLst>
+      <p:par>
+        <p:cTn id="1" dur="indefinite" restart="never" nodeType="tmRoot"/>
+      </p:par>
+    </p:tnLst>
+  </p:timing>
+</p:sld>
+</file>
+
+<file path=ppt/slides/slide7.xml><?xml version="1.0" encoding="utf-8"?>
+<p:sld xmlns:a="http://schemas.openxmlformats.org/drawingml/2006/main" xmlns:r="http://schemas.openxmlformats.org/officeDocument/2006/relationships" xmlns:p="http://schemas.openxmlformats.org/presentationml/2006/main">
+  <p:cSld>
+    <p:spTree>
+      <p:nvGrpSpPr>
+        <p:cNvPr id="1" name=""/>
+        <p:cNvGrpSpPr/>
+        <p:nvPr/>
+      </p:nvGrpSpPr>
+      <p:grpSpPr>
+        <a:xfrm>
+          <a:off x="0" y="0"/>
+          <a:ext cx="0" cy="0"/>
+          <a:chOff x="0" y="0"/>
+          <a:chExt cx="0" cy="0"/>
+        </a:xfrm>
+      </p:grpSpPr>
+      <p:sp>
+        <p:nvSpPr>
+          <p:cNvPr id="2" name="Elaborazione 35"/>
+          <p:cNvSpPr/>
+          <p:nvPr/>
+        </p:nvSpPr>
+        <p:spPr>
+          <a:xfrm>
+            <a:off x="777876" y="3031958"/>
+            <a:ext cx="3007091" cy="463206"/>
+          </a:xfrm>
+          <a:prstGeom prst="flowChartProcess">
+            <a:avLst/>
+          </a:prstGeom>
+          <a:solidFill>
+            <a:srgbClr val="92D050"/>
+          </a:solidFill>
+          <a:ln>
+            <a:solidFill>
+              <a:schemeClr val="accent6">
+                <a:lumMod val="75000"/>
+              </a:schemeClr>
+            </a:solidFill>
+          </a:ln>
+        </p:spPr>
+        <p:style>
+          <a:lnRef idx="2">
+            <a:schemeClr val="accent1">
+              <a:shade val="50000"/>
+            </a:schemeClr>
+          </a:lnRef>
+          <a:fillRef idx="1">
+            <a:schemeClr val="accent1"/>
+          </a:fillRef>
+          <a:effectRef idx="0">
+            <a:schemeClr val="accent1"/>
+          </a:effectRef>
+          <a:fontRef idx="minor">
+            <a:schemeClr val="lt1"/>
+          </a:fontRef>
+        </p:style>
+        <p:txBody>
+          <a:bodyPr rtlCol="0" anchor="ctr"/>
+          <a:lstStyle/>
+          <a:p>
+            <a:pPr algn="ctr"/>
+            <a:r>
+              <a:rPr lang="it-IT" sz="1400" dirty="0" err="1" smtClean="0"/>
+              <a:t>Verify</a:t>
+            </a:r>
+            <a:r>
+              <a:rPr lang="it-IT" sz="1400" dirty="0" smtClean="0"/>
+              <a:t> </a:t>
+            </a:r>
+            <a:r>
+              <a:rPr lang="it-IT" sz="1400" dirty="0" err="1" smtClean="0"/>
+              <a:t>that</a:t>
+            </a:r>
+            <a:r>
+              <a:rPr lang="it-IT" sz="1400" dirty="0" smtClean="0"/>
+              <a:t> the </a:t>
+            </a:r>
+            <a:r>
+              <a:rPr lang="it-IT" sz="1400" dirty="0" err="1" smtClean="0"/>
+              <a:t>requested</a:t>
+            </a:r>
+            <a:r>
+              <a:rPr lang="it-IT" sz="1400" dirty="0" smtClean="0"/>
+              <a:t> </a:t>
+            </a:r>
+            <a:r>
+              <a:rPr lang="it-IT" sz="1400" dirty="0" err="1" smtClean="0"/>
+              <a:t>resource</a:t>
+            </a:r>
+            <a:r>
+              <a:rPr lang="it-IT" sz="1400" dirty="0" smtClean="0"/>
+              <a:t> </a:t>
+            </a:r>
+            <a:r>
+              <a:rPr lang="it-IT" sz="1400" dirty="0" err="1" smtClean="0"/>
+              <a:t>does</a:t>
+            </a:r>
+            <a:r>
+              <a:rPr lang="it-IT" sz="1400" dirty="0" smtClean="0"/>
+              <a:t> </a:t>
+            </a:r>
+            <a:r>
+              <a:rPr lang="it-IT" sz="1400" dirty="0" err="1" smtClean="0"/>
+              <a:t>not</a:t>
+            </a:r>
+            <a:r>
+              <a:rPr lang="it-IT" sz="1400" dirty="0" smtClean="0"/>
+              <a:t> </a:t>
+            </a:r>
+            <a:r>
+              <a:rPr lang="it-IT" sz="1400" dirty="0" err="1" smtClean="0"/>
+              <a:t>already</a:t>
+            </a:r>
+            <a:r>
+              <a:rPr lang="it-IT" sz="1400" dirty="0" smtClean="0"/>
+              <a:t> </a:t>
+            </a:r>
+            <a:r>
+              <a:rPr lang="it-IT" sz="1400" dirty="0" err="1" smtClean="0"/>
+              <a:t>exist</a:t>
+            </a:r>
+            <a:endParaRPr lang="it-IT" sz="1400" dirty="0"/>
+          </a:p>
+        </p:txBody>
+      </p:sp>
+      <p:sp>
+        <p:nvSpPr>
+          <p:cNvPr id="3" name="Elaborazione 37"/>
+          <p:cNvSpPr/>
+          <p:nvPr/>
+        </p:nvSpPr>
+        <p:spPr>
+          <a:xfrm>
+            <a:off x="3076167" y="3768334"/>
+            <a:ext cx="2963394" cy="416324"/>
+          </a:xfrm>
+          <a:prstGeom prst="flowChartProcess">
+            <a:avLst/>
+          </a:prstGeom>
+          <a:solidFill>
+            <a:srgbClr val="92D050"/>
+          </a:solidFill>
+          <a:ln>
+            <a:solidFill>
+              <a:schemeClr val="accent6">
+                <a:lumMod val="75000"/>
+              </a:schemeClr>
+            </a:solidFill>
+          </a:ln>
+        </p:spPr>
+        <p:style>
+          <a:lnRef idx="2">
+            <a:schemeClr val="accent1">
+              <a:shade val="50000"/>
+            </a:schemeClr>
+          </a:lnRef>
+          <a:fillRef idx="1">
+            <a:schemeClr val="accent1"/>
+          </a:fillRef>
+          <a:effectRef idx="0">
+            <a:schemeClr val="accent1"/>
+          </a:effectRef>
+          <a:fontRef idx="minor">
+            <a:schemeClr val="lt1"/>
+          </a:fontRef>
+        </p:style>
+        <p:txBody>
+          <a:bodyPr rtlCol="0" anchor="ctr"/>
+          <a:lstStyle/>
+          <a:p>
+            <a:pPr algn="ctr"/>
+            <a:r>
+              <a:rPr lang="it-IT" sz="1600" dirty="0" err="1" smtClean="0"/>
+              <a:t>Check</a:t>
+            </a:r>
+            <a:r>
+              <a:rPr lang="it-IT" sz="1600" dirty="0" smtClean="0"/>
+              <a:t> </a:t>
+            </a:r>
+            <a:r>
+              <a:rPr lang="it-IT" sz="1600" dirty="0" err="1" smtClean="0"/>
+              <a:t>user</a:t>
+            </a:r>
+            <a:r>
+              <a:rPr lang="it-IT" sz="1600" dirty="0" smtClean="0"/>
+              <a:t> </a:t>
+            </a:r>
+            <a:r>
+              <a:rPr lang="it-IT" sz="1600" dirty="0" err="1" smtClean="0"/>
+              <a:t>creation</a:t>
+            </a:r>
+            <a:r>
+              <a:rPr lang="it-IT" sz="1600" dirty="0" smtClean="0"/>
+              <a:t> </a:t>
+            </a:r>
+            <a:r>
+              <a:rPr lang="it-IT" sz="1600" dirty="0" err="1" smtClean="0"/>
+              <a:t>permissions</a:t>
+            </a:r>
+            <a:endParaRPr lang="it-IT" sz="1600" dirty="0"/>
+          </a:p>
+        </p:txBody>
+      </p:sp>
+      <p:sp>
+        <p:nvSpPr>
+          <p:cNvPr id="4" name="Elaborazione 39"/>
+          <p:cNvSpPr/>
+          <p:nvPr/>
+        </p:nvSpPr>
+        <p:spPr>
+          <a:xfrm>
+            <a:off x="7627536" y="3775763"/>
+            <a:ext cx="2968418" cy="416324"/>
+          </a:xfrm>
+          <a:prstGeom prst="flowChartProcess">
+            <a:avLst/>
+          </a:prstGeom>
+          <a:solidFill>
+            <a:srgbClr val="92D050"/>
+          </a:solidFill>
+          <a:ln>
+            <a:solidFill>
+              <a:schemeClr val="accent6">
+                <a:lumMod val="75000"/>
+              </a:schemeClr>
+            </a:solidFill>
+          </a:ln>
+        </p:spPr>
+        <p:style>
+          <a:lnRef idx="2">
+            <a:schemeClr val="accent1">
+              <a:shade val="50000"/>
+            </a:schemeClr>
+          </a:lnRef>
+          <a:fillRef idx="1">
+            <a:schemeClr val="accent1"/>
+          </a:fillRef>
+          <a:effectRef idx="0">
+            <a:schemeClr val="accent1"/>
+          </a:effectRef>
+          <a:fontRef idx="minor">
+            <a:schemeClr val="lt1"/>
+          </a:fontRef>
+        </p:style>
+        <p:txBody>
+          <a:bodyPr rtlCol="0" anchor="ctr"/>
+          <a:lstStyle/>
+          <a:p>
+            <a:pPr algn="ctr"/>
+            <a:r>
+              <a:rPr lang="it-IT" sz="1400" dirty="0" err="1" smtClean="0"/>
+              <a:t>Retrieve</a:t>
+            </a:r>
+            <a:r>
+              <a:rPr lang="it-IT" sz="1400" dirty="0" smtClean="0"/>
+              <a:t> default </a:t>
+            </a:r>
+            <a:r>
+              <a:rPr lang="it-IT" sz="1400" dirty="0" err="1" smtClean="0"/>
+              <a:t>permissions</a:t>
+            </a:r>
+            <a:r>
+              <a:rPr lang="it-IT" sz="1400" dirty="0" smtClean="0"/>
+              <a:t> for </a:t>
+            </a:r>
+            <a:r>
+              <a:rPr lang="it-IT" sz="1400" dirty="0" err="1" smtClean="0"/>
+              <a:t>this</a:t>
+            </a:r>
+            <a:r>
+              <a:rPr lang="it-IT" sz="1400" dirty="0" smtClean="0"/>
+              <a:t> </a:t>
+            </a:r>
+            <a:r>
+              <a:rPr lang="it-IT" sz="1400" dirty="0" err="1" smtClean="0"/>
+              <a:t>kind</a:t>
+            </a:r>
+            <a:r>
+              <a:rPr lang="it-IT" sz="1400" dirty="0" smtClean="0"/>
+              <a:t> of </a:t>
+            </a:r>
+            <a:r>
+              <a:rPr lang="it-IT" sz="1400" dirty="0" err="1" smtClean="0"/>
+              <a:t>resource</a:t>
+            </a:r>
+            <a:endParaRPr lang="it-IT" sz="1400" dirty="0"/>
+          </a:p>
+        </p:txBody>
+      </p:sp>
+      <p:sp>
+        <p:nvSpPr>
+          <p:cNvPr id="5" name="Elaborazione 40"/>
+          <p:cNvSpPr/>
+          <p:nvPr/>
+        </p:nvSpPr>
+        <p:spPr>
+          <a:xfrm>
+            <a:off x="7627536" y="4423855"/>
+            <a:ext cx="2963395" cy="415632"/>
+          </a:xfrm>
+          <a:prstGeom prst="flowChartProcess">
+            <a:avLst/>
+          </a:prstGeom>
+          <a:solidFill>
+            <a:srgbClr val="92D050"/>
+          </a:solidFill>
+          <a:ln>
+            <a:solidFill>
+              <a:schemeClr val="accent6">
+                <a:lumMod val="75000"/>
+              </a:schemeClr>
+            </a:solidFill>
+          </a:ln>
+        </p:spPr>
+        <p:style>
+          <a:lnRef idx="2">
+            <a:schemeClr val="accent1">
+              <a:shade val="50000"/>
+            </a:schemeClr>
+          </a:lnRef>
+          <a:fillRef idx="1">
+            <a:schemeClr val="accent1"/>
+          </a:fillRef>
+          <a:effectRef idx="0">
+            <a:schemeClr val="accent1"/>
+          </a:effectRef>
+          <a:fontRef idx="minor">
+            <a:schemeClr val="lt1"/>
+          </a:fontRef>
+        </p:style>
+        <p:txBody>
+          <a:bodyPr rtlCol="0" anchor="ctr"/>
+          <a:lstStyle/>
+          <a:p>
+            <a:pPr algn="ctr"/>
+            <a:r>
+              <a:rPr lang="it-IT" sz="1400" dirty="0" smtClean="0"/>
+              <a:t>Create </a:t>
+            </a:r>
+            <a:r>
+              <a:rPr lang="it-IT" sz="1400" dirty="0" err="1" smtClean="0"/>
+              <a:t>resource</a:t>
+            </a:r>
+            <a:r>
+              <a:rPr lang="it-IT" sz="1400" dirty="0" smtClean="0"/>
+              <a:t> and </a:t>
+            </a:r>
+            <a:r>
+              <a:rPr lang="it-IT" sz="1400" dirty="0" err="1" smtClean="0"/>
+              <a:t>assign</a:t>
+            </a:r>
+            <a:r>
+              <a:rPr lang="it-IT" sz="1400" dirty="0" smtClean="0"/>
+              <a:t> default </a:t>
+            </a:r>
+            <a:r>
+              <a:rPr lang="it-IT" sz="1400" dirty="0" err="1" smtClean="0"/>
+              <a:t>permissions</a:t>
+            </a:r>
+            <a:endParaRPr lang="it-IT" sz="1400" dirty="0"/>
+          </a:p>
+        </p:txBody>
+      </p:sp>
+      <p:sp>
+        <p:nvSpPr>
+          <p:cNvPr id="6" name="CasellaDiTesto 72"/>
+          <p:cNvSpPr txBox="1"/>
+          <p:nvPr/>
+        </p:nvSpPr>
+        <p:spPr>
+          <a:xfrm>
+            <a:off x="3970663" y="2993314"/>
+            <a:ext cx="1443148" cy="553998"/>
+          </a:xfrm>
+          <a:prstGeom prst="rect">
+            <a:avLst/>
+          </a:prstGeom>
+          <a:noFill/>
+        </p:spPr>
+        <p:txBody>
+          <a:bodyPr wrap="square" rtlCol="0">
+            <a:spAutoFit/>
+          </a:bodyPr>
+          <a:lstStyle/>
+          <a:p>
+            <a:r>
+              <a:rPr lang="it-IT" sz="1000" i="1" dirty="0" err="1" smtClean="0">
+                <a:solidFill>
+                  <a:schemeClr val="accent2">
+                    <a:lumMod val="75000"/>
+                  </a:schemeClr>
+                </a:solidFill>
+              </a:rPr>
+              <a:t>Lookup</a:t>
+            </a:r>
+            <a:r>
+              <a:rPr lang="it-IT" sz="1000" i="1" dirty="0" smtClean="0">
+                <a:solidFill>
+                  <a:schemeClr val="accent2">
+                    <a:lumMod val="75000"/>
+                  </a:schemeClr>
+                </a:solidFill>
+              </a:rPr>
+              <a:t> </a:t>
+            </a:r>
+            <a:r>
+              <a:rPr lang="it-IT" sz="1000" i="1" dirty="0">
+                <a:solidFill>
+                  <a:schemeClr val="accent2">
+                    <a:lumMod val="75000"/>
+                  </a:schemeClr>
+                </a:solidFill>
+              </a:rPr>
+              <a:t>on CURRENT_RESOURCES_PERMISSION</a:t>
+            </a:r>
+            <a:endParaRPr lang="en-GB" sz="1000" dirty="0">
+              <a:solidFill>
+                <a:schemeClr val="accent2">
+                  <a:lumMod val="75000"/>
+                </a:schemeClr>
+              </a:solidFill>
+            </a:endParaRPr>
+          </a:p>
+        </p:txBody>
+      </p:sp>
+      <p:sp>
+        <p:nvSpPr>
+          <p:cNvPr id="7" name="CasellaDiTesto 96"/>
+          <p:cNvSpPr txBox="1"/>
+          <p:nvPr/>
+        </p:nvSpPr>
+        <p:spPr>
+          <a:xfrm>
+            <a:off x="3426766" y="4191996"/>
+            <a:ext cx="2657327" cy="246221"/>
+          </a:xfrm>
+          <a:prstGeom prst="rect">
+            <a:avLst/>
+          </a:prstGeom>
+          <a:noFill/>
+        </p:spPr>
+        <p:txBody>
+          <a:bodyPr wrap="square" rtlCol="0">
+            <a:spAutoFit/>
+          </a:bodyPr>
+          <a:lstStyle/>
+          <a:p>
+            <a:r>
+              <a:rPr lang="it-IT" sz="1000" i="1" dirty="0" err="1" smtClean="0">
+                <a:solidFill>
+                  <a:schemeClr val="accent2">
+                    <a:lumMod val="75000"/>
+                  </a:schemeClr>
+                </a:solidFill>
+              </a:rPr>
+              <a:t>Lookup</a:t>
+            </a:r>
+            <a:r>
+              <a:rPr lang="it-IT" sz="1000" i="1" dirty="0" smtClean="0">
+                <a:solidFill>
+                  <a:schemeClr val="accent2">
+                    <a:lumMod val="75000"/>
+                  </a:schemeClr>
+                </a:solidFill>
+              </a:rPr>
+              <a:t> </a:t>
+            </a:r>
+            <a:r>
+              <a:rPr lang="it-IT" sz="1000" i="1" dirty="0">
+                <a:solidFill>
+                  <a:schemeClr val="accent2">
+                    <a:lumMod val="75000"/>
+                  </a:schemeClr>
+                </a:solidFill>
+              </a:rPr>
+              <a:t>on </a:t>
+            </a:r>
+            <a:r>
+              <a:rPr lang="it-IT" sz="1000" i="1" dirty="0" smtClean="0">
+                <a:solidFill>
+                  <a:schemeClr val="accent2">
+                    <a:lumMod val="75000"/>
+                  </a:schemeClr>
+                </a:solidFill>
+              </a:rPr>
+              <a:t>USER_CREATION_PERMISSIONS</a:t>
+            </a:r>
+            <a:endParaRPr lang="en-GB" sz="1000" dirty="0">
+              <a:solidFill>
+                <a:schemeClr val="accent2">
+                  <a:lumMod val="75000"/>
+                </a:schemeClr>
+              </a:solidFill>
+            </a:endParaRPr>
+          </a:p>
+        </p:txBody>
+      </p:sp>
+      <p:sp>
+        <p:nvSpPr>
+          <p:cNvPr id="8" name="CasellaDiTesto 118"/>
+          <p:cNvSpPr txBox="1"/>
+          <p:nvPr/>
+        </p:nvSpPr>
+        <p:spPr>
+          <a:xfrm>
+            <a:off x="10685151" y="3743677"/>
+            <a:ext cx="1043735" cy="507831"/>
+          </a:xfrm>
+          <a:prstGeom prst="rect">
+            <a:avLst/>
+          </a:prstGeom>
+          <a:noFill/>
+        </p:spPr>
+        <p:txBody>
+          <a:bodyPr wrap="square" rtlCol="0">
+            <a:spAutoFit/>
+          </a:bodyPr>
+          <a:lstStyle/>
+          <a:p>
+            <a:r>
+              <a:rPr lang="it-IT" sz="900" i="1" dirty="0" err="1" smtClean="0">
+                <a:solidFill>
+                  <a:schemeClr val="accent2">
+                    <a:lumMod val="75000"/>
+                  </a:schemeClr>
+                </a:solidFill>
+              </a:rPr>
+              <a:t>Lookup</a:t>
+            </a:r>
+            <a:r>
+              <a:rPr lang="it-IT" sz="900" i="1" dirty="0" smtClean="0">
+                <a:solidFill>
+                  <a:schemeClr val="accent2">
+                    <a:lumMod val="75000"/>
+                  </a:schemeClr>
+                </a:solidFill>
+              </a:rPr>
+              <a:t> </a:t>
+            </a:r>
+            <a:r>
+              <a:rPr lang="it-IT" sz="900" i="1" dirty="0">
+                <a:solidFill>
+                  <a:schemeClr val="accent2">
+                    <a:lumMod val="75000"/>
+                  </a:schemeClr>
+                </a:solidFill>
+              </a:rPr>
+              <a:t>on </a:t>
+            </a:r>
+            <a:r>
+              <a:rPr lang="it-IT" sz="900" i="1" dirty="0" smtClean="0">
+                <a:solidFill>
+                  <a:schemeClr val="accent2">
+                    <a:lumMod val="75000"/>
+                  </a:schemeClr>
+                </a:solidFill>
+              </a:rPr>
+              <a:t>DEFAULT_USAGE_PERMISSIONS</a:t>
+            </a:r>
+            <a:endParaRPr lang="en-GB" sz="900" dirty="0">
+              <a:solidFill>
+                <a:schemeClr val="accent2">
+                  <a:lumMod val="75000"/>
+                </a:schemeClr>
+              </a:solidFill>
+            </a:endParaRPr>
+          </a:p>
+        </p:txBody>
+      </p:sp>
+      <p:sp>
+        <p:nvSpPr>
+          <p:cNvPr id="9" name="CasellaDiTesto 122"/>
+          <p:cNvSpPr txBox="1"/>
+          <p:nvPr/>
+        </p:nvSpPr>
+        <p:spPr>
+          <a:xfrm>
+            <a:off x="10703982" y="4376950"/>
+            <a:ext cx="1285731" cy="507831"/>
+          </a:xfrm>
+          <a:prstGeom prst="rect">
+            <a:avLst/>
+          </a:prstGeom>
+          <a:noFill/>
+        </p:spPr>
+        <p:txBody>
+          <a:bodyPr wrap="square" rtlCol="0">
+            <a:spAutoFit/>
+          </a:bodyPr>
+          <a:lstStyle/>
+          <a:p>
+            <a:r>
+              <a:rPr lang="it-IT" sz="900" i="1" dirty="0" err="1" smtClean="0">
+                <a:solidFill>
+                  <a:schemeClr val="accent2">
+                    <a:lumMod val="75000"/>
+                  </a:schemeClr>
+                </a:solidFill>
+              </a:rPr>
+              <a:t>Insert</a:t>
+            </a:r>
+            <a:r>
+              <a:rPr lang="it-IT" sz="900" i="1" dirty="0" smtClean="0">
+                <a:solidFill>
+                  <a:schemeClr val="accent2">
+                    <a:lumMod val="75000"/>
+                  </a:schemeClr>
+                </a:solidFill>
+              </a:rPr>
+              <a:t> </a:t>
+            </a:r>
+            <a:r>
+              <a:rPr lang="it-IT" sz="900" i="1" dirty="0">
+                <a:solidFill>
+                  <a:schemeClr val="accent2">
+                    <a:lumMod val="75000"/>
+                  </a:schemeClr>
+                </a:solidFill>
+              </a:rPr>
+              <a:t>on </a:t>
+            </a:r>
+            <a:r>
+              <a:rPr lang="it-IT" sz="900" i="1" dirty="0" smtClean="0">
+                <a:solidFill>
+                  <a:schemeClr val="accent2">
+                    <a:lumMod val="75000"/>
+                  </a:schemeClr>
+                </a:solidFill>
+              </a:rPr>
+              <a:t>CURRENT_RESOURCES_PERMISSION</a:t>
+            </a:r>
+            <a:endParaRPr lang="en-GB" sz="900" dirty="0">
+              <a:solidFill>
+                <a:schemeClr val="accent2">
+                  <a:lumMod val="75000"/>
+                </a:schemeClr>
+              </a:solidFill>
+            </a:endParaRPr>
+          </a:p>
+        </p:txBody>
+      </p:sp>
+      <p:sp>
+        <p:nvSpPr>
+          <p:cNvPr id="10" name="Terminatore 126"/>
+          <p:cNvSpPr/>
+          <p:nvPr/>
+        </p:nvSpPr>
+        <p:spPr>
+          <a:xfrm>
+            <a:off x="8588414" y="5059372"/>
+            <a:ext cx="975340" cy="442044"/>
+          </a:xfrm>
+          <a:prstGeom prst="flowChartTerminator">
+            <a:avLst/>
+          </a:prstGeom>
+        </p:spPr>
+        <p:style>
+          <a:lnRef idx="2">
+            <a:schemeClr val="accent1">
+              <a:shade val="50000"/>
+            </a:schemeClr>
+          </a:lnRef>
+          <a:fillRef idx="1">
+            <a:schemeClr val="accent1"/>
+          </a:fillRef>
+          <a:effectRef idx="0">
+            <a:schemeClr val="accent1"/>
+          </a:effectRef>
+          <a:fontRef idx="minor">
+            <a:schemeClr val="lt1"/>
+          </a:fontRef>
+        </p:style>
+        <p:txBody>
+          <a:bodyPr rtlCol="0" anchor="ctr"/>
+          <a:lstStyle/>
+          <a:p>
+            <a:pPr algn="ctr"/>
+            <a:r>
+              <a:rPr lang="it-IT" sz="1200" dirty="0" smtClean="0"/>
+              <a:t>End</a:t>
+            </a:r>
+            <a:endParaRPr lang="it-IT" sz="1200" dirty="0"/>
+          </a:p>
+        </p:txBody>
+      </p:sp>
+      <p:cxnSp>
+        <p:nvCxnSpPr>
+          <p:cNvPr id="11" name="Connettore 2 142"/>
+          <p:cNvCxnSpPr/>
+          <p:nvPr/>
+        </p:nvCxnSpPr>
+        <p:spPr>
+          <a:xfrm flipV="1">
+            <a:off x="2766822" y="3976496"/>
+            <a:ext cx="310488" cy="157"/>
+          </a:xfrm>
+          <a:prstGeom prst="straightConnector1">
+            <a:avLst/>
+          </a:prstGeom>
+          <a:ln>
+            <a:tailEnd type="triangle"/>
+          </a:ln>
+        </p:spPr>
+        <p:style>
+          <a:lnRef idx="1">
+            <a:schemeClr val="accent1"/>
+          </a:lnRef>
+          <a:fillRef idx="0">
+            <a:schemeClr val="accent1"/>
+          </a:fillRef>
+          <a:effectRef idx="0">
+            <a:schemeClr val="accent1"/>
+          </a:effectRef>
+          <a:fontRef idx="minor">
+            <a:schemeClr val="tx1"/>
+          </a:fontRef>
+        </p:style>
+      </p:cxnSp>
+      <p:cxnSp>
+        <p:nvCxnSpPr>
+          <p:cNvPr id="12" name="Connettore 4 5"/>
+          <p:cNvCxnSpPr>
+            <a:stCxn id="17" idx="1"/>
+            <a:endCxn id="10" idx="1"/>
+          </p:cNvCxnSpPr>
+          <p:nvPr/>
+        </p:nvCxnSpPr>
+        <p:spPr>
+          <a:xfrm rot="10800000" flipH="1" flipV="1">
+            <a:off x="1796144" y="2529556"/>
+            <a:ext cx="6792269" cy="2750838"/>
+          </a:xfrm>
+          <a:prstGeom prst="bentConnector3">
+            <a:avLst>
+              <a:gd name="adj1" fmla="val -20054"/>
+            </a:avLst>
+          </a:prstGeom>
+          <a:ln>
+            <a:tailEnd type="triangle"/>
+          </a:ln>
+        </p:spPr>
+        <p:style>
+          <a:lnRef idx="1">
+            <a:schemeClr val="accent1"/>
+          </a:lnRef>
+          <a:fillRef idx="0">
+            <a:schemeClr val="accent1"/>
+          </a:fillRef>
+          <a:effectRef idx="0">
+            <a:schemeClr val="accent1"/>
+          </a:effectRef>
+          <a:fontRef idx="minor">
+            <a:schemeClr val="tx1"/>
+          </a:fontRef>
+        </p:style>
+      </p:cxnSp>
+      <p:sp>
+        <p:nvSpPr>
+          <p:cNvPr id="13" name="CasellaDiTesto 38"/>
+          <p:cNvSpPr txBox="1"/>
+          <p:nvPr/>
+        </p:nvSpPr>
+        <p:spPr>
+          <a:xfrm>
+            <a:off x="7212534" y="3737703"/>
+            <a:ext cx="356188" cy="246221"/>
+          </a:xfrm>
+          <a:prstGeom prst="rect">
+            <a:avLst/>
+          </a:prstGeom>
+          <a:noFill/>
+        </p:spPr>
+        <p:txBody>
+          <a:bodyPr wrap="none" rtlCol="0">
+            <a:spAutoFit/>
+          </a:bodyPr>
+          <a:lstStyle/>
+          <a:p>
+            <a:r>
+              <a:rPr lang="it-IT" sz="1000" dirty="0" smtClean="0">
+                <a:solidFill>
+                  <a:schemeClr val="accent1"/>
+                </a:solidFill>
+              </a:rPr>
+              <a:t>yes</a:t>
+            </a:r>
+            <a:endParaRPr lang="en-GB" sz="1000" dirty="0">
+              <a:solidFill>
+                <a:schemeClr val="accent1"/>
+              </a:solidFill>
+            </a:endParaRPr>
+          </a:p>
+        </p:txBody>
+      </p:sp>
+      <p:sp>
+        <p:nvSpPr>
+          <p:cNvPr id="14" name="Elaborazione 33"/>
+          <p:cNvSpPr/>
+          <p:nvPr/>
+        </p:nvSpPr>
+        <p:spPr>
+          <a:xfrm>
+            <a:off x="786296" y="956550"/>
+            <a:ext cx="3004844" cy="414072"/>
+          </a:xfrm>
+          <a:prstGeom prst="flowChartProcess">
+            <a:avLst/>
+          </a:prstGeom>
+          <a:solidFill>
+            <a:srgbClr val="92D050"/>
+          </a:solidFill>
+          <a:ln>
+            <a:solidFill>
+              <a:schemeClr val="accent6">
+                <a:lumMod val="75000"/>
+              </a:schemeClr>
+            </a:solidFill>
+          </a:ln>
+        </p:spPr>
+        <p:style>
+          <a:lnRef idx="2">
+            <a:schemeClr val="accent1">
+              <a:shade val="50000"/>
+            </a:schemeClr>
+          </a:lnRef>
+          <a:fillRef idx="1">
+            <a:schemeClr val="accent1"/>
+          </a:fillRef>
+          <a:effectRef idx="0">
+            <a:schemeClr val="accent1"/>
+          </a:effectRef>
+          <a:fontRef idx="minor">
+            <a:schemeClr val="lt1"/>
+          </a:fontRef>
+        </p:style>
+        <p:txBody>
+          <a:bodyPr rtlCol="0" anchor="ctr"/>
+          <a:lstStyle/>
+          <a:p>
+            <a:pPr algn="ctr"/>
+            <a:r>
+              <a:rPr lang="en-US" sz="1600" dirty="0" smtClean="0"/>
+              <a:t>Receive a creation request</a:t>
+            </a:r>
+            <a:endParaRPr lang="it-IT" sz="1600" dirty="0"/>
+          </a:p>
+        </p:txBody>
+      </p:sp>
+      <p:sp>
+        <p:nvSpPr>
+          <p:cNvPr id="15" name="Elaborazione 51"/>
+          <p:cNvSpPr/>
+          <p:nvPr/>
+        </p:nvSpPr>
+        <p:spPr>
+          <a:xfrm>
+            <a:off x="780268" y="1610026"/>
+            <a:ext cx="3010872" cy="414072"/>
+          </a:xfrm>
+          <a:prstGeom prst="flowChartProcess">
+            <a:avLst/>
+          </a:prstGeom>
+          <a:solidFill>
+            <a:srgbClr val="92D050"/>
+          </a:solidFill>
+          <a:ln>
+            <a:solidFill>
+              <a:schemeClr val="accent6">
+                <a:lumMod val="75000"/>
+              </a:schemeClr>
+            </a:solidFill>
+          </a:ln>
+        </p:spPr>
+        <p:style>
+          <a:lnRef idx="2">
+            <a:schemeClr val="accent1">
+              <a:shade val="50000"/>
+            </a:schemeClr>
+          </a:lnRef>
+          <a:fillRef idx="1">
+            <a:schemeClr val="accent1"/>
+          </a:fillRef>
+          <a:effectRef idx="0">
+            <a:schemeClr val="accent1"/>
+          </a:effectRef>
+          <a:fontRef idx="minor">
+            <a:schemeClr val="lt1"/>
+          </a:fontRef>
+        </p:style>
+        <p:txBody>
+          <a:bodyPr rtlCol="0" anchor="ctr"/>
+          <a:lstStyle/>
+          <a:p>
+            <a:pPr algn="ctr"/>
+            <a:r>
+              <a:rPr lang="en-US" sz="1600" dirty="0" smtClean="0"/>
+              <a:t>Check authentication token</a:t>
+            </a:r>
+            <a:endParaRPr lang="it-IT" sz="1600" dirty="0"/>
+          </a:p>
+        </p:txBody>
+      </p:sp>
+      <p:cxnSp>
+        <p:nvCxnSpPr>
+          <p:cNvPr id="16" name="Connettore 2 60"/>
+          <p:cNvCxnSpPr>
+            <a:stCxn id="14" idx="2"/>
+            <a:endCxn id="15" idx="0"/>
+          </p:cNvCxnSpPr>
+          <p:nvPr/>
+        </p:nvCxnSpPr>
+        <p:spPr>
+          <a:xfrm flipH="1">
+            <a:off x="2285704" y="1370622"/>
+            <a:ext cx="3014" cy="239404"/>
+          </a:xfrm>
+          <a:prstGeom prst="straightConnector1">
+            <a:avLst/>
+          </a:prstGeom>
+          <a:ln>
+            <a:tailEnd type="triangle"/>
+          </a:ln>
+        </p:spPr>
+        <p:style>
+          <a:lnRef idx="1">
+            <a:schemeClr val="accent1"/>
+          </a:lnRef>
+          <a:fillRef idx="0">
+            <a:schemeClr val="accent1"/>
+          </a:fillRef>
+          <a:effectRef idx="0">
+            <a:schemeClr val="accent1"/>
+          </a:effectRef>
+          <a:fontRef idx="minor">
+            <a:schemeClr val="tx1"/>
+          </a:fontRef>
+        </p:style>
+      </p:cxnSp>
+      <p:pic>
+        <p:nvPicPr>
+          <p:cNvPr id="17" name="Immagine 25"/>
+          <p:cNvPicPr>
+            <a:picLocks noChangeAspect="1"/>
+          </p:cNvPicPr>
+          <p:nvPr/>
+        </p:nvPicPr>
+        <p:blipFill>
+          <a:blip r:embed="rId3"/>
+          <a:stretch>
+            <a:fillRect/>
+          </a:stretch>
+        </p:blipFill>
+        <p:spPr>
+          <a:xfrm>
+            <a:off x="1796145" y="2261137"/>
+            <a:ext cx="979116" cy="536838"/>
+          </a:xfrm>
+          <a:prstGeom prst="rect">
+            <a:avLst/>
+          </a:prstGeom>
+        </p:spPr>
+      </p:pic>
+      <p:pic>
+        <p:nvPicPr>
+          <p:cNvPr id="18" name="Immagine 43"/>
+          <p:cNvPicPr>
+            <a:picLocks noChangeAspect="1"/>
+          </p:cNvPicPr>
+          <p:nvPr/>
+        </p:nvPicPr>
+        <p:blipFill>
+          <a:blip r:embed="rId4"/>
+          <a:stretch>
+            <a:fillRect/>
+          </a:stretch>
+        </p:blipFill>
+        <p:spPr>
+          <a:xfrm>
+            <a:off x="3647167" y="1452289"/>
+            <a:ext cx="321617" cy="346044"/>
+          </a:xfrm>
+          <a:prstGeom prst="rect">
+            <a:avLst/>
+          </a:prstGeom>
+        </p:spPr>
+      </p:pic>
+      <p:sp>
+        <p:nvSpPr>
+          <p:cNvPr id="19" name="CasellaDiTesto 70"/>
+          <p:cNvSpPr txBox="1"/>
+          <p:nvPr/>
+        </p:nvSpPr>
+        <p:spPr>
+          <a:xfrm>
+            <a:off x="3924780" y="1597476"/>
+            <a:ext cx="990305" cy="400110"/>
+          </a:xfrm>
+          <a:prstGeom prst="rect">
+            <a:avLst/>
+          </a:prstGeom>
+          <a:noFill/>
+        </p:spPr>
+        <p:txBody>
+          <a:bodyPr wrap="square" rtlCol="0">
+            <a:spAutoFit/>
+          </a:bodyPr>
+          <a:lstStyle/>
+          <a:p>
+            <a:r>
+              <a:rPr lang="it-IT" sz="1000" i="1" dirty="0" err="1" smtClean="0">
+                <a:solidFill>
+                  <a:schemeClr val="accent2">
+                    <a:lumMod val="75000"/>
+                  </a:schemeClr>
+                </a:solidFill>
+              </a:rPr>
+              <a:t>Lookup</a:t>
+            </a:r>
+            <a:r>
+              <a:rPr lang="it-IT" sz="1000" i="1" dirty="0" smtClean="0">
+                <a:solidFill>
+                  <a:schemeClr val="accent2">
+                    <a:lumMod val="75000"/>
+                  </a:schemeClr>
+                </a:solidFill>
+              </a:rPr>
+              <a:t> </a:t>
+            </a:r>
+            <a:r>
+              <a:rPr lang="it-IT" sz="1000" i="1" dirty="0">
+                <a:solidFill>
+                  <a:schemeClr val="accent2">
+                    <a:lumMod val="75000"/>
+                  </a:schemeClr>
+                </a:solidFill>
+              </a:rPr>
+              <a:t>on </a:t>
+            </a:r>
+            <a:r>
+              <a:rPr lang="it-IT" sz="1000" i="1" dirty="0" smtClean="0">
+                <a:solidFill>
+                  <a:schemeClr val="accent2">
+                    <a:lumMod val="75000"/>
+                  </a:schemeClr>
+                </a:solidFill>
+              </a:rPr>
+              <a:t>LOGIN</a:t>
+            </a:r>
+            <a:endParaRPr lang="en-GB" sz="1000" dirty="0">
+              <a:solidFill>
+                <a:schemeClr val="accent2">
+                  <a:lumMod val="75000"/>
+                </a:schemeClr>
+              </a:solidFill>
+            </a:endParaRPr>
+          </a:p>
+        </p:txBody>
+      </p:sp>
+      <p:cxnSp>
+        <p:nvCxnSpPr>
+          <p:cNvPr id="20" name="Connettore 2 74"/>
+          <p:cNvCxnSpPr>
+            <a:stCxn id="15" idx="2"/>
+            <a:endCxn id="17" idx="0"/>
+          </p:cNvCxnSpPr>
+          <p:nvPr/>
+        </p:nvCxnSpPr>
+        <p:spPr>
+          <a:xfrm flipH="1">
+            <a:off x="2285703" y="2024098"/>
+            <a:ext cx="1" cy="237039"/>
+          </a:xfrm>
+          <a:prstGeom prst="straightConnector1">
+            <a:avLst/>
+          </a:prstGeom>
+          <a:ln>
+            <a:tailEnd type="triangle"/>
+          </a:ln>
+        </p:spPr>
+        <p:style>
+          <a:lnRef idx="1">
+            <a:schemeClr val="accent1"/>
+          </a:lnRef>
+          <a:fillRef idx="0">
+            <a:schemeClr val="accent1"/>
+          </a:fillRef>
+          <a:effectRef idx="0">
+            <a:schemeClr val="accent1"/>
+          </a:effectRef>
+          <a:fontRef idx="minor">
+            <a:schemeClr val="tx1"/>
+          </a:fontRef>
+        </p:style>
+      </p:cxnSp>
+      <p:cxnSp>
+        <p:nvCxnSpPr>
+          <p:cNvPr id="21" name="Connettore 2 81"/>
+          <p:cNvCxnSpPr/>
+          <p:nvPr/>
+        </p:nvCxnSpPr>
+        <p:spPr>
+          <a:xfrm>
+            <a:off x="2285703" y="2794063"/>
+            <a:ext cx="3014" cy="237894"/>
+          </a:xfrm>
+          <a:prstGeom prst="straightConnector1">
+            <a:avLst/>
+          </a:prstGeom>
+          <a:ln>
+            <a:tailEnd type="triangle"/>
+          </a:ln>
+        </p:spPr>
+        <p:style>
+          <a:lnRef idx="1">
+            <a:schemeClr val="accent1"/>
+          </a:lnRef>
+          <a:fillRef idx="0">
+            <a:schemeClr val="accent1"/>
+          </a:fillRef>
+          <a:effectRef idx="0">
+            <a:schemeClr val="accent1"/>
+          </a:effectRef>
+          <a:fontRef idx="minor">
+            <a:schemeClr val="tx1"/>
+          </a:fontRef>
+        </p:style>
+      </p:cxnSp>
+      <p:cxnSp>
+        <p:nvCxnSpPr>
+          <p:cNvPr id="22" name="Connettore 2 85"/>
+          <p:cNvCxnSpPr/>
+          <p:nvPr/>
+        </p:nvCxnSpPr>
+        <p:spPr>
+          <a:xfrm>
+            <a:off x="2278407" y="3477208"/>
+            <a:ext cx="3014" cy="237894"/>
+          </a:xfrm>
+          <a:prstGeom prst="straightConnector1">
+            <a:avLst/>
+          </a:prstGeom>
+          <a:ln>
+            <a:tailEnd type="triangle"/>
+          </a:ln>
+        </p:spPr>
+        <p:style>
+          <a:lnRef idx="1">
+            <a:schemeClr val="accent1"/>
+          </a:lnRef>
+          <a:fillRef idx="0">
+            <a:schemeClr val="accent1"/>
+          </a:fillRef>
+          <a:effectRef idx="0">
+            <a:schemeClr val="accent1"/>
+          </a:effectRef>
+          <a:fontRef idx="minor">
+            <a:schemeClr val="tx1"/>
+          </a:fontRef>
+        </p:style>
+      </p:cxnSp>
+      <p:pic>
+        <p:nvPicPr>
+          <p:cNvPr id="23" name="Immagine 97"/>
+          <p:cNvPicPr>
+            <a:picLocks noChangeAspect="1"/>
+          </p:cNvPicPr>
+          <p:nvPr/>
+        </p:nvPicPr>
+        <p:blipFill>
+          <a:blip r:embed="rId4"/>
+          <a:stretch>
+            <a:fillRect/>
+          </a:stretch>
+        </p:blipFill>
+        <p:spPr>
+          <a:xfrm>
+            <a:off x="3652857" y="2858935"/>
+            <a:ext cx="321617" cy="346044"/>
+          </a:xfrm>
+          <a:prstGeom prst="rect">
+            <a:avLst/>
+          </a:prstGeom>
+        </p:spPr>
+      </p:pic>
+      <p:cxnSp>
+        <p:nvCxnSpPr>
+          <p:cNvPr id="24" name="Connettore 2 102"/>
+          <p:cNvCxnSpPr/>
+          <p:nvPr/>
+        </p:nvCxnSpPr>
+        <p:spPr>
+          <a:xfrm flipV="1">
+            <a:off x="6046492" y="3984920"/>
+            <a:ext cx="310488" cy="157"/>
+          </a:xfrm>
+          <a:prstGeom prst="straightConnector1">
+            <a:avLst/>
+          </a:prstGeom>
+          <a:ln>
+            <a:tailEnd type="triangle"/>
+          </a:ln>
+        </p:spPr>
+        <p:style>
+          <a:lnRef idx="1">
+            <a:schemeClr val="accent1"/>
+          </a:lnRef>
+          <a:fillRef idx="0">
+            <a:schemeClr val="accent1"/>
+          </a:fillRef>
+          <a:effectRef idx="0">
+            <a:schemeClr val="accent1"/>
+          </a:effectRef>
+          <a:fontRef idx="minor">
+            <a:schemeClr val="tx1"/>
+          </a:fontRef>
+        </p:style>
+      </p:cxnSp>
+      <p:pic>
+        <p:nvPicPr>
+          <p:cNvPr id="25" name="Immagine 109"/>
+          <p:cNvPicPr>
+            <a:picLocks noChangeAspect="1"/>
+          </p:cNvPicPr>
+          <p:nvPr/>
+        </p:nvPicPr>
+        <p:blipFill>
+          <a:blip r:embed="rId3"/>
+          <a:stretch>
+            <a:fillRect/>
+          </a:stretch>
+        </p:blipFill>
+        <p:spPr>
+          <a:xfrm>
+            <a:off x="1788849" y="3708234"/>
+            <a:ext cx="979116" cy="536838"/>
+          </a:xfrm>
+          <a:prstGeom prst="rect">
+            <a:avLst/>
+          </a:prstGeom>
+        </p:spPr>
+      </p:pic>
+      <p:pic>
+        <p:nvPicPr>
+          <p:cNvPr id="26" name="Immagine 100"/>
+          <p:cNvPicPr>
+            <a:picLocks noChangeAspect="1"/>
+          </p:cNvPicPr>
+          <p:nvPr/>
+        </p:nvPicPr>
+        <p:blipFill>
+          <a:blip r:embed="rId5"/>
+          <a:stretch>
+            <a:fillRect/>
+          </a:stretch>
+        </p:blipFill>
+        <p:spPr>
+          <a:xfrm>
+            <a:off x="6345826" y="3712865"/>
+            <a:ext cx="975445" cy="542591"/>
+          </a:xfrm>
+          <a:prstGeom prst="rect">
+            <a:avLst/>
+          </a:prstGeom>
+        </p:spPr>
+      </p:pic>
+      <p:cxnSp>
+        <p:nvCxnSpPr>
+          <p:cNvPr id="27" name="Connettore 2 120"/>
+          <p:cNvCxnSpPr/>
+          <p:nvPr/>
+        </p:nvCxnSpPr>
+        <p:spPr>
+          <a:xfrm flipV="1">
+            <a:off x="7306851" y="3983925"/>
+            <a:ext cx="310488" cy="157"/>
+          </a:xfrm>
+          <a:prstGeom prst="straightConnector1">
+            <a:avLst/>
+          </a:prstGeom>
+          <a:ln>
+            <a:tailEnd type="triangle"/>
+          </a:ln>
+        </p:spPr>
+        <p:style>
+          <a:lnRef idx="1">
+            <a:schemeClr val="accent1"/>
+          </a:lnRef>
+          <a:fillRef idx="0">
+            <a:schemeClr val="accent1"/>
+          </a:fillRef>
+          <a:effectRef idx="0">
+            <a:schemeClr val="accent1"/>
+          </a:effectRef>
+          <a:fontRef idx="minor">
+            <a:schemeClr val="tx1"/>
+          </a:fontRef>
+        </p:style>
+      </p:cxnSp>
+      <p:pic>
+        <p:nvPicPr>
+          <p:cNvPr id="28" name="Immagine 123"/>
+          <p:cNvPicPr>
+            <a:picLocks noChangeAspect="1"/>
+          </p:cNvPicPr>
+          <p:nvPr/>
+        </p:nvPicPr>
+        <p:blipFill>
+          <a:blip r:embed="rId4"/>
+          <a:stretch>
+            <a:fillRect/>
+          </a:stretch>
+        </p:blipFill>
+        <p:spPr>
+          <a:xfrm>
+            <a:off x="10435145" y="3585746"/>
+            <a:ext cx="321617" cy="346044"/>
+          </a:xfrm>
+          <a:prstGeom prst="rect">
+            <a:avLst/>
+          </a:prstGeom>
+        </p:spPr>
+      </p:pic>
+      <p:cxnSp>
+        <p:nvCxnSpPr>
+          <p:cNvPr id="29" name="Connettore 2 131"/>
+          <p:cNvCxnSpPr/>
+          <p:nvPr/>
+        </p:nvCxnSpPr>
+        <p:spPr>
+          <a:xfrm>
+            <a:off x="9079098" y="4184170"/>
+            <a:ext cx="3014" cy="237894"/>
+          </a:xfrm>
+          <a:prstGeom prst="straightConnector1">
+            <a:avLst/>
+          </a:prstGeom>
+          <a:ln>
+            <a:tailEnd type="triangle"/>
+          </a:ln>
+        </p:spPr>
+        <p:style>
+          <a:lnRef idx="1">
+            <a:schemeClr val="accent1"/>
+          </a:lnRef>
+          <a:fillRef idx="0">
+            <a:schemeClr val="accent1"/>
+          </a:fillRef>
+          <a:effectRef idx="0">
+            <a:schemeClr val="accent1"/>
+          </a:effectRef>
+          <a:fontRef idx="minor">
+            <a:schemeClr val="tx1"/>
+          </a:fontRef>
+        </p:style>
+      </p:cxnSp>
+      <p:cxnSp>
+        <p:nvCxnSpPr>
+          <p:cNvPr id="30" name="Connettore 2 132"/>
+          <p:cNvCxnSpPr>
+            <a:endCxn id="10" idx="0"/>
+          </p:cNvCxnSpPr>
+          <p:nvPr/>
+        </p:nvCxnSpPr>
+        <p:spPr>
+          <a:xfrm>
+            <a:off x="9076084" y="4840528"/>
+            <a:ext cx="0" cy="218844"/>
+          </a:xfrm>
+          <a:prstGeom prst="straightConnector1">
+            <a:avLst/>
+          </a:prstGeom>
+          <a:ln>
+            <a:tailEnd type="triangle"/>
+          </a:ln>
+        </p:spPr>
+        <p:style>
+          <a:lnRef idx="1">
+            <a:schemeClr val="accent1"/>
+          </a:lnRef>
+          <a:fillRef idx="0">
+            <a:schemeClr val="accent1"/>
+          </a:fillRef>
+          <a:effectRef idx="0">
+            <a:schemeClr val="accent1"/>
+          </a:effectRef>
+          <a:fontRef idx="minor">
+            <a:schemeClr val="tx1"/>
+          </a:fontRef>
+        </p:style>
+      </p:cxnSp>
+      <p:pic>
+        <p:nvPicPr>
+          <p:cNvPr id="31" name="Immagine 134"/>
+          <p:cNvPicPr>
+            <a:picLocks noChangeAspect="1"/>
+          </p:cNvPicPr>
+          <p:nvPr/>
+        </p:nvPicPr>
+        <p:blipFill>
+          <a:blip r:embed="rId4"/>
+          <a:stretch>
+            <a:fillRect/>
+          </a:stretch>
+        </p:blipFill>
+        <p:spPr>
+          <a:xfrm>
+            <a:off x="10437700" y="4255456"/>
+            <a:ext cx="321617" cy="346044"/>
+          </a:xfrm>
+          <a:prstGeom prst="rect">
+            <a:avLst/>
+          </a:prstGeom>
+        </p:spPr>
+      </p:pic>
+      <p:sp>
+        <p:nvSpPr>
+          <p:cNvPr id="32" name="CasellaDiTesto 135"/>
+          <p:cNvSpPr txBox="1"/>
+          <p:nvPr/>
+        </p:nvSpPr>
+        <p:spPr>
+          <a:xfrm>
+            <a:off x="6574777" y="4182257"/>
+            <a:ext cx="319318" cy="246221"/>
+          </a:xfrm>
+          <a:prstGeom prst="rect">
+            <a:avLst/>
+          </a:prstGeom>
+          <a:noFill/>
+        </p:spPr>
+        <p:txBody>
+          <a:bodyPr wrap="none" rtlCol="0">
+            <a:spAutoFit/>
+          </a:bodyPr>
+          <a:lstStyle/>
+          <a:p>
+            <a:r>
+              <a:rPr lang="it-IT" sz="1000" dirty="0" smtClean="0">
+                <a:solidFill>
+                  <a:schemeClr val="accent1"/>
+                </a:solidFill>
+              </a:rPr>
+              <a:t>no</a:t>
+            </a:r>
+            <a:endParaRPr lang="en-GB" sz="1000" dirty="0">
+              <a:solidFill>
+                <a:schemeClr val="accent1"/>
+              </a:solidFill>
+            </a:endParaRPr>
+          </a:p>
+        </p:txBody>
+      </p:sp>
+      <p:cxnSp>
+        <p:nvCxnSpPr>
+          <p:cNvPr id="33" name="Connettore 1 128"/>
+          <p:cNvCxnSpPr>
+            <a:endCxn id="26" idx="2"/>
+          </p:cNvCxnSpPr>
+          <p:nvPr/>
+        </p:nvCxnSpPr>
+        <p:spPr>
+          <a:xfrm flipV="1">
+            <a:off x="6833548" y="4255456"/>
+            <a:ext cx="1" cy="1043988"/>
+          </a:xfrm>
+          <a:prstGeom prst="line">
+            <a:avLst/>
+          </a:prstGeom>
+        </p:spPr>
+        <p:style>
+          <a:lnRef idx="1">
+            <a:schemeClr val="accent1"/>
+          </a:lnRef>
+          <a:fillRef idx="0">
+            <a:schemeClr val="accent1"/>
+          </a:fillRef>
+          <a:effectRef idx="0">
+            <a:schemeClr val="accent1"/>
+          </a:effectRef>
+          <a:fontRef idx="minor">
+            <a:schemeClr val="tx1"/>
+          </a:fontRef>
+        </p:style>
+      </p:cxnSp>
+      <p:pic>
+        <p:nvPicPr>
+          <p:cNvPr id="34" name="Immagine 140"/>
+          <p:cNvPicPr>
+            <a:picLocks noChangeAspect="1"/>
+          </p:cNvPicPr>
+          <p:nvPr/>
+        </p:nvPicPr>
+        <p:blipFill>
+          <a:blip r:embed="rId4"/>
+          <a:stretch>
+            <a:fillRect/>
+          </a:stretch>
+        </p:blipFill>
+        <p:spPr>
+          <a:xfrm>
+            <a:off x="5888464" y="3584810"/>
+            <a:ext cx="321617" cy="346044"/>
+          </a:xfrm>
+          <a:prstGeom prst="rect">
+            <a:avLst/>
+          </a:prstGeom>
+        </p:spPr>
+      </p:pic>
+      <p:cxnSp>
+        <p:nvCxnSpPr>
+          <p:cNvPr id="35" name="Connettore 1 154"/>
+          <p:cNvCxnSpPr>
+            <a:endCxn id="25" idx="2"/>
+          </p:cNvCxnSpPr>
+          <p:nvPr/>
+        </p:nvCxnSpPr>
+        <p:spPr>
+          <a:xfrm flipV="1">
+            <a:off x="2278406" y="4245072"/>
+            <a:ext cx="1" cy="1044847"/>
+          </a:xfrm>
+          <a:prstGeom prst="line">
+            <a:avLst/>
+          </a:prstGeom>
+        </p:spPr>
+        <p:style>
+          <a:lnRef idx="1">
+            <a:schemeClr val="accent1"/>
+          </a:lnRef>
+          <a:fillRef idx="0">
+            <a:schemeClr val="accent1"/>
+          </a:fillRef>
+          <a:effectRef idx="0">
+            <a:schemeClr val="accent1"/>
+          </a:effectRef>
+          <a:fontRef idx="minor">
+            <a:schemeClr val="tx1"/>
+          </a:fontRef>
+        </p:style>
+      </p:cxnSp>
+      <p:sp>
+        <p:nvSpPr>
+          <p:cNvPr id="36" name="CasellaDiTesto 156"/>
+          <p:cNvSpPr txBox="1"/>
+          <p:nvPr/>
+        </p:nvSpPr>
+        <p:spPr>
+          <a:xfrm>
+            <a:off x="2706839" y="3708077"/>
+            <a:ext cx="356188" cy="246221"/>
+          </a:xfrm>
+          <a:prstGeom prst="rect">
+            <a:avLst/>
+          </a:prstGeom>
+          <a:noFill/>
+        </p:spPr>
+        <p:txBody>
+          <a:bodyPr wrap="none" rtlCol="0">
+            <a:spAutoFit/>
+          </a:bodyPr>
+          <a:lstStyle/>
+          <a:p>
+            <a:r>
+              <a:rPr lang="it-IT" sz="1000" dirty="0" smtClean="0">
+                <a:solidFill>
+                  <a:schemeClr val="accent1"/>
+                </a:solidFill>
+              </a:rPr>
+              <a:t>yes</a:t>
+            </a:r>
+            <a:endParaRPr lang="en-GB" sz="1000" dirty="0">
+              <a:solidFill>
+                <a:schemeClr val="accent1"/>
+              </a:solidFill>
+            </a:endParaRPr>
+          </a:p>
+        </p:txBody>
+      </p:sp>
+      <p:sp>
+        <p:nvSpPr>
+          <p:cNvPr id="37" name="CasellaDiTesto 157"/>
+          <p:cNvSpPr txBox="1"/>
+          <p:nvPr/>
+        </p:nvSpPr>
+        <p:spPr>
+          <a:xfrm>
+            <a:off x="2007394" y="4182257"/>
+            <a:ext cx="319318" cy="246221"/>
+          </a:xfrm>
+          <a:prstGeom prst="rect">
+            <a:avLst/>
+          </a:prstGeom>
+          <a:noFill/>
+        </p:spPr>
+        <p:txBody>
+          <a:bodyPr wrap="none" rtlCol="0">
+            <a:spAutoFit/>
+          </a:bodyPr>
+          <a:lstStyle/>
+          <a:p>
+            <a:r>
+              <a:rPr lang="it-IT" sz="1000" dirty="0" smtClean="0">
+                <a:solidFill>
+                  <a:schemeClr val="accent1"/>
+                </a:solidFill>
+              </a:rPr>
+              <a:t>no</a:t>
+            </a:r>
+            <a:endParaRPr lang="en-GB" sz="1000" dirty="0">
+              <a:solidFill>
+                <a:schemeClr val="accent1"/>
+              </a:solidFill>
+            </a:endParaRPr>
+          </a:p>
+        </p:txBody>
+      </p:sp>
+      <p:sp>
+        <p:nvSpPr>
+          <p:cNvPr id="38" name="CasellaDiTesto 158"/>
+          <p:cNvSpPr txBox="1"/>
+          <p:nvPr/>
+        </p:nvSpPr>
+        <p:spPr>
+          <a:xfrm>
+            <a:off x="2285703" y="2755320"/>
+            <a:ext cx="356188" cy="246221"/>
+          </a:xfrm>
+          <a:prstGeom prst="rect">
+            <a:avLst/>
+          </a:prstGeom>
+          <a:noFill/>
+        </p:spPr>
+        <p:txBody>
+          <a:bodyPr wrap="none" rtlCol="0">
+            <a:spAutoFit/>
+          </a:bodyPr>
+          <a:lstStyle/>
+          <a:p>
+            <a:r>
+              <a:rPr lang="it-IT" sz="1000" dirty="0" smtClean="0">
+                <a:solidFill>
+                  <a:schemeClr val="accent1"/>
+                </a:solidFill>
+              </a:rPr>
+              <a:t>yes</a:t>
+            </a:r>
+            <a:endParaRPr lang="en-GB" sz="1000" dirty="0">
+              <a:solidFill>
+                <a:schemeClr val="accent1"/>
+              </a:solidFill>
+            </a:endParaRPr>
+          </a:p>
+        </p:txBody>
+      </p:sp>
+      <p:sp>
+        <p:nvSpPr>
+          <p:cNvPr id="39" name="CasellaDiTesto 159"/>
+          <p:cNvSpPr txBox="1"/>
+          <p:nvPr/>
+        </p:nvSpPr>
+        <p:spPr>
+          <a:xfrm>
+            <a:off x="1525636" y="2273809"/>
+            <a:ext cx="319318" cy="246221"/>
+          </a:xfrm>
+          <a:prstGeom prst="rect">
+            <a:avLst/>
+          </a:prstGeom>
+          <a:noFill/>
+        </p:spPr>
+        <p:txBody>
+          <a:bodyPr wrap="none" rtlCol="0">
+            <a:spAutoFit/>
+          </a:bodyPr>
+          <a:lstStyle/>
+          <a:p>
+            <a:r>
+              <a:rPr lang="it-IT" sz="1000" dirty="0" smtClean="0">
+                <a:solidFill>
+                  <a:schemeClr val="accent1"/>
+                </a:solidFill>
+              </a:rPr>
+              <a:t>no</a:t>
+            </a:r>
+            <a:endParaRPr lang="en-GB" sz="1000" dirty="0">
+              <a:solidFill>
+                <a:schemeClr val="accent1"/>
+              </a:solidFill>
+            </a:endParaRPr>
+          </a:p>
+        </p:txBody>
+      </p:sp>
+      <p:sp>
+        <p:nvSpPr>
+          <p:cNvPr id="40" name="Terminatore 160"/>
+          <p:cNvSpPr/>
+          <p:nvPr/>
+        </p:nvSpPr>
+        <p:spPr>
+          <a:xfrm>
+            <a:off x="1799921" y="275817"/>
+            <a:ext cx="975340" cy="442044"/>
+          </a:xfrm>
+          <a:prstGeom prst="flowChartTerminator">
+            <a:avLst/>
+          </a:prstGeom>
+        </p:spPr>
+        <p:style>
+          <a:lnRef idx="2">
+            <a:schemeClr val="accent1">
+              <a:shade val="50000"/>
+            </a:schemeClr>
+          </a:lnRef>
+          <a:fillRef idx="1">
+            <a:schemeClr val="accent1"/>
+          </a:fillRef>
+          <a:effectRef idx="0">
+            <a:schemeClr val="accent1"/>
+          </a:effectRef>
+          <a:fontRef idx="minor">
+            <a:schemeClr val="lt1"/>
+          </a:fontRef>
+        </p:style>
+        <p:txBody>
+          <a:bodyPr rtlCol="0" anchor="ctr"/>
+          <a:lstStyle/>
+          <a:p>
+            <a:pPr algn="ctr"/>
+            <a:r>
+              <a:rPr lang="it-IT" sz="1200" dirty="0" smtClean="0"/>
+              <a:t>Start</a:t>
+            </a:r>
+            <a:endParaRPr lang="it-IT" sz="1200" dirty="0"/>
+          </a:p>
+        </p:txBody>
+      </p:sp>
+      <p:cxnSp>
+        <p:nvCxnSpPr>
+          <p:cNvPr id="41" name="Connettore 2 161"/>
+          <p:cNvCxnSpPr/>
+          <p:nvPr/>
+        </p:nvCxnSpPr>
+        <p:spPr>
+          <a:xfrm flipH="1">
+            <a:off x="2285703" y="714110"/>
+            <a:ext cx="3014" cy="239404"/>
+          </a:xfrm>
+          <a:prstGeom prst="straightConnector1">
+            <a:avLst/>
+          </a:prstGeom>
+          <a:ln>
+            <a:tailEnd type="triangle"/>
+          </a:ln>
+        </p:spPr>
+        <p:style>
+          <a:lnRef idx="1">
+            <a:schemeClr val="accent1"/>
+          </a:lnRef>
+          <a:fillRef idx="0">
+            <a:schemeClr val="accent1"/>
+          </a:fillRef>
+          <a:effectRef idx="0">
+            <a:schemeClr val="accent1"/>
+          </a:effectRef>
+          <a:fontRef idx="minor">
+            <a:schemeClr val="tx1"/>
+          </a:fontRef>
+        </p:style>
+      </p:cxnSp>
+    </p:spTree>
+    <p:extLst>
+      <p:ext uri="{BB962C8B-B14F-4D97-AF65-F5344CB8AC3E}">
+        <p14:creationId xmlns:p14="http://schemas.microsoft.com/office/powerpoint/2010/main" val="3645073940"/>
+      </p:ext>
+    </p:extLst>
+  </p:cSld>
+  <p:clrMapOvr>
+    <a:masterClrMapping/>
+  </p:clrMapOvr>
 </p:sld>
 </file>
 

</xml_diff>